<commit_message>
update the slide and readme hyperlink
</commit_message>
<xml_diff>
--- a/docs/NLP_bangla_tutorial.pptx
+++ b/docs/NLP_bangla_tutorial.pptx
@@ -5,7 +5,7 @@
     <p:sldMasterId id="2147483714" r:id="rId1"/>
   </p:sldMasterIdLst>
   <p:notesMasterIdLst>
-    <p:notesMasterId r:id="rId35"/>
+    <p:notesMasterId r:id="rId37"/>
   </p:notesMasterIdLst>
   <p:sldIdLst>
     <p:sldId id="256" r:id="rId2"/>
@@ -37,10 +37,12 @@
     <p:sldId id="290" r:id="rId28"/>
     <p:sldId id="288" r:id="rId29"/>
     <p:sldId id="289" r:id="rId30"/>
-    <p:sldId id="284" r:id="rId31"/>
-    <p:sldId id="278" r:id="rId32"/>
-    <p:sldId id="277" r:id="rId33"/>
-    <p:sldId id="276" r:id="rId34"/>
+    <p:sldId id="291" r:id="rId31"/>
+    <p:sldId id="284" r:id="rId32"/>
+    <p:sldId id="278" r:id="rId33"/>
+    <p:sldId id="277" r:id="rId34"/>
+    <p:sldId id="276" r:id="rId35"/>
+    <p:sldId id="292" r:id="rId36"/>
   </p:sldIdLst>
   <p:sldSz cx="12192000" cy="6858000"/>
   <p:notesSz cx="6858000" cy="9144000"/>
@@ -229,7 +231,7 @@
           <a:p>
             <a:fld id="{96AD9802-0A85-4765-BF39-BA9BC36B4F1A}" type="datetimeFigureOut">
               <a:rPr lang="en-US" smtClean="0"/>
-              <a:t>10/30/2022</a:t>
+              <a:t>11/5/2022</a:t>
             </a:fld>
             <a:endParaRPr lang="en-US"/>
           </a:p>
@@ -854,7 +856,7 @@
           <a:p>
             <a:fld id="{4D9800FF-A981-4B9F-BC27-EEE0445CCC0D}" type="datetimeFigureOut">
               <a:rPr lang="en-US" smtClean="0"/>
-              <a:t>10/30/2022</a:t>
+              <a:t>11/5/2022</a:t>
             </a:fld>
             <a:endParaRPr lang="en-US"/>
           </a:p>
@@ -1268,7 +1270,7 @@
           <a:p>
             <a:fld id="{4D9800FF-A981-4B9F-BC27-EEE0445CCC0D}" type="datetimeFigureOut">
               <a:rPr lang="en-US" smtClean="0"/>
-              <a:t>10/30/2022</a:t>
+              <a:t>11/5/2022</a:t>
             </a:fld>
             <a:endParaRPr lang="en-US"/>
           </a:p>
@@ -1604,7 +1606,7 @@
           <a:p>
             <a:fld id="{4D9800FF-A981-4B9F-BC27-EEE0445CCC0D}" type="datetimeFigureOut">
               <a:rPr lang="en-US" smtClean="0"/>
-              <a:t>10/30/2022</a:t>
+              <a:t>11/5/2022</a:t>
             </a:fld>
             <a:endParaRPr lang="en-US"/>
           </a:p>
@@ -2009,7 +2011,7 @@
           <a:p>
             <a:fld id="{4D9800FF-A981-4B9F-BC27-EEE0445CCC0D}" type="datetimeFigureOut">
               <a:rPr lang="en-US" smtClean="0"/>
-              <a:t>10/30/2022</a:t>
+              <a:t>11/5/2022</a:t>
             </a:fld>
             <a:endParaRPr lang="en-US"/>
           </a:p>
@@ -2577,7 +2579,7 @@
           <a:p>
             <a:fld id="{4D9800FF-A981-4B9F-BC27-EEE0445CCC0D}" type="datetimeFigureOut">
               <a:rPr lang="en-US" smtClean="0"/>
-              <a:t>10/30/2022</a:t>
+              <a:t>11/5/2022</a:t>
             </a:fld>
             <a:endParaRPr lang="en-US"/>
           </a:p>
@@ -3258,7 +3260,7 @@
           <a:p>
             <a:fld id="{4D9800FF-A981-4B9F-BC27-EEE0445CCC0D}" type="datetimeFigureOut">
               <a:rPr lang="en-US" smtClean="0"/>
-              <a:t>10/30/2022</a:t>
+              <a:t>11/5/2022</a:t>
             </a:fld>
             <a:endParaRPr lang="en-US"/>
           </a:p>
@@ -4171,7 +4173,7 @@
           <a:p>
             <a:fld id="{4D9800FF-A981-4B9F-BC27-EEE0445CCC0D}" type="datetimeFigureOut">
               <a:rPr lang="en-US" smtClean="0"/>
-              <a:t>10/30/2022</a:t>
+              <a:t>11/5/2022</a:t>
             </a:fld>
             <a:endParaRPr lang="en-US"/>
           </a:p>
@@ -4484,7 +4486,7 @@
           <a:p>
             <a:fld id="{4D9800FF-A981-4B9F-BC27-EEE0445CCC0D}" type="datetimeFigureOut">
               <a:rPr lang="en-US" smtClean="0"/>
-              <a:t>10/30/2022</a:t>
+              <a:t>11/5/2022</a:t>
             </a:fld>
             <a:endParaRPr lang="en-US"/>
           </a:p>
@@ -4748,7 +4750,7 @@
           <a:p>
             <a:fld id="{4D9800FF-A981-4B9F-BC27-EEE0445CCC0D}" type="datetimeFigureOut">
               <a:rPr lang="en-US" smtClean="0"/>
-              <a:t>10/30/2022</a:t>
+              <a:t>11/5/2022</a:t>
             </a:fld>
             <a:endParaRPr lang="en-US"/>
           </a:p>
@@ -5071,7 +5073,7 @@
           <a:p>
             <a:fld id="{4D9800FF-A981-4B9F-BC27-EEE0445CCC0D}" type="datetimeFigureOut">
               <a:rPr lang="en-US" smtClean="0"/>
-              <a:t>10/30/2022</a:t>
+              <a:t>11/5/2022</a:t>
             </a:fld>
             <a:endParaRPr lang="en-US"/>
           </a:p>
@@ -5460,7 +5462,7 @@
           <a:p>
             <a:fld id="{4D9800FF-A981-4B9F-BC27-EEE0445CCC0D}" type="datetimeFigureOut">
               <a:rPr lang="en-US" smtClean="0"/>
-              <a:t>10/30/2022</a:t>
+              <a:t>11/5/2022</a:t>
             </a:fld>
             <a:endParaRPr lang="en-US"/>
           </a:p>
@@ -5836,7 +5838,7 @@
           <a:p>
             <a:fld id="{4D9800FF-A981-4B9F-BC27-EEE0445CCC0D}" type="datetimeFigureOut">
               <a:rPr lang="en-US" smtClean="0"/>
-              <a:t>10/30/2022</a:t>
+              <a:t>11/5/2022</a:t>
             </a:fld>
             <a:endParaRPr lang="en-US"/>
           </a:p>
@@ -6342,7 +6344,7 @@
           <a:p>
             <a:fld id="{4D9800FF-A981-4B9F-BC27-EEE0445CCC0D}" type="datetimeFigureOut">
               <a:rPr lang="en-US" smtClean="0"/>
-              <a:t>10/30/2022</a:t>
+              <a:t>11/5/2022</a:t>
             </a:fld>
             <a:endParaRPr lang="en-US"/>
           </a:p>
@@ -6599,7 +6601,7 @@
           <a:p>
             <a:fld id="{4D9800FF-A981-4B9F-BC27-EEE0445CCC0D}" type="datetimeFigureOut">
               <a:rPr lang="en-US" smtClean="0"/>
-              <a:t>10/30/2022</a:t>
+              <a:t>11/5/2022</a:t>
             </a:fld>
             <a:endParaRPr lang="en-US"/>
           </a:p>
@@ -6762,7 +6764,7 @@
           <a:p>
             <a:fld id="{4D9800FF-A981-4B9F-BC27-EEE0445CCC0D}" type="datetimeFigureOut">
               <a:rPr lang="en-US" smtClean="0"/>
-              <a:t>10/30/2022</a:t>
+              <a:t>11/5/2022</a:t>
             </a:fld>
             <a:endParaRPr lang="en-US"/>
           </a:p>
@@ -7152,7 +7154,7 @@
           <a:p>
             <a:fld id="{4D9800FF-A981-4B9F-BC27-EEE0445CCC0D}" type="datetimeFigureOut">
               <a:rPr lang="en-US" smtClean="0"/>
-              <a:t>10/30/2022</a:t>
+              <a:t>11/5/2022</a:t>
             </a:fld>
             <a:endParaRPr lang="en-US"/>
           </a:p>
@@ -7561,7 +7563,7 @@
           <a:p>
             <a:fld id="{4D9800FF-A981-4B9F-BC27-EEE0445CCC0D}" type="datetimeFigureOut">
               <a:rPr lang="en-US" smtClean="0"/>
-              <a:t>10/30/2022</a:t>
+              <a:t>11/5/2022</a:t>
             </a:fld>
             <a:endParaRPr lang="en-US"/>
           </a:p>
@@ -7805,7 +7807,7 @@
           <a:p>
             <a:fld id="{4D9800FF-A981-4B9F-BC27-EEE0445CCC0D}" type="datetimeFigureOut">
               <a:rPr lang="en-US" smtClean="0"/>
-              <a:t>10/30/2022</a:t>
+              <a:t>11/5/2022</a:t>
             </a:fld>
             <a:endParaRPr lang="en-US"/>
           </a:p>
@@ -23859,7 +23861,7 @@
           <a:p>
             <a:r>
               <a:rPr lang="en-US" dirty="0"/>
-              <a:t>Context Free Grammar (CFG)</a:t>
+              <a:t>DP Code Implementation for Min Edit Distance: 3</a:t>
             </a:r>
             <a:endParaRPr lang="en-US" sz="3000" dirty="0">
               <a:solidFill>
@@ -23907,6 +23909,109 @@
     </p:spTree>
     <p:extLst>
       <p:ext uri="{BB962C8B-B14F-4D97-AF65-F5344CB8AC3E}">
+        <p14:creationId xmlns:p14="http://schemas.microsoft.com/office/powerpoint/2010/main" val="2666587409"/>
+      </p:ext>
+    </p:extLst>
+  </p:cSld>
+  <p:clrMapOvr>
+    <a:masterClrMapping/>
+  </p:clrMapOvr>
+</p:sld>
+</file>
+
+<file path=ppt/slides/slide31.xml><?xml version="1.0" encoding="utf-8"?>
+<p:sld xmlns:a="http://schemas.openxmlformats.org/drawingml/2006/main" xmlns:r="http://schemas.openxmlformats.org/officeDocument/2006/relationships" xmlns:p="http://schemas.openxmlformats.org/presentationml/2006/main">
+  <p:cSld>
+    <p:spTree>
+      <p:nvGrpSpPr>
+        <p:cNvPr id="1" name=""/>
+        <p:cNvGrpSpPr/>
+        <p:nvPr/>
+      </p:nvGrpSpPr>
+      <p:grpSpPr>
+        <a:xfrm>
+          <a:off x="0" y="0"/>
+          <a:ext cx="0" cy="0"/>
+          <a:chOff x="0" y="0"/>
+          <a:chExt cx="0" cy="0"/>
+        </a:xfrm>
+      </p:grpSpPr>
+      <p:sp>
+        <p:nvSpPr>
+          <p:cNvPr id="2" name="Title 1">
+            <a:extLst>
+              <a:ext uri="{FF2B5EF4-FFF2-40B4-BE49-F238E27FC236}">
+                <a16:creationId xmlns:a16="http://schemas.microsoft.com/office/drawing/2014/main" id="{694A32B5-CC15-4BE0-91F6-9DFAB105B8C6}"/>
+              </a:ext>
+            </a:extLst>
+          </p:cNvPr>
+          <p:cNvSpPr>
+            <a:spLocks noGrp="1"/>
+          </p:cNvSpPr>
+          <p:nvPr>
+            <p:ph type="ctrTitle"/>
+          </p:nvPr>
+        </p:nvSpPr>
+        <p:spPr>
+          <a:xfrm>
+            <a:off x="160256" y="2733709"/>
+            <a:ext cx="8664200" cy="1373070"/>
+          </a:xfrm>
+        </p:spPr>
+        <p:txBody>
+          <a:bodyPr/>
+          <a:lstStyle/>
+          <a:p>
+            <a:r>
+              <a:rPr lang="en-US" dirty="0"/>
+              <a:t>Context Free Grammar (CFG)</a:t>
+            </a:r>
+            <a:endParaRPr lang="en-US" sz="3000" dirty="0">
+              <a:solidFill>
+                <a:srgbClr val="FF0000"/>
+              </a:solidFill>
+            </a:endParaRPr>
+          </a:p>
+        </p:txBody>
+      </p:sp>
+      <p:sp>
+        <p:nvSpPr>
+          <p:cNvPr id="3" name="Subtitle 2">
+            <a:extLst>
+              <a:ext uri="{FF2B5EF4-FFF2-40B4-BE49-F238E27FC236}">
+                <a16:creationId xmlns:a16="http://schemas.microsoft.com/office/drawing/2014/main" id="{7F593B77-EFC8-4C4D-ADC1-3DC88C25A989}"/>
+              </a:ext>
+            </a:extLst>
+          </p:cNvPr>
+          <p:cNvSpPr>
+            <a:spLocks noGrp="1"/>
+          </p:cNvSpPr>
+          <p:nvPr>
+            <p:ph type="subTitle" idx="1"/>
+          </p:nvPr>
+        </p:nvSpPr>
+        <p:spPr>
+          <a:xfrm>
+            <a:off x="1062877" y="4422031"/>
+            <a:ext cx="8144134" cy="1117687"/>
+          </a:xfrm>
+        </p:spPr>
+        <p:txBody>
+          <a:bodyPr>
+            <a:normAutofit/>
+          </a:bodyPr>
+          <a:lstStyle/>
+          <a:p>
+            <a:r>
+              <a:rPr lang="en-US" sz="2600" dirty="0"/>
+              <a:t>Natural Language Processing </a:t>
+            </a:r>
+          </a:p>
+        </p:txBody>
+      </p:sp>
+    </p:spTree>
+    <p:extLst>
+      <p:ext uri="{BB962C8B-B14F-4D97-AF65-F5344CB8AC3E}">
         <p14:creationId xmlns:p14="http://schemas.microsoft.com/office/powerpoint/2010/main" val="429324113"/>
       </p:ext>
     </p:extLst>
@@ -23917,7 +24022,7 @@
 </p:sld>
 </file>
 
-<file path=ppt/slides/slide31.xml><?xml version="1.0" encoding="utf-8"?>
+<file path=ppt/slides/slide32.xml><?xml version="1.0" encoding="utf-8"?>
 <p:sld xmlns:a="http://schemas.openxmlformats.org/drawingml/2006/main" xmlns:r="http://schemas.openxmlformats.org/officeDocument/2006/relationships" xmlns:p="http://schemas.openxmlformats.org/presentationml/2006/main">
   <p:cSld>
     <p:spTree>
@@ -24100,7 +24205,7 @@
             </a:r>
             <a:r>
               <a:rPr lang="en-US" sz="2800" dirty="0"/>
-              <a:t> =  { a, b, c }</a:t>
+              <a:t> = { a, b, c }</a:t>
             </a:r>
           </a:p>
           <a:p>
@@ -24700,7 +24805,7 @@
 </p:sld>
 </file>
 
-<file path=ppt/slides/slide32.xml><?xml version="1.0" encoding="utf-8"?>
+<file path=ppt/slides/slide33.xml><?xml version="1.0" encoding="utf-8"?>
 <p:sld xmlns:a="http://schemas.openxmlformats.org/drawingml/2006/main" xmlns:r="http://schemas.openxmlformats.org/officeDocument/2006/relationships" xmlns:p="http://schemas.openxmlformats.org/presentationml/2006/main">
   <p:cSld>
     <p:spTree>
@@ -25796,7 +25901,7 @@
 </p:sld>
 </file>
 
-<file path=ppt/slides/slide33.xml><?xml version="1.0" encoding="utf-8"?>
+<file path=ppt/slides/slide34.xml><?xml version="1.0" encoding="utf-8"?>
 <p:sld xmlns:a="http://schemas.openxmlformats.org/drawingml/2006/main" xmlns:r="http://schemas.openxmlformats.org/officeDocument/2006/relationships" xmlns:p="http://schemas.openxmlformats.org/presentationml/2006/main">
   <p:cSld>
     <p:spTree>
@@ -26689,6 +26794,116 @@
       <p:bldP spid="11" grpId="0" animBg="1"/>
     </p:bldLst>
   </p:timing>
+</p:sld>
+</file>
+
+<file path=ppt/slides/slide35.xml><?xml version="1.0" encoding="utf-8"?>
+<p:sld xmlns:a="http://schemas.openxmlformats.org/drawingml/2006/main" xmlns:r="http://schemas.openxmlformats.org/officeDocument/2006/relationships" xmlns:p="http://schemas.openxmlformats.org/presentationml/2006/main">
+  <p:cSld>
+    <p:spTree>
+      <p:nvGrpSpPr>
+        <p:cNvPr id="1" name=""/>
+        <p:cNvGrpSpPr/>
+        <p:nvPr/>
+      </p:nvGrpSpPr>
+      <p:grpSpPr>
+        <a:xfrm>
+          <a:off x="0" y="0"/>
+          <a:ext cx="0" cy="0"/>
+          <a:chOff x="0" y="0"/>
+          <a:chExt cx="0" cy="0"/>
+        </a:xfrm>
+      </p:grpSpPr>
+      <p:sp>
+        <p:nvSpPr>
+          <p:cNvPr id="2" name="Title 1">
+            <a:extLst>
+              <a:ext uri="{FF2B5EF4-FFF2-40B4-BE49-F238E27FC236}">
+                <a16:creationId xmlns:a16="http://schemas.microsoft.com/office/drawing/2014/main" id="{694A32B5-CC15-4BE0-91F6-9DFAB105B8C6}"/>
+              </a:ext>
+            </a:extLst>
+          </p:cNvPr>
+          <p:cNvSpPr>
+            <a:spLocks noGrp="1"/>
+          </p:cNvSpPr>
+          <p:nvPr>
+            <p:ph type="ctrTitle"/>
+          </p:nvPr>
+        </p:nvSpPr>
+        <p:spPr>
+          <a:xfrm>
+            <a:off x="160256" y="2733709"/>
+            <a:ext cx="8664200" cy="1373070"/>
+          </a:xfrm>
+        </p:spPr>
+        <p:txBody>
+          <a:bodyPr/>
+          <a:lstStyle/>
+          <a:p>
+            <a:r>
+              <a:rPr lang="en-US" dirty="0"/>
+              <a:t>Context Free Grammar: 2 </a:t>
+            </a:r>
+            <a:br>
+              <a:rPr lang="en-US" dirty="0"/>
+            </a:br>
+            <a:r>
+              <a:rPr lang="en-US" dirty="0"/>
+              <a:t>( Python Code )</a:t>
+            </a:r>
+            <a:endParaRPr lang="en-US" sz="3000" dirty="0">
+              <a:solidFill>
+                <a:srgbClr val="FF0000"/>
+              </a:solidFill>
+            </a:endParaRPr>
+          </a:p>
+        </p:txBody>
+      </p:sp>
+      <p:sp>
+        <p:nvSpPr>
+          <p:cNvPr id="3" name="Subtitle 2">
+            <a:extLst>
+              <a:ext uri="{FF2B5EF4-FFF2-40B4-BE49-F238E27FC236}">
+                <a16:creationId xmlns:a16="http://schemas.microsoft.com/office/drawing/2014/main" id="{7F593B77-EFC8-4C4D-ADC1-3DC88C25A989}"/>
+              </a:ext>
+            </a:extLst>
+          </p:cNvPr>
+          <p:cNvSpPr>
+            <a:spLocks noGrp="1"/>
+          </p:cNvSpPr>
+          <p:nvPr>
+            <p:ph type="subTitle" idx="1"/>
+          </p:nvPr>
+        </p:nvSpPr>
+        <p:spPr>
+          <a:xfrm>
+            <a:off x="1062877" y="4422031"/>
+            <a:ext cx="8144134" cy="1117687"/>
+          </a:xfrm>
+        </p:spPr>
+        <p:txBody>
+          <a:bodyPr>
+            <a:normAutofit/>
+          </a:bodyPr>
+          <a:lstStyle/>
+          <a:p>
+            <a:r>
+              <a:rPr lang="en-US" sz="2600" dirty="0"/>
+              <a:t>Natural Language Processing </a:t>
+            </a:r>
+          </a:p>
+        </p:txBody>
+      </p:sp>
+    </p:spTree>
+    <p:extLst>
+      <p:ext uri="{BB962C8B-B14F-4D97-AF65-F5344CB8AC3E}">
+        <p14:creationId xmlns:p14="http://schemas.microsoft.com/office/powerpoint/2010/main" val="1394566953"/>
+      </p:ext>
+    </p:extLst>
+  </p:cSld>
+  <p:clrMapOvr>
+    <a:masterClrMapping/>
+  </p:clrMapOvr>
 </p:sld>
 </file>
 

</xml_diff>

<commit_message>
n gram in slide
</commit_message>
<xml_diff>
--- a/docs/NLP_bangla_tutorial.pptx
+++ b/docs/NLP_bangla_tutorial.pptx
@@ -5,7 +5,7 @@
     <p:sldMasterId id="2147483714" r:id="rId1"/>
   </p:sldMasterIdLst>
   <p:notesMasterIdLst>
-    <p:notesMasterId r:id="rId37"/>
+    <p:notesMasterId r:id="rId44"/>
   </p:notesMasterIdLst>
   <p:sldIdLst>
     <p:sldId id="256" r:id="rId2"/>
@@ -43,6 +43,13 @@
     <p:sldId id="277" r:id="rId34"/>
     <p:sldId id="276" r:id="rId35"/>
     <p:sldId id="292" r:id="rId36"/>
+    <p:sldId id="293" r:id="rId37"/>
+    <p:sldId id="294" r:id="rId38"/>
+    <p:sldId id="295" r:id="rId39"/>
+    <p:sldId id="296" r:id="rId40"/>
+    <p:sldId id="297" r:id="rId41"/>
+    <p:sldId id="299" r:id="rId42"/>
+    <p:sldId id="298" r:id="rId43"/>
   </p:sldIdLst>
   <p:sldSz cx="12192000" cy="6858000"/>
   <p:notesSz cx="6858000" cy="9144000"/>
@@ -231,7 +238,7 @@
           <a:p>
             <a:fld id="{96AD9802-0A85-4765-BF39-BA9BC36B4F1A}" type="datetimeFigureOut">
               <a:rPr lang="en-US" smtClean="0"/>
-              <a:t>11/5/2022</a:t>
+              <a:t>8/30/2023</a:t>
             </a:fld>
             <a:endParaRPr lang="en-US"/>
           </a:p>
@@ -856,7 +863,7 @@
           <a:p>
             <a:fld id="{4D9800FF-A981-4B9F-BC27-EEE0445CCC0D}" type="datetimeFigureOut">
               <a:rPr lang="en-US" smtClean="0"/>
-              <a:t>11/5/2022</a:t>
+              <a:t>8/30/2023</a:t>
             </a:fld>
             <a:endParaRPr lang="en-US"/>
           </a:p>
@@ -1270,7 +1277,7 @@
           <a:p>
             <a:fld id="{4D9800FF-A981-4B9F-BC27-EEE0445CCC0D}" type="datetimeFigureOut">
               <a:rPr lang="en-US" smtClean="0"/>
-              <a:t>11/5/2022</a:t>
+              <a:t>8/30/2023</a:t>
             </a:fld>
             <a:endParaRPr lang="en-US"/>
           </a:p>
@@ -1606,7 +1613,7 @@
           <a:p>
             <a:fld id="{4D9800FF-A981-4B9F-BC27-EEE0445CCC0D}" type="datetimeFigureOut">
               <a:rPr lang="en-US" smtClean="0"/>
-              <a:t>11/5/2022</a:t>
+              <a:t>8/30/2023</a:t>
             </a:fld>
             <a:endParaRPr lang="en-US"/>
           </a:p>
@@ -2011,7 +2018,7 @@
           <a:p>
             <a:fld id="{4D9800FF-A981-4B9F-BC27-EEE0445CCC0D}" type="datetimeFigureOut">
               <a:rPr lang="en-US" smtClean="0"/>
-              <a:t>11/5/2022</a:t>
+              <a:t>8/30/2023</a:t>
             </a:fld>
             <a:endParaRPr lang="en-US"/>
           </a:p>
@@ -2579,7 +2586,7 @@
           <a:p>
             <a:fld id="{4D9800FF-A981-4B9F-BC27-EEE0445CCC0D}" type="datetimeFigureOut">
               <a:rPr lang="en-US" smtClean="0"/>
-              <a:t>11/5/2022</a:t>
+              <a:t>8/30/2023</a:t>
             </a:fld>
             <a:endParaRPr lang="en-US"/>
           </a:p>
@@ -3260,7 +3267,7 @@
           <a:p>
             <a:fld id="{4D9800FF-A981-4B9F-BC27-EEE0445CCC0D}" type="datetimeFigureOut">
               <a:rPr lang="en-US" smtClean="0"/>
-              <a:t>11/5/2022</a:t>
+              <a:t>8/30/2023</a:t>
             </a:fld>
             <a:endParaRPr lang="en-US"/>
           </a:p>
@@ -4173,7 +4180,7 @@
           <a:p>
             <a:fld id="{4D9800FF-A981-4B9F-BC27-EEE0445CCC0D}" type="datetimeFigureOut">
               <a:rPr lang="en-US" smtClean="0"/>
-              <a:t>11/5/2022</a:t>
+              <a:t>8/30/2023</a:t>
             </a:fld>
             <a:endParaRPr lang="en-US"/>
           </a:p>
@@ -4486,7 +4493,7 @@
           <a:p>
             <a:fld id="{4D9800FF-A981-4B9F-BC27-EEE0445CCC0D}" type="datetimeFigureOut">
               <a:rPr lang="en-US" smtClean="0"/>
-              <a:t>11/5/2022</a:t>
+              <a:t>8/30/2023</a:t>
             </a:fld>
             <a:endParaRPr lang="en-US"/>
           </a:p>
@@ -4750,7 +4757,7 @@
           <a:p>
             <a:fld id="{4D9800FF-A981-4B9F-BC27-EEE0445CCC0D}" type="datetimeFigureOut">
               <a:rPr lang="en-US" smtClean="0"/>
-              <a:t>11/5/2022</a:t>
+              <a:t>8/30/2023</a:t>
             </a:fld>
             <a:endParaRPr lang="en-US"/>
           </a:p>
@@ -5073,7 +5080,7 @@
           <a:p>
             <a:fld id="{4D9800FF-A981-4B9F-BC27-EEE0445CCC0D}" type="datetimeFigureOut">
               <a:rPr lang="en-US" smtClean="0"/>
-              <a:t>11/5/2022</a:t>
+              <a:t>8/30/2023</a:t>
             </a:fld>
             <a:endParaRPr lang="en-US"/>
           </a:p>
@@ -5462,7 +5469,7 @@
           <a:p>
             <a:fld id="{4D9800FF-A981-4B9F-BC27-EEE0445CCC0D}" type="datetimeFigureOut">
               <a:rPr lang="en-US" smtClean="0"/>
-              <a:t>11/5/2022</a:t>
+              <a:t>8/30/2023</a:t>
             </a:fld>
             <a:endParaRPr lang="en-US"/>
           </a:p>
@@ -5838,7 +5845,7 @@
           <a:p>
             <a:fld id="{4D9800FF-A981-4B9F-BC27-EEE0445CCC0D}" type="datetimeFigureOut">
               <a:rPr lang="en-US" smtClean="0"/>
-              <a:t>11/5/2022</a:t>
+              <a:t>8/30/2023</a:t>
             </a:fld>
             <a:endParaRPr lang="en-US"/>
           </a:p>
@@ -6344,7 +6351,7 @@
           <a:p>
             <a:fld id="{4D9800FF-A981-4B9F-BC27-EEE0445CCC0D}" type="datetimeFigureOut">
               <a:rPr lang="en-US" smtClean="0"/>
-              <a:t>11/5/2022</a:t>
+              <a:t>8/30/2023</a:t>
             </a:fld>
             <a:endParaRPr lang="en-US"/>
           </a:p>
@@ -6601,7 +6608,7 @@
           <a:p>
             <a:fld id="{4D9800FF-A981-4B9F-BC27-EEE0445CCC0D}" type="datetimeFigureOut">
               <a:rPr lang="en-US" smtClean="0"/>
-              <a:t>11/5/2022</a:t>
+              <a:t>8/30/2023</a:t>
             </a:fld>
             <a:endParaRPr lang="en-US"/>
           </a:p>
@@ -6764,7 +6771,7 @@
           <a:p>
             <a:fld id="{4D9800FF-A981-4B9F-BC27-EEE0445CCC0D}" type="datetimeFigureOut">
               <a:rPr lang="en-US" smtClean="0"/>
-              <a:t>11/5/2022</a:t>
+              <a:t>8/30/2023</a:t>
             </a:fld>
             <a:endParaRPr lang="en-US"/>
           </a:p>
@@ -7154,7 +7161,7 @@
           <a:p>
             <a:fld id="{4D9800FF-A981-4B9F-BC27-EEE0445CCC0D}" type="datetimeFigureOut">
               <a:rPr lang="en-US" smtClean="0"/>
-              <a:t>11/5/2022</a:t>
+              <a:t>8/30/2023</a:t>
             </a:fld>
             <a:endParaRPr lang="en-US"/>
           </a:p>
@@ -7563,7 +7570,7 @@
           <a:p>
             <a:fld id="{4D9800FF-A981-4B9F-BC27-EEE0445CCC0D}" type="datetimeFigureOut">
               <a:rPr lang="en-US" smtClean="0"/>
-              <a:t>11/5/2022</a:t>
+              <a:t>8/30/2023</a:t>
             </a:fld>
             <a:endParaRPr lang="en-US"/>
           </a:p>
@@ -7807,7 +7814,7 @@
           <a:p>
             <a:fld id="{4D9800FF-A981-4B9F-BC27-EEE0445CCC0D}" type="datetimeFigureOut">
               <a:rPr lang="en-US" smtClean="0"/>
-              <a:t>11/5/2022</a:t>
+              <a:t>8/30/2023</a:t>
             </a:fld>
             <a:endParaRPr lang="en-US"/>
           </a:p>
@@ -26907,6 +26914,478 @@
 </p:sld>
 </file>
 
+<file path=ppt/slides/slide36.xml><?xml version="1.0" encoding="utf-8"?>
+<p:sld xmlns:a="http://schemas.openxmlformats.org/drawingml/2006/main" xmlns:r="http://schemas.openxmlformats.org/officeDocument/2006/relationships" xmlns:p="http://schemas.openxmlformats.org/presentationml/2006/main">
+  <p:cSld>
+    <p:spTree>
+      <p:nvGrpSpPr>
+        <p:cNvPr id="1" name=""/>
+        <p:cNvGrpSpPr/>
+        <p:nvPr/>
+      </p:nvGrpSpPr>
+      <p:grpSpPr>
+        <a:xfrm>
+          <a:off x="0" y="0"/>
+          <a:ext cx="0" cy="0"/>
+          <a:chOff x="0" y="0"/>
+          <a:chExt cx="0" cy="0"/>
+        </a:xfrm>
+      </p:grpSpPr>
+      <p:sp>
+        <p:nvSpPr>
+          <p:cNvPr id="2" name="Title 1">
+            <a:extLst>
+              <a:ext uri="{FF2B5EF4-FFF2-40B4-BE49-F238E27FC236}">
+                <a16:creationId xmlns:a16="http://schemas.microsoft.com/office/drawing/2014/main" id="{694A32B5-CC15-4BE0-91F6-9DFAB105B8C6}"/>
+              </a:ext>
+            </a:extLst>
+          </p:cNvPr>
+          <p:cNvSpPr>
+            <a:spLocks noGrp="1"/>
+          </p:cNvSpPr>
+          <p:nvPr>
+            <p:ph type="ctrTitle"/>
+          </p:nvPr>
+        </p:nvSpPr>
+        <p:spPr/>
+        <p:txBody>
+          <a:bodyPr/>
+          <a:lstStyle/>
+          <a:p>
+            <a:r>
+              <a:rPr lang="en-US" dirty="0"/>
+              <a:t>Text Classification</a:t>
+            </a:r>
+            <a:br>
+              <a:rPr lang="en-US" dirty="0"/>
+            </a:br>
+            <a:r>
+              <a:rPr lang="en-US" sz="3000" dirty="0">
+                <a:solidFill>
+                  <a:srgbClr val="FF0000"/>
+                </a:solidFill>
+              </a:rPr>
+              <a:t>Assign a label or class into a text</a:t>
+            </a:r>
+          </a:p>
+        </p:txBody>
+      </p:sp>
+      <p:sp>
+        <p:nvSpPr>
+          <p:cNvPr id="3" name="Subtitle 2">
+            <a:extLst>
+              <a:ext uri="{FF2B5EF4-FFF2-40B4-BE49-F238E27FC236}">
+                <a16:creationId xmlns:a16="http://schemas.microsoft.com/office/drawing/2014/main" id="{7F593B77-EFC8-4C4D-ADC1-3DC88C25A989}"/>
+              </a:ext>
+            </a:extLst>
+          </p:cNvPr>
+          <p:cNvSpPr>
+            <a:spLocks noGrp="1"/>
+          </p:cNvSpPr>
+          <p:nvPr>
+            <p:ph type="subTitle" idx="1"/>
+          </p:nvPr>
+        </p:nvSpPr>
+        <p:spPr>
+          <a:xfrm>
+            <a:off x="1062877" y="4422031"/>
+            <a:ext cx="8144134" cy="1117687"/>
+          </a:xfrm>
+        </p:spPr>
+        <p:txBody>
+          <a:bodyPr>
+            <a:normAutofit/>
+          </a:bodyPr>
+          <a:lstStyle/>
+          <a:p>
+            <a:r>
+              <a:rPr lang="en-US" sz="2600" dirty="0"/>
+              <a:t>Natural Language Processing </a:t>
+            </a:r>
+          </a:p>
+        </p:txBody>
+      </p:sp>
+    </p:spTree>
+    <p:extLst>
+      <p:ext uri="{BB962C8B-B14F-4D97-AF65-F5344CB8AC3E}">
+        <p14:creationId xmlns:p14="http://schemas.microsoft.com/office/powerpoint/2010/main" val="3254354936"/>
+      </p:ext>
+    </p:extLst>
+  </p:cSld>
+  <p:clrMapOvr>
+    <a:masterClrMapping/>
+  </p:clrMapOvr>
+</p:sld>
+</file>
+
+<file path=ppt/slides/slide37.xml><?xml version="1.0" encoding="utf-8"?>
+<p:sld xmlns:a="http://schemas.openxmlformats.org/drawingml/2006/main" xmlns:r="http://schemas.openxmlformats.org/officeDocument/2006/relationships" xmlns:p="http://schemas.openxmlformats.org/presentationml/2006/main">
+  <p:cSld>
+    <p:spTree>
+      <p:nvGrpSpPr>
+        <p:cNvPr id="1" name=""/>
+        <p:cNvGrpSpPr/>
+        <p:nvPr/>
+      </p:nvGrpSpPr>
+      <p:grpSpPr>
+        <a:xfrm>
+          <a:off x="0" y="0"/>
+          <a:ext cx="0" cy="0"/>
+          <a:chOff x="0" y="0"/>
+          <a:chExt cx="0" cy="0"/>
+        </a:xfrm>
+      </p:grpSpPr>
+      <p:sp>
+        <p:nvSpPr>
+          <p:cNvPr id="2" name="Title 1">
+            <a:extLst>
+              <a:ext uri="{FF2B5EF4-FFF2-40B4-BE49-F238E27FC236}">
+                <a16:creationId xmlns:a16="http://schemas.microsoft.com/office/drawing/2014/main" id="{99F9262E-2D15-41F1-BEC3-1BDD29661926}"/>
+              </a:ext>
+            </a:extLst>
+          </p:cNvPr>
+          <p:cNvSpPr>
+            <a:spLocks noGrp="1"/>
+          </p:cNvSpPr>
+          <p:nvPr>
+            <p:ph type="title"/>
+          </p:nvPr>
+        </p:nvSpPr>
+        <p:spPr/>
+        <p:txBody>
+          <a:bodyPr/>
+          <a:lstStyle/>
+          <a:p>
+            <a:r>
+              <a:rPr lang="en-US" dirty="0"/>
+              <a:t>Text Classification in NLP</a:t>
+            </a:r>
+          </a:p>
+        </p:txBody>
+      </p:sp>
+      <p:sp>
+        <p:nvSpPr>
+          <p:cNvPr id="3" name="Content Placeholder 2">
+            <a:extLst>
+              <a:ext uri="{FF2B5EF4-FFF2-40B4-BE49-F238E27FC236}">
+                <a16:creationId xmlns:a16="http://schemas.microsoft.com/office/drawing/2014/main" id="{BA49079E-10A4-4BC6-9C8D-F47283E67832}"/>
+              </a:ext>
+            </a:extLst>
+          </p:cNvPr>
+          <p:cNvSpPr>
+            <a:spLocks noGrp="1"/>
+          </p:cNvSpPr>
+          <p:nvPr>
+            <p:ph idx="1"/>
+          </p:nvPr>
+        </p:nvSpPr>
+        <p:spPr/>
+        <p:txBody>
+          <a:bodyPr>
+            <a:normAutofit/>
+          </a:bodyPr>
+          <a:lstStyle/>
+          <a:p>
+            <a:r>
+              <a:rPr lang="en-US" sz="3000" dirty="0"/>
+              <a:t>Normalization is the process converting into a standard form. </a:t>
+            </a:r>
+          </a:p>
+          <a:p>
+            <a:r>
+              <a:rPr lang="en-US" sz="3000" dirty="0"/>
+              <a:t> Why required text normalization?</a:t>
+            </a:r>
+          </a:p>
+          <a:p>
+            <a:pPr lvl="1"/>
+            <a:r>
+              <a:rPr lang="en-US" sz="2600" dirty="0"/>
+              <a:t>Word boundary detection. </a:t>
+            </a:r>
+          </a:p>
+          <a:p>
+            <a:pPr lvl="1"/>
+            <a:r>
+              <a:rPr lang="en-US" sz="2600" dirty="0"/>
+              <a:t>Separated word from each other</a:t>
+            </a:r>
+          </a:p>
+          <a:p>
+            <a:pPr lvl="1"/>
+            <a:r>
+              <a:rPr lang="en-US" sz="2600" dirty="0"/>
+              <a:t>Example 1: Bangladesh, New York, Cats and dogs</a:t>
+            </a:r>
+          </a:p>
+          <a:p>
+            <a:pPr lvl="1"/>
+            <a:r>
+              <a:rPr lang="en-US" sz="2600" dirty="0"/>
+              <a:t>Example 2: #nlp, @faisalahmed, </a:t>
+            </a:r>
+            <a:r>
+              <a:rPr lang="en-US" sz="2600" dirty="0">
+                <a:sym typeface="Wingdings" panose="05000000000000000000" pitchFamily="2" charset="2"/>
+              </a:rPr>
+              <a:t>, , :)</a:t>
+            </a:r>
+            <a:r>
+              <a:rPr lang="en-US" sz="2600" dirty="0"/>
+              <a:t> </a:t>
+            </a:r>
+          </a:p>
+        </p:txBody>
+      </p:sp>
+    </p:spTree>
+    <p:extLst>
+      <p:ext uri="{BB962C8B-B14F-4D97-AF65-F5344CB8AC3E}">
+        <p14:creationId xmlns:p14="http://schemas.microsoft.com/office/powerpoint/2010/main" val="1610499565"/>
+      </p:ext>
+    </p:extLst>
+  </p:cSld>
+  <p:clrMapOvr>
+    <a:masterClrMapping/>
+  </p:clrMapOvr>
+</p:sld>
+</file>
+
+<file path=ppt/slides/slide38.xml><?xml version="1.0" encoding="utf-8"?>
+<p:sld xmlns:a="http://schemas.openxmlformats.org/drawingml/2006/main" xmlns:r="http://schemas.openxmlformats.org/officeDocument/2006/relationships" xmlns:p="http://schemas.openxmlformats.org/presentationml/2006/main">
+  <p:cSld>
+    <p:spTree>
+      <p:nvGrpSpPr>
+        <p:cNvPr id="1" name=""/>
+        <p:cNvGrpSpPr/>
+        <p:nvPr/>
+      </p:nvGrpSpPr>
+      <p:grpSpPr>
+        <a:xfrm>
+          <a:off x="0" y="0"/>
+          <a:ext cx="0" cy="0"/>
+          <a:chOff x="0" y="0"/>
+          <a:chExt cx="0" cy="0"/>
+        </a:xfrm>
+      </p:grpSpPr>
+      <p:sp>
+        <p:nvSpPr>
+          <p:cNvPr id="2" name="Title 1">
+            <a:extLst>
+              <a:ext uri="{FF2B5EF4-FFF2-40B4-BE49-F238E27FC236}">
+                <a16:creationId xmlns:a16="http://schemas.microsoft.com/office/drawing/2014/main" id="{99F9262E-2D15-41F1-BEC3-1BDD29661926}"/>
+              </a:ext>
+            </a:extLst>
+          </p:cNvPr>
+          <p:cNvSpPr>
+            <a:spLocks noGrp="1"/>
+          </p:cNvSpPr>
+          <p:nvPr>
+            <p:ph type="title"/>
+          </p:nvPr>
+        </p:nvSpPr>
+        <p:spPr/>
+        <p:txBody>
+          <a:bodyPr/>
+          <a:lstStyle/>
+          <a:p>
+            <a:r>
+              <a:rPr lang="en-US" dirty="0"/>
+              <a:t>Text Classification in NLP</a:t>
+            </a:r>
+          </a:p>
+        </p:txBody>
+      </p:sp>
+      <p:sp>
+        <p:nvSpPr>
+          <p:cNvPr id="3" name="Content Placeholder 2">
+            <a:extLst>
+              <a:ext uri="{FF2B5EF4-FFF2-40B4-BE49-F238E27FC236}">
+                <a16:creationId xmlns:a16="http://schemas.microsoft.com/office/drawing/2014/main" id="{BA49079E-10A4-4BC6-9C8D-F47283E67832}"/>
+              </a:ext>
+            </a:extLst>
+          </p:cNvPr>
+          <p:cNvSpPr>
+            <a:spLocks noGrp="1"/>
+          </p:cNvSpPr>
+          <p:nvPr>
+            <p:ph idx="1"/>
+          </p:nvPr>
+        </p:nvSpPr>
+        <p:spPr/>
+        <p:txBody>
+          <a:bodyPr>
+            <a:normAutofit/>
+          </a:bodyPr>
+          <a:lstStyle/>
+          <a:p>
+            <a:r>
+              <a:rPr lang="en-US" sz="3000" dirty="0"/>
+              <a:t>Normalization is the process converting into a standard form. </a:t>
+            </a:r>
+          </a:p>
+          <a:p>
+            <a:r>
+              <a:rPr lang="en-US" sz="3000" dirty="0"/>
+              <a:t> Why required text normalization?</a:t>
+            </a:r>
+          </a:p>
+          <a:p>
+            <a:pPr lvl="1"/>
+            <a:r>
+              <a:rPr lang="en-US" sz="2600" dirty="0"/>
+              <a:t>Word boundary detection. </a:t>
+            </a:r>
+          </a:p>
+          <a:p>
+            <a:pPr lvl="1"/>
+            <a:r>
+              <a:rPr lang="en-US" sz="2600" dirty="0"/>
+              <a:t>Separated word from each other</a:t>
+            </a:r>
+          </a:p>
+          <a:p>
+            <a:pPr lvl="1"/>
+            <a:r>
+              <a:rPr lang="en-US" sz="2600" dirty="0"/>
+              <a:t>Example 1: Bangladesh, New York, Cats and dogs</a:t>
+            </a:r>
+          </a:p>
+          <a:p>
+            <a:pPr lvl="1"/>
+            <a:r>
+              <a:rPr lang="en-US" sz="2600" dirty="0"/>
+              <a:t>Example 2: #nlp, @faisalahmed, </a:t>
+            </a:r>
+            <a:r>
+              <a:rPr lang="en-US" sz="2600" dirty="0">
+                <a:sym typeface="Wingdings" panose="05000000000000000000" pitchFamily="2" charset="2"/>
+              </a:rPr>
+              <a:t>, , :)</a:t>
+            </a:r>
+            <a:r>
+              <a:rPr lang="en-US" sz="2600" dirty="0"/>
+              <a:t> </a:t>
+            </a:r>
+          </a:p>
+        </p:txBody>
+      </p:sp>
+    </p:spTree>
+    <p:extLst>
+      <p:ext uri="{BB962C8B-B14F-4D97-AF65-F5344CB8AC3E}">
+        <p14:creationId xmlns:p14="http://schemas.microsoft.com/office/powerpoint/2010/main" val="1088741429"/>
+      </p:ext>
+    </p:extLst>
+  </p:cSld>
+  <p:clrMapOvr>
+    <a:masterClrMapping/>
+  </p:clrMapOvr>
+</p:sld>
+</file>
+
+<file path=ppt/slides/slide39.xml><?xml version="1.0" encoding="utf-8"?>
+<p:sld xmlns:a="http://schemas.openxmlformats.org/drawingml/2006/main" xmlns:r="http://schemas.openxmlformats.org/officeDocument/2006/relationships" xmlns:p="http://schemas.openxmlformats.org/presentationml/2006/main">
+  <p:cSld>
+    <p:spTree>
+      <p:nvGrpSpPr>
+        <p:cNvPr id="1" name=""/>
+        <p:cNvGrpSpPr/>
+        <p:nvPr/>
+      </p:nvGrpSpPr>
+      <p:grpSpPr>
+        <a:xfrm>
+          <a:off x="0" y="0"/>
+          <a:ext cx="0" cy="0"/>
+          <a:chOff x="0" y="0"/>
+          <a:chExt cx="0" cy="0"/>
+        </a:xfrm>
+      </p:grpSpPr>
+      <p:sp>
+        <p:nvSpPr>
+          <p:cNvPr id="2" name="Title 1">
+            <a:extLst>
+              <a:ext uri="{FF2B5EF4-FFF2-40B4-BE49-F238E27FC236}">
+                <a16:creationId xmlns:a16="http://schemas.microsoft.com/office/drawing/2014/main" id="{694A32B5-CC15-4BE0-91F6-9DFAB105B8C6}"/>
+              </a:ext>
+            </a:extLst>
+          </p:cNvPr>
+          <p:cNvSpPr>
+            <a:spLocks noGrp="1"/>
+          </p:cNvSpPr>
+          <p:nvPr>
+            <p:ph type="ctrTitle"/>
+          </p:nvPr>
+        </p:nvSpPr>
+        <p:spPr/>
+        <p:txBody>
+          <a:bodyPr/>
+          <a:lstStyle/>
+          <a:p>
+            <a:r>
+              <a:rPr lang="en-US" dirty="0"/>
+              <a:t>Language Models: N-gram</a:t>
+            </a:r>
+            <a:br>
+              <a:rPr lang="en-US" dirty="0"/>
+            </a:br>
+            <a:r>
+              <a:rPr lang="en-US" sz="3000" dirty="0">
+                <a:solidFill>
+                  <a:srgbClr val="FF0000"/>
+                </a:solidFill>
+              </a:rPr>
+              <a:t>Calculate the probability of a word</a:t>
+            </a:r>
+          </a:p>
+        </p:txBody>
+      </p:sp>
+      <p:sp>
+        <p:nvSpPr>
+          <p:cNvPr id="3" name="Subtitle 2">
+            <a:extLst>
+              <a:ext uri="{FF2B5EF4-FFF2-40B4-BE49-F238E27FC236}">
+                <a16:creationId xmlns:a16="http://schemas.microsoft.com/office/drawing/2014/main" id="{7F593B77-EFC8-4C4D-ADC1-3DC88C25A989}"/>
+              </a:ext>
+            </a:extLst>
+          </p:cNvPr>
+          <p:cNvSpPr>
+            <a:spLocks noGrp="1"/>
+          </p:cNvSpPr>
+          <p:nvPr>
+            <p:ph type="subTitle" idx="1"/>
+          </p:nvPr>
+        </p:nvSpPr>
+        <p:spPr>
+          <a:xfrm>
+            <a:off x="1062877" y="4422031"/>
+            <a:ext cx="8144134" cy="1117687"/>
+          </a:xfrm>
+        </p:spPr>
+        <p:txBody>
+          <a:bodyPr>
+            <a:normAutofit/>
+          </a:bodyPr>
+          <a:lstStyle/>
+          <a:p>
+            <a:r>
+              <a:rPr lang="en-US" sz="2600" dirty="0"/>
+              <a:t>Natural Language Processing </a:t>
+            </a:r>
+          </a:p>
+        </p:txBody>
+      </p:sp>
+    </p:spTree>
+    <p:extLst>
+      <p:ext uri="{BB962C8B-B14F-4D97-AF65-F5344CB8AC3E}">
+        <p14:creationId xmlns:p14="http://schemas.microsoft.com/office/powerpoint/2010/main" val="3581155387"/>
+      </p:ext>
+    </p:extLst>
+  </p:cSld>
+  <p:clrMapOvr>
+    <a:masterClrMapping/>
+  </p:clrMapOvr>
+</p:sld>
+</file>
+
 <file path=ppt/slides/slide4.xml><?xml version="1.0" encoding="utf-8"?>
 <p:sld xmlns:a="http://schemas.openxmlformats.org/drawingml/2006/main" xmlns:r="http://schemas.openxmlformats.org/officeDocument/2006/relationships" xmlns:p="http://schemas.openxmlformats.org/presentationml/2006/main">
   <p:cSld>
@@ -26991,6 +27470,394 @@
     <p:extLst>
       <p:ext uri="{BB962C8B-B14F-4D97-AF65-F5344CB8AC3E}">
         <p14:creationId xmlns:p14="http://schemas.microsoft.com/office/powerpoint/2010/main" val="4200392053"/>
+      </p:ext>
+    </p:extLst>
+  </p:cSld>
+  <p:clrMapOvr>
+    <a:masterClrMapping/>
+  </p:clrMapOvr>
+</p:sld>
+</file>
+
+<file path=ppt/slides/slide40.xml><?xml version="1.0" encoding="utf-8"?>
+<p:sld xmlns:a="http://schemas.openxmlformats.org/drawingml/2006/main" xmlns:r="http://schemas.openxmlformats.org/officeDocument/2006/relationships" xmlns:p="http://schemas.openxmlformats.org/presentationml/2006/main">
+  <p:cSld>
+    <p:spTree>
+      <p:nvGrpSpPr>
+        <p:cNvPr id="1" name=""/>
+        <p:cNvGrpSpPr/>
+        <p:nvPr/>
+      </p:nvGrpSpPr>
+      <p:grpSpPr>
+        <a:xfrm>
+          <a:off x="0" y="0"/>
+          <a:ext cx="0" cy="0"/>
+          <a:chOff x="0" y="0"/>
+          <a:chExt cx="0" cy="0"/>
+        </a:xfrm>
+      </p:grpSpPr>
+      <p:sp>
+        <p:nvSpPr>
+          <p:cNvPr id="2" name="Title 1">
+            <a:extLst>
+              <a:ext uri="{FF2B5EF4-FFF2-40B4-BE49-F238E27FC236}">
+                <a16:creationId xmlns:a16="http://schemas.microsoft.com/office/drawing/2014/main" id="{99F9262E-2D15-41F1-BEC3-1BDD29661926}"/>
+              </a:ext>
+            </a:extLst>
+          </p:cNvPr>
+          <p:cNvSpPr>
+            <a:spLocks noGrp="1"/>
+          </p:cNvSpPr>
+          <p:nvPr>
+            <p:ph type="title"/>
+          </p:nvPr>
+        </p:nvSpPr>
+        <p:spPr/>
+        <p:txBody>
+          <a:bodyPr/>
+          <a:lstStyle/>
+          <a:p>
+            <a:r>
+              <a:rPr lang="en-US" dirty="0"/>
+              <a:t>Language Model in NLP</a:t>
+            </a:r>
+          </a:p>
+        </p:txBody>
+      </p:sp>
+      <p:sp>
+        <p:nvSpPr>
+          <p:cNvPr id="3" name="Content Placeholder 2">
+            <a:extLst>
+              <a:ext uri="{FF2B5EF4-FFF2-40B4-BE49-F238E27FC236}">
+                <a16:creationId xmlns:a16="http://schemas.microsoft.com/office/drawing/2014/main" id="{BA49079E-10A4-4BC6-9C8D-F47283E67832}"/>
+              </a:ext>
+            </a:extLst>
+          </p:cNvPr>
+          <p:cNvSpPr>
+            <a:spLocks noGrp="1"/>
+          </p:cNvSpPr>
+          <p:nvPr>
+            <p:ph idx="1"/>
+          </p:nvPr>
+        </p:nvSpPr>
+        <p:spPr>
+          <a:xfrm>
+            <a:off x="680321" y="2591397"/>
+            <a:ext cx="9613861" cy="3599316"/>
+          </a:xfrm>
+        </p:spPr>
+        <p:txBody>
+          <a:bodyPr>
+            <a:normAutofit/>
+          </a:bodyPr>
+          <a:lstStyle/>
+          <a:p>
+            <a:r>
+              <a:rPr lang="en-US" sz="2600" dirty="0"/>
+              <a:t>Dhaka is the capital of  ____________ ?</a:t>
+            </a:r>
+          </a:p>
+          <a:p>
+            <a:pPr lvl="1"/>
+            <a:r>
+              <a:rPr lang="en-US" sz="2200" dirty="0" err="1"/>
+              <a:t>Bangladeh</a:t>
+            </a:r>
+            <a:r>
+              <a:rPr lang="en-US" sz="2200" dirty="0"/>
+              <a:t> </a:t>
+            </a:r>
+          </a:p>
+          <a:p>
+            <a:pPr lvl="1"/>
+            <a:r>
+              <a:rPr lang="en-US" sz="2200" dirty="0"/>
+              <a:t>India</a:t>
+            </a:r>
+          </a:p>
+          <a:p>
+            <a:pPr lvl="1"/>
+            <a:r>
+              <a:rPr lang="en-US" sz="2200" dirty="0"/>
+              <a:t>Russia</a:t>
+            </a:r>
+          </a:p>
+          <a:p>
+            <a:pPr lvl="1"/>
+            <a:r>
+              <a:rPr lang="en-US" sz="2200" dirty="0"/>
+              <a:t>America</a:t>
+            </a:r>
+          </a:p>
+        </p:txBody>
+      </p:sp>
+    </p:spTree>
+    <p:extLst>
+      <p:ext uri="{BB962C8B-B14F-4D97-AF65-F5344CB8AC3E}">
+        <p14:creationId xmlns:p14="http://schemas.microsoft.com/office/powerpoint/2010/main" val="145720968"/>
+      </p:ext>
+    </p:extLst>
+  </p:cSld>
+  <p:clrMapOvr>
+    <a:masterClrMapping/>
+  </p:clrMapOvr>
+</p:sld>
+</file>
+
+<file path=ppt/slides/slide41.xml><?xml version="1.0" encoding="utf-8"?>
+<p:sld xmlns:a="http://schemas.openxmlformats.org/drawingml/2006/main" xmlns:r="http://schemas.openxmlformats.org/officeDocument/2006/relationships" xmlns:p="http://schemas.openxmlformats.org/presentationml/2006/main">
+  <p:cSld>
+    <p:spTree>
+      <p:nvGrpSpPr>
+        <p:cNvPr id="1" name=""/>
+        <p:cNvGrpSpPr/>
+        <p:nvPr/>
+      </p:nvGrpSpPr>
+      <p:grpSpPr>
+        <a:xfrm>
+          <a:off x="0" y="0"/>
+          <a:ext cx="0" cy="0"/>
+          <a:chOff x="0" y="0"/>
+          <a:chExt cx="0" cy="0"/>
+        </a:xfrm>
+      </p:grpSpPr>
+      <p:sp>
+        <p:nvSpPr>
+          <p:cNvPr id="2" name="Title 1">
+            <a:extLst>
+              <a:ext uri="{FF2B5EF4-FFF2-40B4-BE49-F238E27FC236}">
+                <a16:creationId xmlns:a16="http://schemas.microsoft.com/office/drawing/2014/main" id="{99F9262E-2D15-41F1-BEC3-1BDD29661926}"/>
+              </a:ext>
+            </a:extLst>
+          </p:cNvPr>
+          <p:cNvSpPr>
+            <a:spLocks noGrp="1"/>
+          </p:cNvSpPr>
+          <p:nvPr>
+            <p:ph type="title"/>
+          </p:nvPr>
+        </p:nvSpPr>
+        <p:spPr/>
+        <p:txBody>
+          <a:bodyPr/>
+          <a:lstStyle/>
+          <a:p>
+            <a:r>
+              <a:rPr lang="en-US" dirty="0"/>
+              <a:t>Language Model in NLP</a:t>
+            </a:r>
+          </a:p>
+        </p:txBody>
+      </p:sp>
+      <p:pic>
+        <p:nvPicPr>
+          <p:cNvPr id="7" name="Content Placeholder 6">
+            <a:extLst>
+              <a:ext uri="{FF2B5EF4-FFF2-40B4-BE49-F238E27FC236}">
+                <a16:creationId xmlns:a16="http://schemas.microsoft.com/office/drawing/2014/main" id="{E03D6BF8-0218-FB04-9C2F-033461A54A87}"/>
+              </a:ext>
+            </a:extLst>
+          </p:cNvPr>
+          <p:cNvPicPr>
+            <a:picLocks noGrp="1" noChangeAspect="1"/>
+          </p:cNvPicPr>
+          <p:nvPr>
+            <p:ph idx="1"/>
+          </p:nvPr>
+        </p:nvPicPr>
+        <p:blipFill rotWithShape="1">
+          <a:blip r:embed="rId2">
+            <a:extLst>
+              <a:ext uri="{28A0092B-C50C-407E-A947-70E740481C1C}">
+                <a14:useLocalDpi xmlns:a14="http://schemas.microsoft.com/office/drawing/2010/main" val="0"/>
+              </a:ext>
+            </a:extLst>
+          </a:blip>
+          <a:srcRect l="8389" t="10799" r="8562"/>
+          <a:stretch/>
+        </p:blipFill>
+        <p:spPr>
+          <a:xfrm>
+            <a:off x="6485641" y="2158737"/>
+            <a:ext cx="4572000" cy="4378707"/>
+          </a:xfrm>
+        </p:spPr>
+      </p:pic>
+      <p:sp>
+        <p:nvSpPr>
+          <p:cNvPr id="9" name="TextBox 8">
+            <a:extLst>
+              <a:ext uri="{FF2B5EF4-FFF2-40B4-BE49-F238E27FC236}">
+                <a16:creationId xmlns:a16="http://schemas.microsoft.com/office/drawing/2014/main" id="{EA59BFEE-3193-D3CB-0F5D-56CE34D52586}"/>
+              </a:ext>
+            </a:extLst>
+          </p:cNvPr>
+          <p:cNvSpPr txBox="1"/>
+          <p:nvPr/>
+        </p:nvSpPr>
+        <p:spPr>
+          <a:xfrm>
+            <a:off x="1453318" y="3824870"/>
+            <a:ext cx="3891679" cy="523220"/>
+          </a:xfrm>
+          <a:prstGeom prst="rect">
+            <a:avLst/>
+          </a:prstGeom>
+          <a:noFill/>
+        </p:spPr>
+        <p:txBody>
+          <a:bodyPr wrap="square">
+            <a:spAutoFit/>
+          </a:bodyPr>
+          <a:lstStyle/>
+          <a:p>
+            <a:r>
+              <a:rPr lang="en-US" sz="2800" dirty="0">
+                <a:solidFill>
+                  <a:srgbClr val="FFFF00"/>
+                </a:solidFill>
+              </a:rPr>
+              <a:t>Next Word Prediction</a:t>
+            </a:r>
+          </a:p>
+        </p:txBody>
+      </p:sp>
+    </p:spTree>
+    <p:extLst>
+      <p:ext uri="{BB962C8B-B14F-4D97-AF65-F5344CB8AC3E}">
+        <p14:creationId xmlns:p14="http://schemas.microsoft.com/office/powerpoint/2010/main" val="2619553973"/>
+      </p:ext>
+    </p:extLst>
+  </p:cSld>
+  <p:clrMapOvr>
+    <a:masterClrMapping/>
+  </p:clrMapOvr>
+</p:sld>
+</file>
+
+<file path=ppt/slides/slide42.xml><?xml version="1.0" encoding="utf-8"?>
+<p:sld xmlns:a="http://schemas.openxmlformats.org/drawingml/2006/main" xmlns:r="http://schemas.openxmlformats.org/officeDocument/2006/relationships" xmlns:p="http://schemas.openxmlformats.org/presentationml/2006/main">
+  <p:cSld>
+    <p:spTree>
+      <p:nvGrpSpPr>
+        <p:cNvPr id="1" name=""/>
+        <p:cNvGrpSpPr/>
+        <p:nvPr/>
+      </p:nvGrpSpPr>
+      <p:grpSpPr>
+        <a:xfrm>
+          <a:off x="0" y="0"/>
+          <a:ext cx="0" cy="0"/>
+          <a:chOff x="0" y="0"/>
+          <a:chExt cx="0" cy="0"/>
+        </a:xfrm>
+      </p:grpSpPr>
+      <p:sp>
+        <p:nvSpPr>
+          <p:cNvPr id="2" name="Title 1">
+            <a:extLst>
+              <a:ext uri="{FF2B5EF4-FFF2-40B4-BE49-F238E27FC236}">
+                <a16:creationId xmlns:a16="http://schemas.microsoft.com/office/drawing/2014/main" id="{99F9262E-2D15-41F1-BEC3-1BDD29661926}"/>
+              </a:ext>
+            </a:extLst>
+          </p:cNvPr>
+          <p:cNvSpPr>
+            <a:spLocks noGrp="1"/>
+          </p:cNvSpPr>
+          <p:nvPr>
+            <p:ph type="title"/>
+          </p:nvPr>
+        </p:nvSpPr>
+        <p:spPr/>
+        <p:txBody>
+          <a:bodyPr/>
+          <a:lstStyle/>
+          <a:p>
+            <a:r>
+              <a:rPr lang="en-US" dirty="0"/>
+              <a:t>Language Model in NLP</a:t>
+            </a:r>
+          </a:p>
+        </p:txBody>
+      </p:sp>
+      <p:sp>
+        <p:nvSpPr>
+          <p:cNvPr id="3" name="Content Placeholder 2">
+            <a:extLst>
+              <a:ext uri="{FF2B5EF4-FFF2-40B4-BE49-F238E27FC236}">
+                <a16:creationId xmlns:a16="http://schemas.microsoft.com/office/drawing/2014/main" id="{BA49079E-10A4-4BC6-9C8D-F47283E67832}"/>
+              </a:ext>
+            </a:extLst>
+          </p:cNvPr>
+          <p:cNvSpPr>
+            <a:spLocks noGrp="1"/>
+          </p:cNvSpPr>
+          <p:nvPr>
+            <p:ph idx="1"/>
+          </p:nvPr>
+        </p:nvSpPr>
+        <p:spPr/>
+        <p:txBody>
+          <a:bodyPr>
+            <a:normAutofit/>
+          </a:bodyPr>
+          <a:lstStyle/>
+          <a:p>
+            <a:r>
+              <a:rPr lang="en-US" sz="3000" dirty="0"/>
+              <a:t>Normalization is the process converting into a standard form. </a:t>
+            </a:r>
+          </a:p>
+          <a:p>
+            <a:r>
+              <a:rPr lang="en-US" sz="3000" dirty="0"/>
+              <a:t> Why required text normalization?</a:t>
+            </a:r>
+          </a:p>
+          <a:p>
+            <a:pPr lvl="1"/>
+            <a:r>
+              <a:rPr lang="en-US" sz="2600" dirty="0"/>
+              <a:t>Word boundary detection. </a:t>
+            </a:r>
+          </a:p>
+          <a:p>
+            <a:pPr lvl="1"/>
+            <a:r>
+              <a:rPr lang="en-US" sz="2600" dirty="0"/>
+              <a:t>Separated word from each other</a:t>
+            </a:r>
+          </a:p>
+          <a:p>
+            <a:pPr lvl="1"/>
+            <a:r>
+              <a:rPr lang="en-US" sz="2600" dirty="0"/>
+              <a:t>Example 1: Bangladesh, New York, Cats and dogs</a:t>
+            </a:r>
+          </a:p>
+          <a:p>
+            <a:pPr lvl="1"/>
+            <a:r>
+              <a:rPr lang="en-US" sz="2600" dirty="0"/>
+              <a:t>Example 2: #nlp, @faisalahmed, </a:t>
+            </a:r>
+            <a:r>
+              <a:rPr lang="en-US" sz="2600" dirty="0">
+                <a:sym typeface="Wingdings" panose="05000000000000000000" pitchFamily="2" charset="2"/>
+              </a:rPr>
+              <a:t>, , :)</a:t>
+            </a:r>
+            <a:r>
+              <a:rPr lang="en-US" sz="2600" dirty="0"/>
+              <a:t> </a:t>
+            </a:r>
+          </a:p>
+        </p:txBody>
+      </p:sp>
+    </p:spTree>
+    <p:extLst>
+      <p:ext uri="{BB962C8B-B14F-4D97-AF65-F5344CB8AC3E}">
+        <p14:creationId xmlns:p14="http://schemas.microsoft.com/office/powerpoint/2010/main" val="2306804656"/>
       </p:ext>
     </p:extLst>
   </p:cSld>

</xml_diff>

<commit_message>
add smoothing add 1
</commit_message>
<xml_diff>
--- a/docs/NLP_bangla_tutorial.pptx
+++ b/docs/NLP_bangla_tutorial.pptx
@@ -5,7 +5,7 @@
     <p:sldMasterId id="2147483714" r:id="rId1"/>
   </p:sldMasterIdLst>
   <p:notesMasterIdLst>
-    <p:notesMasterId r:id="rId68"/>
+    <p:notesMasterId r:id="rId76"/>
   </p:notesMasterIdLst>
   <p:sldIdLst>
     <p:sldId id="256" r:id="rId2"/>
@@ -74,6 +74,14 @@
     <p:sldId id="325" r:id="rId65"/>
     <p:sldId id="326" r:id="rId66"/>
     <p:sldId id="327" r:id="rId67"/>
+    <p:sldId id="328" r:id="rId68"/>
+    <p:sldId id="329" r:id="rId69"/>
+    <p:sldId id="332" r:id="rId70"/>
+    <p:sldId id="330" r:id="rId71"/>
+    <p:sldId id="331" r:id="rId72"/>
+    <p:sldId id="333" r:id="rId73"/>
+    <p:sldId id="335" r:id="rId74"/>
+    <p:sldId id="334" r:id="rId75"/>
   </p:sldIdLst>
   <p:sldSz cx="12192000" cy="6858000"/>
   <p:notesSz cx="6858000" cy="9144000"/>
@@ -262,7 +270,7 @@
           <a:p>
             <a:fld id="{96AD9802-0A85-4765-BF39-BA9BC36B4F1A}" type="datetimeFigureOut">
               <a:rPr lang="en-US" smtClean="0"/>
-              <a:t>12/17/2023</a:t>
+              <a:t>3/6/2024</a:t>
             </a:fld>
             <a:endParaRPr lang="en-US"/>
           </a:p>
@@ -949,6 +957,114 @@
 </p:notes>
 </file>
 
+<file path=ppt/notesSlides/notesSlide6.xml><?xml version="1.0" encoding="utf-8"?>
+<p:notes xmlns:a="http://schemas.openxmlformats.org/drawingml/2006/main" xmlns:r="http://schemas.openxmlformats.org/officeDocument/2006/relationships" xmlns:p="http://schemas.openxmlformats.org/presentationml/2006/main">
+  <p:cSld>
+    <p:spTree>
+      <p:nvGrpSpPr>
+        <p:cNvPr id="1" name="">
+          <a:extLst>
+            <a:ext uri="{FF2B5EF4-FFF2-40B4-BE49-F238E27FC236}">
+              <a16:creationId xmlns:a16="http://schemas.microsoft.com/office/drawing/2014/main" id="{6CC7058B-E849-C25F-5634-902A72F52C77}"/>
+            </a:ext>
+          </a:extLst>
+        </p:cNvPr>
+        <p:cNvGrpSpPr/>
+        <p:nvPr/>
+      </p:nvGrpSpPr>
+      <p:grpSpPr>
+        <a:xfrm>
+          <a:off x="0" y="0"/>
+          <a:ext cx="0" cy="0"/>
+          <a:chOff x="0" y="0"/>
+          <a:chExt cx="0" cy="0"/>
+        </a:xfrm>
+      </p:grpSpPr>
+      <p:sp>
+        <p:nvSpPr>
+          <p:cNvPr id="2" name="Slide Image Placeholder 1">
+            <a:extLst>
+              <a:ext uri="{FF2B5EF4-FFF2-40B4-BE49-F238E27FC236}">
+                <a16:creationId xmlns:a16="http://schemas.microsoft.com/office/drawing/2014/main" id="{4BBD2E28-90ED-8B61-1D3C-66D2A0D5CEDE}"/>
+              </a:ext>
+            </a:extLst>
+          </p:cNvPr>
+          <p:cNvSpPr>
+            <a:spLocks noGrp="1" noRot="1" noChangeAspect="1"/>
+          </p:cNvSpPr>
+          <p:nvPr>
+            <p:ph type="sldImg"/>
+          </p:nvPr>
+        </p:nvSpPr>
+        <p:spPr/>
+      </p:sp>
+      <p:sp>
+        <p:nvSpPr>
+          <p:cNvPr id="3" name="Notes Placeholder 2">
+            <a:extLst>
+              <a:ext uri="{FF2B5EF4-FFF2-40B4-BE49-F238E27FC236}">
+                <a16:creationId xmlns:a16="http://schemas.microsoft.com/office/drawing/2014/main" id="{A9CB4775-C6FF-3732-FEB5-18A2FFC7B9D0}"/>
+              </a:ext>
+            </a:extLst>
+          </p:cNvPr>
+          <p:cNvSpPr>
+            <a:spLocks noGrp="1"/>
+          </p:cNvSpPr>
+          <p:nvPr>
+            <p:ph type="body" idx="1"/>
+          </p:nvPr>
+        </p:nvSpPr>
+        <p:spPr/>
+        <p:txBody>
+          <a:bodyPr/>
+          <a:lstStyle/>
+          <a:p>
+            <a:endParaRPr lang="en-US" dirty="0"/>
+          </a:p>
+        </p:txBody>
+      </p:sp>
+      <p:sp>
+        <p:nvSpPr>
+          <p:cNvPr id="4" name="Slide Number Placeholder 3">
+            <a:extLst>
+              <a:ext uri="{FF2B5EF4-FFF2-40B4-BE49-F238E27FC236}">
+                <a16:creationId xmlns:a16="http://schemas.microsoft.com/office/drawing/2014/main" id="{BCFA6BF0-0988-CFE9-4F41-E32C335616AD}"/>
+              </a:ext>
+            </a:extLst>
+          </p:cNvPr>
+          <p:cNvSpPr>
+            <a:spLocks noGrp="1"/>
+          </p:cNvSpPr>
+          <p:nvPr>
+            <p:ph type="sldNum" sz="quarter" idx="5"/>
+          </p:nvPr>
+        </p:nvSpPr>
+        <p:spPr/>
+        <p:txBody>
+          <a:bodyPr/>
+          <a:lstStyle/>
+          <a:p>
+            <a:fld id="{E5D78A92-9FB4-49BB-8807-D41DD3297BDA}" type="slidenum">
+              <a:rPr lang="en-US" smtClean="0"/>
+              <a:t>69</a:t>
+            </a:fld>
+            <a:endParaRPr lang="en-US"/>
+          </a:p>
+        </p:txBody>
+      </p:sp>
+    </p:spTree>
+    <p:extLst>
+      <p:ext uri="{BB962C8B-B14F-4D97-AF65-F5344CB8AC3E}">
+        <p14:creationId xmlns:p14="http://schemas.microsoft.com/office/powerpoint/2010/main" val="2856345301"/>
+      </p:ext>
+    </p:extLst>
+  </p:cSld>
+  <p:clrMapOvr>
+    <a:masterClrMapping/>
+  </p:clrMapOvr>
+</p:notes>
+</file>
+
 <file path=ppt/slideLayouts/slideLayout1.xml><?xml version="1.0" encoding="utf-8"?>
 <p:sldLayout xmlns:a="http://schemas.openxmlformats.org/drawingml/2006/main" xmlns:r="http://schemas.openxmlformats.org/officeDocument/2006/relationships" xmlns:p="http://schemas.openxmlformats.org/presentationml/2006/main" type="title" preserve="1">
   <p:cSld name="Title Slide">
@@ -1223,7 +1339,7 @@
           <a:p>
             <a:fld id="{4D9800FF-A981-4B9F-BC27-EEE0445CCC0D}" type="datetimeFigureOut">
               <a:rPr lang="en-US" smtClean="0"/>
-              <a:t>12/17/2023</a:t>
+              <a:t>3/6/2024</a:t>
             </a:fld>
             <a:endParaRPr lang="en-US"/>
           </a:p>
@@ -1637,7 +1753,7 @@
           <a:p>
             <a:fld id="{4D9800FF-A981-4B9F-BC27-EEE0445CCC0D}" type="datetimeFigureOut">
               <a:rPr lang="en-US" smtClean="0"/>
-              <a:t>12/17/2023</a:t>
+              <a:t>3/6/2024</a:t>
             </a:fld>
             <a:endParaRPr lang="en-US"/>
           </a:p>
@@ -1973,7 +2089,7 @@
           <a:p>
             <a:fld id="{4D9800FF-A981-4B9F-BC27-EEE0445CCC0D}" type="datetimeFigureOut">
               <a:rPr lang="en-US" smtClean="0"/>
-              <a:t>12/17/2023</a:t>
+              <a:t>3/6/2024</a:t>
             </a:fld>
             <a:endParaRPr lang="en-US"/>
           </a:p>
@@ -2378,7 +2494,7 @@
           <a:p>
             <a:fld id="{4D9800FF-A981-4B9F-BC27-EEE0445CCC0D}" type="datetimeFigureOut">
               <a:rPr lang="en-US" smtClean="0"/>
-              <a:t>12/17/2023</a:t>
+              <a:t>3/6/2024</a:t>
             </a:fld>
             <a:endParaRPr lang="en-US"/>
           </a:p>
@@ -2946,7 +3062,7 @@
           <a:p>
             <a:fld id="{4D9800FF-A981-4B9F-BC27-EEE0445CCC0D}" type="datetimeFigureOut">
               <a:rPr lang="en-US" smtClean="0"/>
-              <a:t>12/17/2023</a:t>
+              <a:t>3/6/2024</a:t>
             </a:fld>
             <a:endParaRPr lang="en-US"/>
           </a:p>
@@ -3627,7 +3743,7 @@
           <a:p>
             <a:fld id="{4D9800FF-A981-4B9F-BC27-EEE0445CCC0D}" type="datetimeFigureOut">
               <a:rPr lang="en-US" smtClean="0"/>
-              <a:t>12/17/2023</a:t>
+              <a:t>3/6/2024</a:t>
             </a:fld>
             <a:endParaRPr lang="en-US"/>
           </a:p>
@@ -4540,7 +4656,7 @@
           <a:p>
             <a:fld id="{4D9800FF-A981-4B9F-BC27-EEE0445CCC0D}" type="datetimeFigureOut">
               <a:rPr lang="en-US" smtClean="0"/>
-              <a:t>12/17/2023</a:t>
+              <a:t>3/6/2024</a:t>
             </a:fld>
             <a:endParaRPr lang="en-US"/>
           </a:p>
@@ -4853,7 +4969,7 @@
           <a:p>
             <a:fld id="{4D9800FF-A981-4B9F-BC27-EEE0445CCC0D}" type="datetimeFigureOut">
               <a:rPr lang="en-US" smtClean="0"/>
-              <a:t>12/17/2023</a:t>
+              <a:t>3/6/2024</a:t>
             </a:fld>
             <a:endParaRPr lang="en-US"/>
           </a:p>
@@ -5117,7 +5233,7 @@
           <a:p>
             <a:fld id="{4D9800FF-A981-4B9F-BC27-EEE0445CCC0D}" type="datetimeFigureOut">
               <a:rPr lang="en-US" smtClean="0"/>
-              <a:t>12/17/2023</a:t>
+              <a:t>3/6/2024</a:t>
             </a:fld>
             <a:endParaRPr lang="en-US"/>
           </a:p>
@@ -5440,7 +5556,7 @@
           <a:p>
             <a:fld id="{4D9800FF-A981-4B9F-BC27-EEE0445CCC0D}" type="datetimeFigureOut">
               <a:rPr lang="en-US" smtClean="0"/>
-              <a:t>12/17/2023</a:t>
+              <a:t>3/6/2024</a:t>
             </a:fld>
             <a:endParaRPr lang="en-US"/>
           </a:p>
@@ -5829,7 +5945,7 @@
           <a:p>
             <a:fld id="{4D9800FF-A981-4B9F-BC27-EEE0445CCC0D}" type="datetimeFigureOut">
               <a:rPr lang="en-US" smtClean="0"/>
-              <a:t>12/17/2023</a:t>
+              <a:t>3/6/2024</a:t>
             </a:fld>
             <a:endParaRPr lang="en-US"/>
           </a:p>
@@ -6205,7 +6321,7 @@
           <a:p>
             <a:fld id="{4D9800FF-A981-4B9F-BC27-EEE0445CCC0D}" type="datetimeFigureOut">
               <a:rPr lang="en-US" smtClean="0"/>
-              <a:t>12/17/2023</a:t>
+              <a:t>3/6/2024</a:t>
             </a:fld>
             <a:endParaRPr lang="en-US"/>
           </a:p>
@@ -6711,7 +6827,7 @@
           <a:p>
             <a:fld id="{4D9800FF-A981-4B9F-BC27-EEE0445CCC0D}" type="datetimeFigureOut">
               <a:rPr lang="en-US" smtClean="0"/>
-              <a:t>12/17/2023</a:t>
+              <a:t>3/6/2024</a:t>
             </a:fld>
             <a:endParaRPr lang="en-US"/>
           </a:p>
@@ -6968,7 +7084,7 @@
           <a:p>
             <a:fld id="{4D9800FF-A981-4B9F-BC27-EEE0445CCC0D}" type="datetimeFigureOut">
               <a:rPr lang="en-US" smtClean="0"/>
-              <a:t>12/17/2023</a:t>
+              <a:t>3/6/2024</a:t>
             </a:fld>
             <a:endParaRPr lang="en-US"/>
           </a:p>
@@ -7131,7 +7247,7 @@
           <a:p>
             <a:fld id="{4D9800FF-A981-4B9F-BC27-EEE0445CCC0D}" type="datetimeFigureOut">
               <a:rPr lang="en-US" smtClean="0"/>
-              <a:t>12/17/2023</a:t>
+              <a:t>3/6/2024</a:t>
             </a:fld>
             <a:endParaRPr lang="en-US"/>
           </a:p>
@@ -7521,7 +7637,7 @@
           <a:p>
             <a:fld id="{4D9800FF-A981-4B9F-BC27-EEE0445CCC0D}" type="datetimeFigureOut">
               <a:rPr lang="en-US" smtClean="0"/>
-              <a:t>12/17/2023</a:t>
+              <a:t>3/6/2024</a:t>
             </a:fld>
             <a:endParaRPr lang="en-US"/>
           </a:p>
@@ -7930,7 +8046,7 @@
           <a:p>
             <a:fld id="{4D9800FF-A981-4B9F-BC27-EEE0445CCC0D}" type="datetimeFigureOut">
               <a:rPr lang="en-US" smtClean="0"/>
-              <a:t>12/17/2023</a:t>
+              <a:t>3/6/2024</a:t>
             </a:fld>
             <a:endParaRPr lang="en-US"/>
           </a:p>
@@ -8174,7 +8290,7 @@
           <a:p>
             <a:fld id="{4D9800FF-A981-4B9F-BC27-EEE0445CCC0D}" type="datetimeFigureOut">
               <a:rPr lang="en-US" smtClean="0"/>
-              <a:t>12/17/2023</a:t>
+              <a:t>3/6/2024</a:t>
             </a:fld>
             <a:endParaRPr lang="en-US"/>
           </a:p>
@@ -34426,6 +34542,1381 @@
 </p:sld>
 </file>
 
+<file path=ppt/slides/slide67.xml><?xml version="1.0" encoding="utf-8"?>
+<p:sld xmlns:a="http://schemas.openxmlformats.org/drawingml/2006/main" xmlns:r="http://schemas.openxmlformats.org/officeDocument/2006/relationships" xmlns:p="http://schemas.openxmlformats.org/presentationml/2006/main">
+  <p:cSld>
+    <p:spTree>
+      <p:nvGrpSpPr>
+        <p:cNvPr id="1" name="">
+          <a:extLst>
+            <a:ext uri="{FF2B5EF4-FFF2-40B4-BE49-F238E27FC236}">
+              <a16:creationId xmlns:a16="http://schemas.microsoft.com/office/drawing/2014/main" id="{A217F8BC-B960-EBCC-97B2-4FEB3A7E192B}"/>
+            </a:ext>
+          </a:extLst>
+        </p:cNvPr>
+        <p:cNvGrpSpPr/>
+        <p:nvPr/>
+      </p:nvGrpSpPr>
+      <p:grpSpPr>
+        <a:xfrm>
+          <a:off x="0" y="0"/>
+          <a:ext cx="0" cy="0"/>
+          <a:chOff x="0" y="0"/>
+          <a:chExt cx="0" cy="0"/>
+        </a:xfrm>
+      </p:grpSpPr>
+      <p:sp>
+        <p:nvSpPr>
+          <p:cNvPr id="2" name="Title 1">
+            <a:extLst>
+              <a:ext uri="{FF2B5EF4-FFF2-40B4-BE49-F238E27FC236}">
+                <a16:creationId xmlns:a16="http://schemas.microsoft.com/office/drawing/2014/main" id="{9C60F3A5-4C13-D600-D0E8-711FEA85E848}"/>
+              </a:ext>
+            </a:extLst>
+          </p:cNvPr>
+          <p:cNvSpPr>
+            <a:spLocks noGrp="1"/>
+          </p:cNvSpPr>
+          <p:nvPr>
+            <p:ph type="ctrTitle"/>
+          </p:nvPr>
+        </p:nvSpPr>
+        <p:spPr/>
+        <p:txBody>
+          <a:bodyPr/>
+          <a:lstStyle/>
+          <a:p>
+            <a:r>
+              <a:rPr lang="en-US" sz="4400" dirty="0"/>
+              <a:t>Smoothing</a:t>
+            </a:r>
+            <a:br>
+              <a:rPr lang="en-US" dirty="0"/>
+            </a:br>
+            <a:r>
+              <a:rPr lang="en-US" sz="2800" dirty="0">
+                <a:solidFill>
+                  <a:srgbClr val="FF0000"/>
+                </a:solidFill>
+              </a:rPr>
+              <a:t>Language Models</a:t>
+            </a:r>
+          </a:p>
+        </p:txBody>
+      </p:sp>
+      <p:sp>
+        <p:nvSpPr>
+          <p:cNvPr id="3" name="Subtitle 2">
+            <a:extLst>
+              <a:ext uri="{FF2B5EF4-FFF2-40B4-BE49-F238E27FC236}">
+                <a16:creationId xmlns:a16="http://schemas.microsoft.com/office/drawing/2014/main" id="{421F6270-F902-F171-BA9E-32527F919635}"/>
+              </a:ext>
+            </a:extLst>
+          </p:cNvPr>
+          <p:cNvSpPr>
+            <a:spLocks noGrp="1"/>
+          </p:cNvSpPr>
+          <p:nvPr>
+            <p:ph type="subTitle" idx="1"/>
+          </p:nvPr>
+        </p:nvSpPr>
+        <p:spPr>
+          <a:xfrm>
+            <a:off x="1062877" y="4422031"/>
+            <a:ext cx="8144134" cy="1117687"/>
+          </a:xfrm>
+        </p:spPr>
+        <p:txBody>
+          <a:bodyPr>
+            <a:normAutofit/>
+          </a:bodyPr>
+          <a:lstStyle/>
+          <a:p>
+            <a:r>
+              <a:rPr lang="en-US" sz="2600" dirty="0"/>
+              <a:t>Natural Language Processing </a:t>
+            </a:r>
+          </a:p>
+        </p:txBody>
+      </p:sp>
+      <p:sp>
+        <p:nvSpPr>
+          <p:cNvPr id="6" name="TextBox 5">
+            <a:extLst>
+              <a:ext uri="{FF2B5EF4-FFF2-40B4-BE49-F238E27FC236}">
+                <a16:creationId xmlns:a16="http://schemas.microsoft.com/office/drawing/2014/main" id="{66830B98-259D-EE7D-6100-C921E325DF9D}"/>
+              </a:ext>
+            </a:extLst>
+          </p:cNvPr>
+          <p:cNvSpPr txBox="1"/>
+          <p:nvPr/>
+        </p:nvSpPr>
+        <p:spPr>
+          <a:xfrm>
+            <a:off x="7685202" y="6395243"/>
+            <a:ext cx="6094428" cy="369332"/>
+          </a:xfrm>
+          <a:prstGeom prst="rect">
+            <a:avLst/>
+          </a:prstGeom>
+          <a:noFill/>
+        </p:spPr>
+        <p:txBody>
+          <a:bodyPr wrap="square">
+            <a:spAutoFit/>
+          </a:bodyPr>
+          <a:lstStyle/>
+          <a:p>
+            <a:r>
+              <a:rPr lang="en-US" dirty="0"/>
+              <a:t>https://web.stanford.edu/~jurafsky/slp3/</a:t>
+            </a:r>
+          </a:p>
+        </p:txBody>
+      </p:sp>
+    </p:spTree>
+    <p:extLst>
+      <p:ext uri="{BB962C8B-B14F-4D97-AF65-F5344CB8AC3E}">
+        <p14:creationId xmlns:p14="http://schemas.microsoft.com/office/powerpoint/2010/main" val="9763680"/>
+      </p:ext>
+    </p:extLst>
+  </p:cSld>
+  <p:clrMapOvr>
+    <a:masterClrMapping/>
+  </p:clrMapOvr>
+</p:sld>
+</file>
+
+<file path=ppt/slides/slide68.xml><?xml version="1.0" encoding="utf-8"?>
+<p:sld xmlns:a="http://schemas.openxmlformats.org/drawingml/2006/main" xmlns:r="http://schemas.openxmlformats.org/officeDocument/2006/relationships" xmlns:p="http://schemas.openxmlformats.org/presentationml/2006/main">
+  <p:cSld>
+    <p:spTree>
+      <p:nvGrpSpPr>
+        <p:cNvPr id="1" name=""/>
+        <p:cNvGrpSpPr/>
+        <p:nvPr/>
+      </p:nvGrpSpPr>
+      <p:grpSpPr>
+        <a:xfrm>
+          <a:off x="0" y="0"/>
+          <a:ext cx="0" cy="0"/>
+          <a:chOff x="0" y="0"/>
+          <a:chExt cx="0" cy="0"/>
+        </a:xfrm>
+      </p:grpSpPr>
+      <p:sp>
+        <p:nvSpPr>
+          <p:cNvPr id="2" name="Title 1">
+            <a:extLst>
+              <a:ext uri="{FF2B5EF4-FFF2-40B4-BE49-F238E27FC236}">
+                <a16:creationId xmlns:a16="http://schemas.microsoft.com/office/drawing/2014/main" id="{86508C09-7878-5E0C-6127-79170D54AB6E}"/>
+              </a:ext>
+            </a:extLst>
+          </p:cNvPr>
+          <p:cNvSpPr>
+            <a:spLocks noGrp="1"/>
+          </p:cNvSpPr>
+          <p:nvPr>
+            <p:ph type="title"/>
+          </p:nvPr>
+        </p:nvSpPr>
+        <p:spPr/>
+        <p:txBody>
+          <a:bodyPr/>
+          <a:lstStyle/>
+          <a:p>
+            <a:r>
+              <a:rPr lang="en-US" dirty="0"/>
+              <a:t>Smoothing in language models</a:t>
+            </a:r>
+          </a:p>
+        </p:txBody>
+      </p:sp>
+      <p:sp>
+        <p:nvSpPr>
+          <p:cNvPr id="5" name="Content Placeholder 3">
+            <a:extLst>
+              <a:ext uri="{FF2B5EF4-FFF2-40B4-BE49-F238E27FC236}">
+                <a16:creationId xmlns:a16="http://schemas.microsoft.com/office/drawing/2014/main" id="{8A049EA7-903B-EC10-0671-19273B3DDCD4}"/>
+              </a:ext>
+            </a:extLst>
+          </p:cNvPr>
+          <p:cNvSpPr txBox="1">
+            <a:spLocks/>
+          </p:cNvSpPr>
+          <p:nvPr/>
+        </p:nvSpPr>
+        <p:spPr>
+          <a:xfrm>
+            <a:off x="5461853" y="3216634"/>
+            <a:ext cx="1268297" cy="424732"/>
+          </a:xfrm>
+          <a:prstGeom prst="rect">
+            <a:avLst/>
+          </a:prstGeom>
+          <a:noFill/>
+        </p:spPr>
+        <p:txBody>
+          <a:bodyPr vert="horz" wrap="none" lIns="91440" tIns="45720" rIns="91440" bIns="45720" rtlCol="0">
+            <a:spAutoFit/>
+          </a:bodyPr>
+          <a:lstStyle>
+            <a:lvl1pPr marL="228600" indent="-228600" algn="l" defTabSz="914400" rtl="0" eaLnBrk="1" latinLnBrk="0" hangingPunct="1">
+              <a:lnSpc>
+                <a:spcPct val="90000"/>
+              </a:lnSpc>
+              <a:spcBef>
+                <a:spcPts val="1000"/>
+              </a:spcBef>
+              <a:buFont typeface="Arial" panose="020B0604020202020204" pitchFamily="34" charset="0"/>
+              <a:buChar char="•"/>
+              <a:defRPr sz="2400" kern="1200">
+                <a:solidFill>
+                  <a:schemeClr val="tx1"/>
+                </a:solidFill>
+                <a:latin typeface="+mn-lt"/>
+                <a:ea typeface="+mn-ea"/>
+                <a:cs typeface="+mn-cs"/>
+              </a:defRPr>
+            </a:lvl1pPr>
+            <a:lvl2pPr marL="685800" indent="-228600" algn="l" defTabSz="914400" rtl="0" eaLnBrk="1" latinLnBrk="0" hangingPunct="1">
+              <a:lnSpc>
+                <a:spcPct val="90000"/>
+              </a:lnSpc>
+              <a:spcBef>
+                <a:spcPts val="500"/>
+              </a:spcBef>
+              <a:buFont typeface="Arial" panose="020B0604020202020204" pitchFamily="34" charset="0"/>
+              <a:buChar char="•"/>
+              <a:defRPr sz="2000" kern="1200">
+                <a:solidFill>
+                  <a:schemeClr val="tx1"/>
+                </a:solidFill>
+                <a:latin typeface="+mn-lt"/>
+                <a:ea typeface="+mn-ea"/>
+                <a:cs typeface="+mn-cs"/>
+              </a:defRPr>
+            </a:lvl2pPr>
+            <a:lvl3pPr marL="1143000" indent="-228600" algn="l" defTabSz="914400" rtl="0" eaLnBrk="1" latinLnBrk="0" hangingPunct="1">
+              <a:lnSpc>
+                <a:spcPct val="90000"/>
+              </a:lnSpc>
+              <a:spcBef>
+                <a:spcPts val="500"/>
+              </a:spcBef>
+              <a:buFont typeface="Arial" panose="020B0604020202020204" pitchFamily="34" charset="0"/>
+              <a:buChar char="•"/>
+              <a:defRPr sz="1800" kern="1200">
+                <a:solidFill>
+                  <a:schemeClr val="tx1"/>
+                </a:solidFill>
+                <a:latin typeface="+mn-lt"/>
+                <a:ea typeface="+mn-ea"/>
+                <a:cs typeface="+mn-cs"/>
+              </a:defRPr>
+            </a:lvl3pPr>
+            <a:lvl4pPr marL="1600200" indent="-228600" algn="l" defTabSz="914400" rtl="0" eaLnBrk="1" latinLnBrk="0" hangingPunct="1">
+              <a:lnSpc>
+                <a:spcPct val="90000"/>
+              </a:lnSpc>
+              <a:spcBef>
+                <a:spcPts val="500"/>
+              </a:spcBef>
+              <a:buFont typeface="Arial" panose="020B0604020202020204" pitchFamily="34" charset="0"/>
+              <a:buChar char="•"/>
+              <a:defRPr sz="1600" kern="1200">
+                <a:solidFill>
+                  <a:schemeClr val="tx1"/>
+                </a:solidFill>
+                <a:latin typeface="+mn-lt"/>
+                <a:ea typeface="+mn-ea"/>
+                <a:cs typeface="+mn-cs"/>
+              </a:defRPr>
+            </a:lvl4pPr>
+            <a:lvl5pPr marL="2057400" indent="-228600" algn="l" defTabSz="914400" rtl="0" eaLnBrk="1" latinLnBrk="0" hangingPunct="1">
+              <a:lnSpc>
+                <a:spcPct val="90000"/>
+              </a:lnSpc>
+              <a:spcBef>
+                <a:spcPts val="500"/>
+              </a:spcBef>
+              <a:buFont typeface="Arial" panose="020B0604020202020204" pitchFamily="34" charset="0"/>
+              <a:buChar char="•"/>
+              <a:defRPr sz="1600" kern="1200">
+                <a:solidFill>
+                  <a:schemeClr val="tx1"/>
+                </a:solidFill>
+                <a:latin typeface="+mn-lt"/>
+                <a:ea typeface="+mn-ea"/>
+                <a:cs typeface="+mn-cs"/>
+              </a:defRPr>
+            </a:lvl5pPr>
+            <a:lvl6pPr marL="2514600" indent="-228600" algn="l" defTabSz="914400" rtl="0" eaLnBrk="1" latinLnBrk="0" hangingPunct="1">
+              <a:lnSpc>
+                <a:spcPct val="90000"/>
+              </a:lnSpc>
+              <a:spcBef>
+                <a:spcPts val="500"/>
+              </a:spcBef>
+              <a:buFont typeface="Arial" panose="020B0604020202020204" pitchFamily="34" charset="0"/>
+              <a:buChar char="•"/>
+              <a:defRPr sz="1400" kern="1200">
+                <a:solidFill>
+                  <a:schemeClr val="tx1"/>
+                </a:solidFill>
+                <a:latin typeface="+mn-lt"/>
+                <a:ea typeface="+mn-ea"/>
+                <a:cs typeface="+mn-cs"/>
+              </a:defRPr>
+            </a:lvl6pPr>
+            <a:lvl7pPr marL="2971800" indent="-228600" algn="l" defTabSz="914400" rtl="0" eaLnBrk="1" latinLnBrk="0" hangingPunct="1">
+              <a:lnSpc>
+                <a:spcPct val="90000"/>
+              </a:lnSpc>
+              <a:spcBef>
+                <a:spcPts val="500"/>
+              </a:spcBef>
+              <a:buFont typeface="Arial" panose="020B0604020202020204" pitchFamily="34" charset="0"/>
+              <a:buChar char="•"/>
+              <a:defRPr sz="1400" kern="1200">
+                <a:solidFill>
+                  <a:schemeClr val="tx1"/>
+                </a:solidFill>
+                <a:latin typeface="+mn-lt"/>
+                <a:ea typeface="+mn-ea"/>
+                <a:cs typeface="+mn-cs"/>
+              </a:defRPr>
+            </a:lvl7pPr>
+            <a:lvl8pPr marL="3429000" indent="-228600" algn="l" defTabSz="914400" rtl="0" eaLnBrk="1" latinLnBrk="0" hangingPunct="1">
+              <a:lnSpc>
+                <a:spcPct val="90000"/>
+              </a:lnSpc>
+              <a:spcBef>
+                <a:spcPts val="500"/>
+              </a:spcBef>
+              <a:buFont typeface="Arial" panose="020B0604020202020204" pitchFamily="34" charset="0"/>
+              <a:buChar char="•"/>
+              <a:defRPr sz="1400" kern="1200">
+                <a:solidFill>
+                  <a:schemeClr val="tx1"/>
+                </a:solidFill>
+                <a:latin typeface="+mn-lt"/>
+                <a:ea typeface="+mn-ea"/>
+                <a:cs typeface="+mn-cs"/>
+              </a:defRPr>
+            </a:lvl8pPr>
+            <a:lvl9pPr marL="3886200" indent="-228600" algn="l" defTabSz="914400" rtl="0" eaLnBrk="1" latinLnBrk="0" hangingPunct="1">
+              <a:lnSpc>
+                <a:spcPct val="90000"/>
+              </a:lnSpc>
+              <a:spcBef>
+                <a:spcPts val="500"/>
+              </a:spcBef>
+              <a:buFont typeface="Arial" panose="020B0604020202020204" pitchFamily="34" charset="0"/>
+              <a:buChar char="•"/>
+              <a:defRPr sz="1400" kern="1200">
+                <a:solidFill>
+                  <a:schemeClr val="tx1"/>
+                </a:solidFill>
+                <a:latin typeface="+mn-lt"/>
+                <a:ea typeface="+mn-ea"/>
+                <a:cs typeface="+mn-cs"/>
+              </a:defRPr>
+            </a:lvl9pPr>
+          </a:lstStyle>
+          <a:p>
+            <a:pPr marL="0" indent="0" algn="ctr">
+              <a:buFont typeface="Arial" panose="020B0604020202020204" pitchFamily="34" charset="0"/>
+              <a:buNone/>
+            </a:pPr>
+            <a:r>
+              <a:rPr lang="en-US" dirty="0">
+                <a:solidFill>
+                  <a:srgbClr val="FFFF00"/>
+                </a:solidFill>
+              </a:rPr>
+              <a:t>Context</a:t>
+            </a:r>
+          </a:p>
+        </p:txBody>
+      </p:sp>
+      <p:sp>
+        <p:nvSpPr>
+          <p:cNvPr id="6" name="Content Placeholder 3">
+            <a:extLst>
+              <a:ext uri="{FF2B5EF4-FFF2-40B4-BE49-F238E27FC236}">
+                <a16:creationId xmlns:a16="http://schemas.microsoft.com/office/drawing/2014/main" id="{CC184151-2242-B1EA-3E95-17323F4C8D7D}"/>
+              </a:ext>
+            </a:extLst>
+          </p:cNvPr>
+          <p:cNvSpPr txBox="1">
+            <a:spLocks/>
+          </p:cNvSpPr>
+          <p:nvPr/>
+        </p:nvSpPr>
+        <p:spPr>
+          <a:xfrm>
+            <a:off x="2162549" y="5912845"/>
+            <a:ext cx="867418" cy="424732"/>
+          </a:xfrm>
+          <a:prstGeom prst="rect">
+            <a:avLst/>
+          </a:prstGeom>
+          <a:noFill/>
+        </p:spPr>
+        <p:txBody>
+          <a:bodyPr vert="horz" wrap="none" lIns="91440" tIns="45720" rIns="91440" bIns="45720" rtlCol="0">
+            <a:spAutoFit/>
+          </a:bodyPr>
+          <a:lstStyle>
+            <a:lvl1pPr marL="228600" indent="-228600" algn="l" defTabSz="914400" rtl="0" eaLnBrk="1" latinLnBrk="0" hangingPunct="1">
+              <a:lnSpc>
+                <a:spcPct val="90000"/>
+              </a:lnSpc>
+              <a:spcBef>
+                <a:spcPts val="1000"/>
+              </a:spcBef>
+              <a:buFont typeface="Arial" panose="020B0604020202020204" pitchFamily="34" charset="0"/>
+              <a:buChar char="•"/>
+              <a:defRPr sz="2400" kern="1200">
+                <a:solidFill>
+                  <a:schemeClr val="tx1"/>
+                </a:solidFill>
+                <a:latin typeface="+mn-lt"/>
+                <a:ea typeface="+mn-ea"/>
+                <a:cs typeface="+mn-cs"/>
+              </a:defRPr>
+            </a:lvl1pPr>
+            <a:lvl2pPr marL="685800" indent="-228600" algn="l" defTabSz="914400" rtl="0" eaLnBrk="1" latinLnBrk="0" hangingPunct="1">
+              <a:lnSpc>
+                <a:spcPct val="90000"/>
+              </a:lnSpc>
+              <a:spcBef>
+                <a:spcPts val="500"/>
+              </a:spcBef>
+              <a:buFont typeface="Arial" panose="020B0604020202020204" pitchFamily="34" charset="0"/>
+              <a:buChar char="•"/>
+              <a:defRPr sz="2000" kern="1200">
+                <a:solidFill>
+                  <a:schemeClr val="tx1"/>
+                </a:solidFill>
+                <a:latin typeface="+mn-lt"/>
+                <a:ea typeface="+mn-ea"/>
+                <a:cs typeface="+mn-cs"/>
+              </a:defRPr>
+            </a:lvl2pPr>
+            <a:lvl3pPr marL="1143000" indent="-228600" algn="l" defTabSz="914400" rtl="0" eaLnBrk="1" latinLnBrk="0" hangingPunct="1">
+              <a:lnSpc>
+                <a:spcPct val="90000"/>
+              </a:lnSpc>
+              <a:spcBef>
+                <a:spcPts val="500"/>
+              </a:spcBef>
+              <a:buFont typeface="Arial" panose="020B0604020202020204" pitchFamily="34" charset="0"/>
+              <a:buChar char="•"/>
+              <a:defRPr sz="1800" kern="1200">
+                <a:solidFill>
+                  <a:schemeClr val="tx1"/>
+                </a:solidFill>
+                <a:latin typeface="+mn-lt"/>
+                <a:ea typeface="+mn-ea"/>
+                <a:cs typeface="+mn-cs"/>
+              </a:defRPr>
+            </a:lvl3pPr>
+            <a:lvl4pPr marL="1600200" indent="-228600" algn="l" defTabSz="914400" rtl="0" eaLnBrk="1" latinLnBrk="0" hangingPunct="1">
+              <a:lnSpc>
+                <a:spcPct val="90000"/>
+              </a:lnSpc>
+              <a:spcBef>
+                <a:spcPts val="500"/>
+              </a:spcBef>
+              <a:buFont typeface="Arial" panose="020B0604020202020204" pitchFamily="34" charset="0"/>
+              <a:buChar char="•"/>
+              <a:defRPr sz="1600" kern="1200">
+                <a:solidFill>
+                  <a:schemeClr val="tx1"/>
+                </a:solidFill>
+                <a:latin typeface="+mn-lt"/>
+                <a:ea typeface="+mn-ea"/>
+                <a:cs typeface="+mn-cs"/>
+              </a:defRPr>
+            </a:lvl4pPr>
+            <a:lvl5pPr marL="2057400" indent="-228600" algn="l" defTabSz="914400" rtl="0" eaLnBrk="1" latinLnBrk="0" hangingPunct="1">
+              <a:lnSpc>
+                <a:spcPct val="90000"/>
+              </a:lnSpc>
+              <a:spcBef>
+                <a:spcPts val="500"/>
+              </a:spcBef>
+              <a:buFont typeface="Arial" panose="020B0604020202020204" pitchFamily="34" charset="0"/>
+              <a:buChar char="•"/>
+              <a:defRPr sz="1600" kern="1200">
+                <a:solidFill>
+                  <a:schemeClr val="tx1"/>
+                </a:solidFill>
+                <a:latin typeface="+mn-lt"/>
+                <a:ea typeface="+mn-ea"/>
+                <a:cs typeface="+mn-cs"/>
+              </a:defRPr>
+            </a:lvl5pPr>
+            <a:lvl6pPr marL="2514600" indent="-228600" algn="l" defTabSz="914400" rtl="0" eaLnBrk="1" latinLnBrk="0" hangingPunct="1">
+              <a:lnSpc>
+                <a:spcPct val="90000"/>
+              </a:lnSpc>
+              <a:spcBef>
+                <a:spcPts val="500"/>
+              </a:spcBef>
+              <a:buFont typeface="Arial" panose="020B0604020202020204" pitchFamily="34" charset="0"/>
+              <a:buChar char="•"/>
+              <a:defRPr sz="1400" kern="1200">
+                <a:solidFill>
+                  <a:schemeClr val="tx1"/>
+                </a:solidFill>
+                <a:latin typeface="+mn-lt"/>
+                <a:ea typeface="+mn-ea"/>
+                <a:cs typeface="+mn-cs"/>
+              </a:defRPr>
+            </a:lvl6pPr>
+            <a:lvl7pPr marL="2971800" indent="-228600" algn="l" defTabSz="914400" rtl="0" eaLnBrk="1" latinLnBrk="0" hangingPunct="1">
+              <a:lnSpc>
+                <a:spcPct val="90000"/>
+              </a:lnSpc>
+              <a:spcBef>
+                <a:spcPts val="500"/>
+              </a:spcBef>
+              <a:buFont typeface="Arial" panose="020B0604020202020204" pitchFamily="34" charset="0"/>
+              <a:buChar char="•"/>
+              <a:defRPr sz="1400" kern="1200">
+                <a:solidFill>
+                  <a:schemeClr val="tx1"/>
+                </a:solidFill>
+                <a:latin typeface="+mn-lt"/>
+                <a:ea typeface="+mn-ea"/>
+                <a:cs typeface="+mn-cs"/>
+              </a:defRPr>
+            </a:lvl7pPr>
+            <a:lvl8pPr marL="3429000" indent="-228600" algn="l" defTabSz="914400" rtl="0" eaLnBrk="1" latinLnBrk="0" hangingPunct="1">
+              <a:lnSpc>
+                <a:spcPct val="90000"/>
+              </a:lnSpc>
+              <a:spcBef>
+                <a:spcPts val="500"/>
+              </a:spcBef>
+              <a:buFont typeface="Arial" panose="020B0604020202020204" pitchFamily="34" charset="0"/>
+              <a:buChar char="•"/>
+              <a:defRPr sz="1400" kern="1200">
+                <a:solidFill>
+                  <a:schemeClr val="tx1"/>
+                </a:solidFill>
+                <a:latin typeface="+mn-lt"/>
+                <a:ea typeface="+mn-ea"/>
+                <a:cs typeface="+mn-cs"/>
+              </a:defRPr>
+            </a:lvl8pPr>
+            <a:lvl9pPr marL="3886200" indent="-228600" algn="l" defTabSz="914400" rtl="0" eaLnBrk="1" latinLnBrk="0" hangingPunct="1">
+              <a:lnSpc>
+                <a:spcPct val="90000"/>
+              </a:lnSpc>
+              <a:spcBef>
+                <a:spcPts val="500"/>
+              </a:spcBef>
+              <a:buFont typeface="Arial" panose="020B0604020202020204" pitchFamily="34" charset="0"/>
+              <a:buChar char="•"/>
+              <a:defRPr sz="1400" kern="1200">
+                <a:solidFill>
+                  <a:schemeClr val="tx1"/>
+                </a:solidFill>
+                <a:latin typeface="+mn-lt"/>
+                <a:ea typeface="+mn-ea"/>
+                <a:cs typeface="+mn-cs"/>
+              </a:defRPr>
+            </a:lvl9pPr>
+          </a:lstStyle>
+          <a:p>
+            <a:pPr marL="0" indent="0" algn="ctr">
+              <a:buFont typeface="Arial" panose="020B0604020202020204" pitchFamily="34" charset="0"/>
+              <a:buNone/>
+            </a:pPr>
+            <a:r>
+              <a:rPr lang="en-US" dirty="0">
+                <a:solidFill>
+                  <a:srgbClr val="FFFF00"/>
+                </a:solidFill>
+              </a:rPr>
+              <a:t>Train</a:t>
+            </a:r>
+          </a:p>
+        </p:txBody>
+      </p:sp>
+      <p:sp>
+        <p:nvSpPr>
+          <p:cNvPr id="7" name="Content Placeholder 3">
+            <a:extLst>
+              <a:ext uri="{FF2B5EF4-FFF2-40B4-BE49-F238E27FC236}">
+                <a16:creationId xmlns:a16="http://schemas.microsoft.com/office/drawing/2014/main" id="{539ACC7E-D44E-EBFB-F564-4CA5B7C6F9ED}"/>
+              </a:ext>
+            </a:extLst>
+          </p:cNvPr>
+          <p:cNvSpPr txBox="1">
+            <a:spLocks/>
+          </p:cNvSpPr>
+          <p:nvPr/>
+        </p:nvSpPr>
+        <p:spPr>
+          <a:xfrm>
+            <a:off x="10096941" y="5882979"/>
+            <a:ext cx="739434" cy="424732"/>
+          </a:xfrm>
+          <a:prstGeom prst="rect">
+            <a:avLst/>
+          </a:prstGeom>
+          <a:noFill/>
+        </p:spPr>
+        <p:txBody>
+          <a:bodyPr vert="horz" wrap="square" lIns="91440" tIns="45720" rIns="91440" bIns="45720" rtlCol="0">
+            <a:spAutoFit/>
+          </a:bodyPr>
+          <a:lstStyle>
+            <a:lvl1pPr marL="228600" indent="-228600" algn="l" defTabSz="914400" rtl="0" eaLnBrk="1" latinLnBrk="0" hangingPunct="1">
+              <a:lnSpc>
+                <a:spcPct val="90000"/>
+              </a:lnSpc>
+              <a:spcBef>
+                <a:spcPts val="1000"/>
+              </a:spcBef>
+              <a:buFont typeface="Arial" panose="020B0604020202020204" pitchFamily="34" charset="0"/>
+              <a:buChar char="•"/>
+              <a:defRPr sz="2400" kern="1200">
+                <a:solidFill>
+                  <a:schemeClr val="tx1"/>
+                </a:solidFill>
+                <a:latin typeface="+mn-lt"/>
+                <a:ea typeface="+mn-ea"/>
+                <a:cs typeface="+mn-cs"/>
+              </a:defRPr>
+            </a:lvl1pPr>
+            <a:lvl2pPr marL="685800" indent="-228600" algn="l" defTabSz="914400" rtl="0" eaLnBrk="1" latinLnBrk="0" hangingPunct="1">
+              <a:lnSpc>
+                <a:spcPct val="90000"/>
+              </a:lnSpc>
+              <a:spcBef>
+                <a:spcPts val="500"/>
+              </a:spcBef>
+              <a:buFont typeface="Arial" panose="020B0604020202020204" pitchFamily="34" charset="0"/>
+              <a:buChar char="•"/>
+              <a:defRPr sz="2000" kern="1200">
+                <a:solidFill>
+                  <a:schemeClr val="tx1"/>
+                </a:solidFill>
+                <a:latin typeface="+mn-lt"/>
+                <a:ea typeface="+mn-ea"/>
+                <a:cs typeface="+mn-cs"/>
+              </a:defRPr>
+            </a:lvl2pPr>
+            <a:lvl3pPr marL="1143000" indent="-228600" algn="l" defTabSz="914400" rtl="0" eaLnBrk="1" latinLnBrk="0" hangingPunct="1">
+              <a:lnSpc>
+                <a:spcPct val="90000"/>
+              </a:lnSpc>
+              <a:spcBef>
+                <a:spcPts val="500"/>
+              </a:spcBef>
+              <a:buFont typeface="Arial" panose="020B0604020202020204" pitchFamily="34" charset="0"/>
+              <a:buChar char="•"/>
+              <a:defRPr sz="1800" kern="1200">
+                <a:solidFill>
+                  <a:schemeClr val="tx1"/>
+                </a:solidFill>
+                <a:latin typeface="+mn-lt"/>
+                <a:ea typeface="+mn-ea"/>
+                <a:cs typeface="+mn-cs"/>
+              </a:defRPr>
+            </a:lvl3pPr>
+            <a:lvl4pPr marL="1600200" indent="-228600" algn="l" defTabSz="914400" rtl="0" eaLnBrk="1" latinLnBrk="0" hangingPunct="1">
+              <a:lnSpc>
+                <a:spcPct val="90000"/>
+              </a:lnSpc>
+              <a:spcBef>
+                <a:spcPts val="500"/>
+              </a:spcBef>
+              <a:buFont typeface="Arial" panose="020B0604020202020204" pitchFamily="34" charset="0"/>
+              <a:buChar char="•"/>
+              <a:defRPr sz="1600" kern="1200">
+                <a:solidFill>
+                  <a:schemeClr val="tx1"/>
+                </a:solidFill>
+                <a:latin typeface="+mn-lt"/>
+                <a:ea typeface="+mn-ea"/>
+                <a:cs typeface="+mn-cs"/>
+              </a:defRPr>
+            </a:lvl4pPr>
+            <a:lvl5pPr marL="2057400" indent="-228600" algn="l" defTabSz="914400" rtl="0" eaLnBrk="1" latinLnBrk="0" hangingPunct="1">
+              <a:lnSpc>
+                <a:spcPct val="90000"/>
+              </a:lnSpc>
+              <a:spcBef>
+                <a:spcPts val="500"/>
+              </a:spcBef>
+              <a:buFont typeface="Arial" panose="020B0604020202020204" pitchFamily="34" charset="0"/>
+              <a:buChar char="•"/>
+              <a:defRPr sz="1600" kern="1200">
+                <a:solidFill>
+                  <a:schemeClr val="tx1"/>
+                </a:solidFill>
+                <a:latin typeface="+mn-lt"/>
+                <a:ea typeface="+mn-ea"/>
+                <a:cs typeface="+mn-cs"/>
+              </a:defRPr>
+            </a:lvl5pPr>
+            <a:lvl6pPr marL="2514600" indent="-228600" algn="l" defTabSz="914400" rtl="0" eaLnBrk="1" latinLnBrk="0" hangingPunct="1">
+              <a:lnSpc>
+                <a:spcPct val="90000"/>
+              </a:lnSpc>
+              <a:spcBef>
+                <a:spcPts val="500"/>
+              </a:spcBef>
+              <a:buFont typeface="Arial" panose="020B0604020202020204" pitchFamily="34" charset="0"/>
+              <a:buChar char="•"/>
+              <a:defRPr sz="1400" kern="1200">
+                <a:solidFill>
+                  <a:schemeClr val="tx1"/>
+                </a:solidFill>
+                <a:latin typeface="+mn-lt"/>
+                <a:ea typeface="+mn-ea"/>
+                <a:cs typeface="+mn-cs"/>
+              </a:defRPr>
+            </a:lvl6pPr>
+            <a:lvl7pPr marL="2971800" indent="-228600" algn="l" defTabSz="914400" rtl="0" eaLnBrk="1" latinLnBrk="0" hangingPunct="1">
+              <a:lnSpc>
+                <a:spcPct val="90000"/>
+              </a:lnSpc>
+              <a:spcBef>
+                <a:spcPts val="500"/>
+              </a:spcBef>
+              <a:buFont typeface="Arial" panose="020B0604020202020204" pitchFamily="34" charset="0"/>
+              <a:buChar char="•"/>
+              <a:defRPr sz="1400" kern="1200">
+                <a:solidFill>
+                  <a:schemeClr val="tx1"/>
+                </a:solidFill>
+                <a:latin typeface="+mn-lt"/>
+                <a:ea typeface="+mn-ea"/>
+                <a:cs typeface="+mn-cs"/>
+              </a:defRPr>
+            </a:lvl7pPr>
+            <a:lvl8pPr marL="3429000" indent="-228600" algn="l" defTabSz="914400" rtl="0" eaLnBrk="1" latinLnBrk="0" hangingPunct="1">
+              <a:lnSpc>
+                <a:spcPct val="90000"/>
+              </a:lnSpc>
+              <a:spcBef>
+                <a:spcPts val="500"/>
+              </a:spcBef>
+              <a:buFont typeface="Arial" panose="020B0604020202020204" pitchFamily="34" charset="0"/>
+              <a:buChar char="•"/>
+              <a:defRPr sz="1400" kern="1200">
+                <a:solidFill>
+                  <a:schemeClr val="tx1"/>
+                </a:solidFill>
+                <a:latin typeface="+mn-lt"/>
+                <a:ea typeface="+mn-ea"/>
+                <a:cs typeface="+mn-cs"/>
+              </a:defRPr>
+            </a:lvl8pPr>
+            <a:lvl9pPr marL="3886200" indent="-228600" algn="l" defTabSz="914400" rtl="0" eaLnBrk="1" latinLnBrk="0" hangingPunct="1">
+              <a:lnSpc>
+                <a:spcPct val="90000"/>
+              </a:lnSpc>
+              <a:spcBef>
+                <a:spcPts val="500"/>
+              </a:spcBef>
+              <a:buFont typeface="Arial" panose="020B0604020202020204" pitchFamily="34" charset="0"/>
+              <a:buChar char="•"/>
+              <a:defRPr sz="1400" kern="1200">
+                <a:solidFill>
+                  <a:schemeClr val="tx1"/>
+                </a:solidFill>
+                <a:latin typeface="+mn-lt"/>
+                <a:ea typeface="+mn-ea"/>
+                <a:cs typeface="+mn-cs"/>
+              </a:defRPr>
+            </a:lvl9pPr>
+          </a:lstStyle>
+          <a:p>
+            <a:pPr marL="0" indent="0" algn="ctr">
+              <a:buFont typeface="Arial" panose="020B0604020202020204" pitchFamily="34" charset="0"/>
+              <a:buNone/>
+            </a:pPr>
+            <a:r>
+              <a:rPr lang="en-US" dirty="0">
+                <a:solidFill>
+                  <a:srgbClr val="FFFF00"/>
+                </a:solidFill>
+              </a:rPr>
+              <a:t>Test</a:t>
+            </a:r>
+          </a:p>
+        </p:txBody>
+      </p:sp>
+      <p:sp>
+        <p:nvSpPr>
+          <p:cNvPr id="8" name="Rectangle 7">
+            <a:extLst>
+              <a:ext uri="{FF2B5EF4-FFF2-40B4-BE49-F238E27FC236}">
+                <a16:creationId xmlns:a16="http://schemas.microsoft.com/office/drawing/2014/main" id="{7F0FCFE7-72AC-C33A-E84E-95E3FBDF516D}"/>
+              </a:ext>
+            </a:extLst>
+          </p:cNvPr>
+          <p:cNvSpPr/>
+          <p:nvPr/>
+        </p:nvSpPr>
+        <p:spPr>
+          <a:xfrm>
+            <a:off x="750509" y="4852063"/>
+            <a:ext cx="3691497" cy="669303"/>
+          </a:xfrm>
+          <a:prstGeom prst="rect">
+            <a:avLst/>
+          </a:prstGeom>
+        </p:spPr>
+        <p:style>
+          <a:lnRef idx="2">
+            <a:schemeClr val="accent3">
+              <a:shade val="15000"/>
+            </a:schemeClr>
+          </a:lnRef>
+          <a:fillRef idx="1">
+            <a:schemeClr val="accent3"/>
+          </a:fillRef>
+          <a:effectRef idx="0">
+            <a:schemeClr val="accent3"/>
+          </a:effectRef>
+          <a:fontRef idx="minor">
+            <a:schemeClr val="lt1"/>
+          </a:fontRef>
+        </p:style>
+        <p:txBody>
+          <a:bodyPr rtlCol="0" anchor="ctr"/>
+          <a:lstStyle/>
+          <a:p>
+            <a:pPr algn="ctr"/>
+            <a:r>
+              <a:rPr lang="en-US" dirty="0"/>
+              <a:t>Cox’s Bazar, Sylhet, Saint martin</a:t>
+            </a:r>
+          </a:p>
+        </p:txBody>
+      </p:sp>
+      <p:sp>
+        <p:nvSpPr>
+          <p:cNvPr id="9" name="Rectangle 8">
+            <a:extLst>
+              <a:ext uri="{FF2B5EF4-FFF2-40B4-BE49-F238E27FC236}">
+                <a16:creationId xmlns:a16="http://schemas.microsoft.com/office/drawing/2014/main" id="{515CA22B-481F-6212-371D-F8B63DEA7FBA}"/>
+              </a:ext>
+            </a:extLst>
+          </p:cNvPr>
+          <p:cNvSpPr/>
+          <p:nvPr/>
+        </p:nvSpPr>
+        <p:spPr>
+          <a:xfrm>
+            <a:off x="9386560" y="4965186"/>
+            <a:ext cx="2036189" cy="669303"/>
+          </a:xfrm>
+          <a:prstGeom prst="rect">
+            <a:avLst/>
+          </a:prstGeom>
+          <a:solidFill>
+            <a:srgbClr val="C00000"/>
+          </a:solidFill>
+        </p:spPr>
+        <p:style>
+          <a:lnRef idx="2">
+            <a:schemeClr val="accent6">
+              <a:shade val="15000"/>
+            </a:schemeClr>
+          </a:lnRef>
+          <a:fillRef idx="1">
+            <a:schemeClr val="accent6"/>
+          </a:fillRef>
+          <a:effectRef idx="0">
+            <a:schemeClr val="accent6"/>
+          </a:effectRef>
+          <a:fontRef idx="minor">
+            <a:schemeClr val="lt1"/>
+          </a:fontRef>
+        </p:style>
+        <p:txBody>
+          <a:bodyPr rtlCol="0" anchor="ctr"/>
+          <a:lstStyle/>
+          <a:p>
+            <a:pPr algn="ctr"/>
+            <a:r>
+              <a:rPr lang="en-US" dirty="0"/>
+              <a:t>Paris ?</a:t>
+            </a:r>
+          </a:p>
+        </p:txBody>
+      </p:sp>
+      <p:sp>
+        <p:nvSpPr>
+          <p:cNvPr id="10" name="Rectangle 9">
+            <a:extLst>
+              <a:ext uri="{FF2B5EF4-FFF2-40B4-BE49-F238E27FC236}">
+                <a16:creationId xmlns:a16="http://schemas.microsoft.com/office/drawing/2014/main" id="{4438CCEF-EC52-FF8F-82B8-97E653835E51}"/>
+              </a:ext>
+            </a:extLst>
+          </p:cNvPr>
+          <p:cNvSpPr/>
+          <p:nvPr/>
+        </p:nvSpPr>
+        <p:spPr>
+          <a:xfrm>
+            <a:off x="3346515" y="2404238"/>
+            <a:ext cx="5222450" cy="669303"/>
+          </a:xfrm>
+          <a:prstGeom prst="rect">
+            <a:avLst/>
+          </a:prstGeom>
+          <a:solidFill>
+            <a:srgbClr val="7030A0"/>
+          </a:solidFill>
+        </p:spPr>
+        <p:style>
+          <a:lnRef idx="2">
+            <a:schemeClr val="accent3">
+              <a:shade val="15000"/>
+            </a:schemeClr>
+          </a:lnRef>
+          <a:fillRef idx="1">
+            <a:schemeClr val="accent3"/>
+          </a:fillRef>
+          <a:effectRef idx="0">
+            <a:schemeClr val="accent3"/>
+          </a:effectRef>
+          <a:fontRef idx="minor">
+            <a:schemeClr val="lt1"/>
+          </a:fontRef>
+        </p:style>
+        <p:txBody>
+          <a:bodyPr rtlCol="0" anchor="ctr"/>
+          <a:lstStyle/>
+          <a:p>
+            <a:pPr marL="0" indent="0" algn="ctr">
+              <a:buNone/>
+            </a:pPr>
+            <a:r>
+              <a:rPr lang="en-US" b="1" dirty="0">
+                <a:solidFill>
+                  <a:srgbClr val="FFFF00"/>
+                </a:solidFill>
+              </a:rPr>
+              <a:t>Book:</a:t>
+            </a:r>
+            <a:r>
+              <a:rPr lang="en-US" dirty="0">
+                <a:solidFill>
+                  <a:srgbClr val="FFFF00"/>
+                </a:solidFill>
+              </a:rPr>
+              <a:t> H</a:t>
+            </a:r>
+            <a:r>
+              <a:rPr lang="en-US" sz="1800" dirty="0">
+                <a:solidFill>
+                  <a:srgbClr val="FFFF00"/>
+                </a:solidFill>
+              </a:rPr>
+              <a:t>istorical place of Bangladesh </a:t>
+            </a:r>
+          </a:p>
+        </p:txBody>
+      </p:sp>
+    </p:spTree>
+    <p:extLst>
+      <p:ext uri="{BB962C8B-B14F-4D97-AF65-F5344CB8AC3E}">
+        <p14:creationId xmlns:p14="http://schemas.microsoft.com/office/powerpoint/2010/main" val="522093416"/>
+      </p:ext>
+    </p:extLst>
+  </p:cSld>
+  <p:clrMapOvr>
+    <a:masterClrMapping/>
+  </p:clrMapOvr>
+</p:sld>
+</file>
+
+<file path=ppt/slides/slide69.xml><?xml version="1.0" encoding="utf-8"?>
+<p:sld xmlns:a="http://schemas.openxmlformats.org/drawingml/2006/main" xmlns:r="http://schemas.openxmlformats.org/officeDocument/2006/relationships" xmlns:p="http://schemas.openxmlformats.org/presentationml/2006/main">
+  <p:cSld>
+    <p:spTree>
+      <p:nvGrpSpPr>
+        <p:cNvPr id="1" name="">
+          <a:extLst>
+            <a:ext uri="{FF2B5EF4-FFF2-40B4-BE49-F238E27FC236}">
+              <a16:creationId xmlns:a16="http://schemas.microsoft.com/office/drawing/2014/main" id="{2B465730-FCF4-F856-6E26-F24498D2B2DF}"/>
+            </a:ext>
+          </a:extLst>
+        </p:cNvPr>
+        <p:cNvGrpSpPr/>
+        <p:nvPr/>
+      </p:nvGrpSpPr>
+      <p:grpSpPr>
+        <a:xfrm>
+          <a:off x="0" y="0"/>
+          <a:ext cx="0" cy="0"/>
+          <a:chOff x="0" y="0"/>
+          <a:chExt cx="0" cy="0"/>
+        </a:xfrm>
+      </p:grpSpPr>
+      <p:sp>
+        <p:nvSpPr>
+          <p:cNvPr id="2" name="Title 1">
+            <a:extLst>
+              <a:ext uri="{FF2B5EF4-FFF2-40B4-BE49-F238E27FC236}">
+                <a16:creationId xmlns:a16="http://schemas.microsoft.com/office/drawing/2014/main" id="{1AA53905-DDDE-67EC-8C5D-F2DA2806374C}"/>
+              </a:ext>
+            </a:extLst>
+          </p:cNvPr>
+          <p:cNvSpPr>
+            <a:spLocks noGrp="1"/>
+          </p:cNvSpPr>
+          <p:nvPr>
+            <p:ph type="title"/>
+          </p:nvPr>
+        </p:nvSpPr>
+        <p:spPr/>
+        <p:txBody>
+          <a:bodyPr/>
+          <a:lstStyle/>
+          <a:p>
+            <a:r>
+              <a:rPr lang="en-US" dirty="0"/>
+              <a:t>Zeros</a:t>
+            </a:r>
+          </a:p>
+        </p:txBody>
+      </p:sp>
+      <p:sp>
+        <p:nvSpPr>
+          <p:cNvPr id="3" name="Content Placeholder 2">
+            <a:extLst>
+              <a:ext uri="{FF2B5EF4-FFF2-40B4-BE49-F238E27FC236}">
+                <a16:creationId xmlns:a16="http://schemas.microsoft.com/office/drawing/2014/main" id="{2CFE0392-2FF9-9B76-2D37-043DE920B080}"/>
+              </a:ext>
+            </a:extLst>
+          </p:cNvPr>
+          <p:cNvSpPr>
+            <a:spLocks noGrp="1"/>
+          </p:cNvSpPr>
+          <p:nvPr>
+            <p:ph idx="1"/>
+          </p:nvPr>
+        </p:nvSpPr>
+        <p:spPr>
+          <a:xfrm>
+            <a:off x="680322" y="2336873"/>
+            <a:ext cx="4100226" cy="3599316"/>
+          </a:xfrm>
+        </p:spPr>
+        <p:txBody>
+          <a:bodyPr>
+            <a:normAutofit/>
+          </a:bodyPr>
+          <a:lstStyle/>
+          <a:p>
+            <a:r>
+              <a:rPr lang="en-US" dirty="0"/>
+              <a:t>Training set:</a:t>
+            </a:r>
+          </a:p>
+          <a:p>
+            <a:pPr marL="457200" lvl="1" indent="0">
+              <a:buNone/>
+            </a:pPr>
+            <a:r>
+              <a:rPr lang="en-US" dirty="0"/>
+              <a:t>… denied the allegations </a:t>
+            </a:r>
+          </a:p>
+          <a:p>
+            <a:pPr marL="457200" lvl="1" indent="0">
+              <a:buNone/>
+            </a:pPr>
+            <a:r>
+              <a:rPr lang="en-US" dirty="0"/>
+              <a:t>… denied the reports </a:t>
+            </a:r>
+          </a:p>
+          <a:p>
+            <a:pPr marL="457200" lvl="1" indent="0">
+              <a:buNone/>
+            </a:pPr>
+            <a:r>
+              <a:rPr lang="en-US" dirty="0"/>
+              <a:t>… denied the claims </a:t>
+            </a:r>
+          </a:p>
+          <a:p>
+            <a:pPr marL="457200" lvl="1" indent="0">
+              <a:buNone/>
+            </a:pPr>
+            <a:r>
+              <a:rPr lang="en-US" dirty="0"/>
+              <a:t>… denied the request </a:t>
+            </a:r>
+          </a:p>
+          <a:p>
+            <a:pPr marL="457200" lvl="1" indent="0">
+              <a:buNone/>
+            </a:pPr>
+            <a:endParaRPr lang="en-US" dirty="0"/>
+          </a:p>
+          <a:p>
+            <a:pPr marL="457200" lvl="1" indent="0">
+              <a:buNone/>
+            </a:pPr>
+            <a:r>
+              <a:rPr lang="en-US" dirty="0">
+                <a:solidFill>
+                  <a:srgbClr val="FFFF00"/>
+                </a:solidFill>
+              </a:rPr>
+              <a:t>P(“offer” | denied the) = 0</a:t>
+            </a:r>
+          </a:p>
+        </p:txBody>
+      </p:sp>
+      <p:sp>
+        <p:nvSpPr>
+          <p:cNvPr id="5" name="Content Placeholder 2">
+            <a:extLst>
+              <a:ext uri="{FF2B5EF4-FFF2-40B4-BE49-F238E27FC236}">
+                <a16:creationId xmlns:a16="http://schemas.microsoft.com/office/drawing/2014/main" id="{C07ED68B-AEFC-290D-4F61-A7E216C4AC46}"/>
+              </a:ext>
+            </a:extLst>
+          </p:cNvPr>
+          <p:cNvSpPr txBox="1">
+            <a:spLocks/>
+          </p:cNvSpPr>
+          <p:nvPr/>
+        </p:nvSpPr>
+        <p:spPr>
+          <a:xfrm>
+            <a:off x="7411452" y="2336873"/>
+            <a:ext cx="4100226" cy="3599316"/>
+          </a:xfrm>
+          <a:prstGeom prst="rect">
+            <a:avLst/>
+          </a:prstGeom>
+        </p:spPr>
+        <p:txBody>
+          <a:bodyPr vert="horz" lIns="91440" tIns="45720" rIns="91440" bIns="45720" rtlCol="0">
+            <a:normAutofit/>
+          </a:bodyPr>
+          <a:lstStyle>
+            <a:lvl1pPr marL="228600" indent="-228600" algn="l" defTabSz="914400" rtl="0" eaLnBrk="1" latinLnBrk="0" hangingPunct="1">
+              <a:lnSpc>
+                <a:spcPct val="90000"/>
+              </a:lnSpc>
+              <a:spcBef>
+                <a:spcPts val="1000"/>
+              </a:spcBef>
+              <a:buFont typeface="Arial" panose="020B0604020202020204" pitchFamily="34" charset="0"/>
+              <a:buChar char="•"/>
+              <a:defRPr sz="2400" kern="1200">
+                <a:solidFill>
+                  <a:schemeClr val="tx1"/>
+                </a:solidFill>
+                <a:latin typeface="+mn-lt"/>
+                <a:ea typeface="+mn-ea"/>
+                <a:cs typeface="+mn-cs"/>
+              </a:defRPr>
+            </a:lvl1pPr>
+            <a:lvl2pPr marL="685800" indent="-228600" algn="l" defTabSz="914400" rtl="0" eaLnBrk="1" latinLnBrk="0" hangingPunct="1">
+              <a:lnSpc>
+                <a:spcPct val="90000"/>
+              </a:lnSpc>
+              <a:spcBef>
+                <a:spcPts val="500"/>
+              </a:spcBef>
+              <a:buFont typeface="Arial" panose="020B0604020202020204" pitchFamily="34" charset="0"/>
+              <a:buChar char="•"/>
+              <a:defRPr sz="2000" kern="1200">
+                <a:solidFill>
+                  <a:schemeClr val="tx1"/>
+                </a:solidFill>
+                <a:latin typeface="+mn-lt"/>
+                <a:ea typeface="+mn-ea"/>
+                <a:cs typeface="+mn-cs"/>
+              </a:defRPr>
+            </a:lvl2pPr>
+            <a:lvl3pPr marL="1143000" indent="-228600" algn="l" defTabSz="914400" rtl="0" eaLnBrk="1" latinLnBrk="0" hangingPunct="1">
+              <a:lnSpc>
+                <a:spcPct val="90000"/>
+              </a:lnSpc>
+              <a:spcBef>
+                <a:spcPts val="500"/>
+              </a:spcBef>
+              <a:buFont typeface="Arial" panose="020B0604020202020204" pitchFamily="34" charset="0"/>
+              <a:buChar char="•"/>
+              <a:defRPr sz="1800" kern="1200">
+                <a:solidFill>
+                  <a:schemeClr val="tx1"/>
+                </a:solidFill>
+                <a:latin typeface="+mn-lt"/>
+                <a:ea typeface="+mn-ea"/>
+                <a:cs typeface="+mn-cs"/>
+              </a:defRPr>
+            </a:lvl3pPr>
+            <a:lvl4pPr marL="1600200" indent="-228600" algn="l" defTabSz="914400" rtl="0" eaLnBrk="1" latinLnBrk="0" hangingPunct="1">
+              <a:lnSpc>
+                <a:spcPct val="90000"/>
+              </a:lnSpc>
+              <a:spcBef>
+                <a:spcPts val="500"/>
+              </a:spcBef>
+              <a:buFont typeface="Arial" panose="020B0604020202020204" pitchFamily="34" charset="0"/>
+              <a:buChar char="•"/>
+              <a:defRPr sz="1600" kern="1200">
+                <a:solidFill>
+                  <a:schemeClr val="tx1"/>
+                </a:solidFill>
+                <a:latin typeface="+mn-lt"/>
+                <a:ea typeface="+mn-ea"/>
+                <a:cs typeface="+mn-cs"/>
+              </a:defRPr>
+            </a:lvl4pPr>
+            <a:lvl5pPr marL="2057400" indent="-228600" algn="l" defTabSz="914400" rtl="0" eaLnBrk="1" latinLnBrk="0" hangingPunct="1">
+              <a:lnSpc>
+                <a:spcPct val="90000"/>
+              </a:lnSpc>
+              <a:spcBef>
+                <a:spcPts val="500"/>
+              </a:spcBef>
+              <a:buFont typeface="Arial" panose="020B0604020202020204" pitchFamily="34" charset="0"/>
+              <a:buChar char="•"/>
+              <a:defRPr sz="1600" kern="1200">
+                <a:solidFill>
+                  <a:schemeClr val="tx1"/>
+                </a:solidFill>
+                <a:latin typeface="+mn-lt"/>
+                <a:ea typeface="+mn-ea"/>
+                <a:cs typeface="+mn-cs"/>
+              </a:defRPr>
+            </a:lvl5pPr>
+            <a:lvl6pPr marL="2514600" indent="-228600" algn="l" defTabSz="914400" rtl="0" eaLnBrk="1" latinLnBrk="0" hangingPunct="1">
+              <a:lnSpc>
+                <a:spcPct val="90000"/>
+              </a:lnSpc>
+              <a:spcBef>
+                <a:spcPts val="500"/>
+              </a:spcBef>
+              <a:buFont typeface="Arial" panose="020B0604020202020204" pitchFamily="34" charset="0"/>
+              <a:buChar char="•"/>
+              <a:defRPr sz="1400" kern="1200">
+                <a:solidFill>
+                  <a:schemeClr val="tx1"/>
+                </a:solidFill>
+                <a:latin typeface="+mn-lt"/>
+                <a:ea typeface="+mn-ea"/>
+                <a:cs typeface="+mn-cs"/>
+              </a:defRPr>
+            </a:lvl6pPr>
+            <a:lvl7pPr marL="2971800" indent="-228600" algn="l" defTabSz="914400" rtl="0" eaLnBrk="1" latinLnBrk="0" hangingPunct="1">
+              <a:lnSpc>
+                <a:spcPct val="90000"/>
+              </a:lnSpc>
+              <a:spcBef>
+                <a:spcPts val="500"/>
+              </a:spcBef>
+              <a:buFont typeface="Arial" panose="020B0604020202020204" pitchFamily="34" charset="0"/>
+              <a:buChar char="•"/>
+              <a:defRPr sz="1400" kern="1200">
+                <a:solidFill>
+                  <a:schemeClr val="tx1"/>
+                </a:solidFill>
+                <a:latin typeface="+mn-lt"/>
+                <a:ea typeface="+mn-ea"/>
+                <a:cs typeface="+mn-cs"/>
+              </a:defRPr>
+            </a:lvl7pPr>
+            <a:lvl8pPr marL="3429000" indent="-228600" algn="l" defTabSz="914400" rtl="0" eaLnBrk="1" latinLnBrk="0" hangingPunct="1">
+              <a:lnSpc>
+                <a:spcPct val="90000"/>
+              </a:lnSpc>
+              <a:spcBef>
+                <a:spcPts val="500"/>
+              </a:spcBef>
+              <a:buFont typeface="Arial" panose="020B0604020202020204" pitchFamily="34" charset="0"/>
+              <a:buChar char="•"/>
+              <a:defRPr sz="1400" kern="1200">
+                <a:solidFill>
+                  <a:schemeClr val="tx1"/>
+                </a:solidFill>
+                <a:latin typeface="+mn-lt"/>
+                <a:ea typeface="+mn-ea"/>
+                <a:cs typeface="+mn-cs"/>
+              </a:defRPr>
+            </a:lvl8pPr>
+            <a:lvl9pPr marL="3886200" indent="-228600" algn="l" defTabSz="914400" rtl="0" eaLnBrk="1" latinLnBrk="0" hangingPunct="1">
+              <a:lnSpc>
+                <a:spcPct val="90000"/>
+              </a:lnSpc>
+              <a:spcBef>
+                <a:spcPts val="500"/>
+              </a:spcBef>
+              <a:buFont typeface="Arial" panose="020B0604020202020204" pitchFamily="34" charset="0"/>
+              <a:buChar char="•"/>
+              <a:defRPr sz="1400" kern="1200">
+                <a:solidFill>
+                  <a:schemeClr val="tx1"/>
+                </a:solidFill>
+                <a:latin typeface="+mn-lt"/>
+                <a:ea typeface="+mn-ea"/>
+                <a:cs typeface="+mn-cs"/>
+              </a:defRPr>
+            </a:lvl9pPr>
+          </a:lstStyle>
+          <a:p>
+            <a:r>
+              <a:rPr lang="en-US" dirty="0"/>
+              <a:t>Test set:</a:t>
+            </a:r>
+          </a:p>
+          <a:p>
+            <a:pPr marL="457200" lvl="1" indent="0">
+              <a:buFont typeface="Arial" panose="020B0604020202020204" pitchFamily="34" charset="0"/>
+              <a:buNone/>
+            </a:pPr>
+            <a:r>
+              <a:rPr lang="en-US" dirty="0"/>
+              <a:t>… denied the offer</a:t>
+            </a:r>
+          </a:p>
+          <a:p>
+            <a:pPr marL="457200" lvl="1" indent="0">
+              <a:buFont typeface="Arial" panose="020B0604020202020204" pitchFamily="34" charset="0"/>
+              <a:buNone/>
+            </a:pPr>
+            <a:r>
+              <a:rPr lang="en-US" dirty="0"/>
+              <a:t>… denied the load </a:t>
+            </a:r>
+          </a:p>
+        </p:txBody>
+      </p:sp>
+    </p:spTree>
+    <p:extLst>
+      <p:ext uri="{BB962C8B-B14F-4D97-AF65-F5344CB8AC3E}">
+        <p14:creationId xmlns:p14="http://schemas.microsoft.com/office/powerpoint/2010/main" val="1601539029"/>
+      </p:ext>
+    </p:extLst>
+  </p:cSld>
+  <p:clrMapOvr>
+    <a:masterClrMapping/>
+  </p:clrMapOvr>
+</p:sld>
+</file>
+
 <file path=ppt/slides/slide7.xml><?xml version="1.0" encoding="utf-8"?>
 <p:sld xmlns:a="http://schemas.openxmlformats.org/drawingml/2006/main" xmlns:r="http://schemas.openxmlformats.org/officeDocument/2006/relationships" xmlns:p="http://schemas.openxmlformats.org/presentationml/2006/main">
   <p:cSld>
@@ -34593,6 +36084,1812 @@
   <p:clrMapOvr>
     <a:masterClrMapping/>
   </p:clrMapOvr>
+</p:sld>
+</file>
+
+<file path=ppt/slides/slide70.xml><?xml version="1.0" encoding="utf-8"?>
+<p:sld xmlns:a="http://schemas.openxmlformats.org/drawingml/2006/main" xmlns:r="http://schemas.openxmlformats.org/officeDocument/2006/relationships" xmlns:p="http://schemas.openxmlformats.org/presentationml/2006/main">
+  <p:cSld>
+    <p:spTree>
+      <p:nvGrpSpPr>
+        <p:cNvPr id="1" name=""/>
+        <p:cNvGrpSpPr/>
+        <p:nvPr/>
+      </p:nvGrpSpPr>
+      <p:grpSpPr>
+        <a:xfrm>
+          <a:off x="0" y="0"/>
+          <a:ext cx="0" cy="0"/>
+          <a:chOff x="0" y="0"/>
+          <a:chExt cx="0" cy="0"/>
+        </a:xfrm>
+      </p:grpSpPr>
+      <p:sp>
+        <p:nvSpPr>
+          <p:cNvPr id="2" name="Title 1">
+            <a:extLst>
+              <a:ext uri="{FF2B5EF4-FFF2-40B4-BE49-F238E27FC236}">
+                <a16:creationId xmlns:a16="http://schemas.microsoft.com/office/drawing/2014/main" id="{0A1459D3-D086-6C06-A454-D1F08005754C}"/>
+              </a:ext>
+            </a:extLst>
+          </p:cNvPr>
+          <p:cNvSpPr>
+            <a:spLocks noGrp="1"/>
+          </p:cNvSpPr>
+          <p:nvPr>
+            <p:ph type="title"/>
+          </p:nvPr>
+        </p:nvSpPr>
+        <p:spPr/>
+        <p:txBody>
+          <a:bodyPr/>
+          <a:lstStyle/>
+          <a:p>
+            <a:r>
+              <a:rPr lang="en-US" dirty="0"/>
+              <a:t>Smoothing in language models</a:t>
+            </a:r>
+          </a:p>
+        </p:txBody>
+      </p:sp>
+      <p:sp>
+        <p:nvSpPr>
+          <p:cNvPr id="3" name="Content Placeholder 2">
+            <a:extLst>
+              <a:ext uri="{FF2B5EF4-FFF2-40B4-BE49-F238E27FC236}">
+                <a16:creationId xmlns:a16="http://schemas.microsoft.com/office/drawing/2014/main" id="{F47A5ACA-6E89-F593-3496-F58CF6BFB592}"/>
+              </a:ext>
+            </a:extLst>
+          </p:cNvPr>
+          <p:cNvSpPr>
+            <a:spLocks noGrp="1"/>
+          </p:cNvSpPr>
+          <p:nvPr>
+            <p:ph idx="1"/>
+          </p:nvPr>
+        </p:nvSpPr>
+        <p:spPr/>
+        <p:txBody>
+          <a:bodyPr/>
+          <a:lstStyle/>
+          <a:p>
+            <a:r>
+              <a:rPr lang="en-US" dirty="0"/>
+              <a:t>To keep a language model from not to assign zero probability to the unseen events </a:t>
+            </a:r>
+          </a:p>
+          <a:p>
+            <a:r>
+              <a:rPr lang="en-US" dirty="0"/>
+              <a:t>Way to do smoothing</a:t>
+            </a:r>
+          </a:p>
+          <a:p>
+            <a:pPr lvl="1"/>
+            <a:r>
+              <a:rPr lang="en-US" dirty="0"/>
+              <a:t>Add-1 smoothing </a:t>
+            </a:r>
+          </a:p>
+          <a:p>
+            <a:pPr lvl="1"/>
+            <a:r>
+              <a:rPr lang="en-US" dirty="0"/>
+              <a:t>Add-k smoothing</a:t>
+            </a:r>
+          </a:p>
+          <a:p>
+            <a:pPr lvl="1"/>
+            <a:r>
+              <a:rPr lang="en-US" dirty="0"/>
+              <a:t>Stupid backoff</a:t>
+            </a:r>
+          </a:p>
+          <a:p>
+            <a:pPr lvl="1"/>
+            <a:r>
+              <a:rPr lang="en-US" dirty="0" err="1"/>
+              <a:t>Kneser</a:t>
+            </a:r>
+            <a:r>
+              <a:rPr lang="en-US" dirty="0"/>
+              <a:t>-Ney smoothing </a:t>
+            </a:r>
+          </a:p>
+          <a:p>
+            <a:pPr lvl="1"/>
+            <a:endParaRPr lang="en-US" dirty="0"/>
+          </a:p>
+        </p:txBody>
+      </p:sp>
+    </p:spTree>
+    <p:extLst>
+      <p:ext uri="{BB962C8B-B14F-4D97-AF65-F5344CB8AC3E}">
+        <p14:creationId xmlns:p14="http://schemas.microsoft.com/office/powerpoint/2010/main" val="2801567276"/>
+      </p:ext>
+    </p:extLst>
+  </p:cSld>
+  <p:clrMapOvr>
+    <a:masterClrMapping/>
+  </p:clrMapOvr>
+</p:sld>
+</file>
+
+<file path=ppt/slides/slide71.xml><?xml version="1.0" encoding="utf-8"?>
+<p:sld xmlns:a="http://schemas.openxmlformats.org/drawingml/2006/main" xmlns:r="http://schemas.openxmlformats.org/officeDocument/2006/relationships" xmlns:p="http://schemas.openxmlformats.org/presentationml/2006/main">
+  <p:cSld>
+    <p:spTree>
+      <p:nvGrpSpPr>
+        <p:cNvPr id="1" name="">
+          <a:extLst>
+            <a:ext uri="{FF2B5EF4-FFF2-40B4-BE49-F238E27FC236}">
+              <a16:creationId xmlns:a16="http://schemas.microsoft.com/office/drawing/2014/main" id="{E61BDCEA-69F4-61B0-F8ED-79AF357DFB5A}"/>
+            </a:ext>
+          </a:extLst>
+        </p:cNvPr>
+        <p:cNvGrpSpPr/>
+        <p:nvPr/>
+      </p:nvGrpSpPr>
+      <p:grpSpPr>
+        <a:xfrm>
+          <a:off x="0" y="0"/>
+          <a:ext cx="0" cy="0"/>
+          <a:chOff x="0" y="0"/>
+          <a:chExt cx="0" cy="0"/>
+        </a:xfrm>
+      </p:grpSpPr>
+      <p:sp>
+        <p:nvSpPr>
+          <p:cNvPr id="2" name="Title 1">
+            <a:extLst>
+              <a:ext uri="{FF2B5EF4-FFF2-40B4-BE49-F238E27FC236}">
+                <a16:creationId xmlns:a16="http://schemas.microsoft.com/office/drawing/2014/main" id="{4C824553-481D-C5FA-DF08-53BF77C24F17}"/>
+              </a:ext>
+            </a:extLst>
+          </p:cNvPr>
+          <p:cNvSpPr>
+            <a:spLocks noGrp="1"/>
+          </p:cNvSpPr>
+          <p:nvPr>
+            <p:ph type="title"/>
+          </p:nvPr>
+        </p:nvSpPr>
+        <p:spPr/>
+        <p:txBody>
+          <a:bodyPr/>
+          <a:lstStyle/>
+          <a:p>
+            <a:r>
+              <a:rPr lang="en-US" dirty="0"/>
+              <a:t>Laplace smoothing</a:t>
+            </a:r>
+          </a:p>
+        </p:txBody>
+      </p:sp>
+      <p:sp>
+        <p:nvSpPr>
+          <p:cNvPr id="3" name="Content Placeholder 2">
+            <a:extLst>
+              <a:ext uri="{FF2B5EF4-FFF2-40B4-BE49-F238E27FC236}">
+                <a16:creationId xmlns:a16="http://schemas.microsoft.com/office/drawing/2014/main" id="{5D9A0468-2E9B-1DE6-2F08-3F65F1B690E3}"/>
+              </a:ext>
+            </a:extLst>
+          </p:cNvPr>
+          <p:cNvSpPr>
+            <a:spLocks noGrp="1"/>
+          </p:cNvSpPr>
+          <p:nvPr>
+            <p:ph idx="1"/>
+          </p:nvPr>
+        </p:nvSpPr>
+        <p:spPr/>
+        <p:txBody>
+          <a:bodyPr/>
+          <a:lstStyle/>
+          <a:p>
+            <a:r>
+              <a:rPr lang="en-US" dirty="0"/>
+              <a:t>Also called as Add-1 estimation</a:t>
+            </a:r>
+          </a:p>
+          <a:p>
+            <a:pPr lvl="1"/>
+            <a:r>
+              <a:rPr lang="en-US" dirty="0"/>
+              <a:t>Probability can not be zero</a:t>
+            </a:r>
+          </a:p>
+          <a:p>
+            <a:pPr lvl="1"/>
+            <a:r>
+              <a:rPr lang="en-US" dirty="0"/>
+              <a:t>Just add one to all the counts</a:t>
+            </a:r>
+          </a:p>
+          <a:p>
+            <a:pPr marL="457200" lvl="1" indent="0">
+              <a:buNone/>
+            </a:pPr>
+            <a:endParaRPr lang="en-US" dirty="0"/>
+          </a:p>
+          <a:p>
+            <a:pPr marL="457200" lvl="1" indent="0">
+              <a:buNone/>
+            </a:pPr>
+            <a:endParaRPr lang="en-US" dirty="0"/>
+          </a:p>
+          <a:p>
+            <a:pPr marL="457200" lvl="1" indent="0">
+              <a:buNone/>
+            </a:pPr>
+            <a:endParaRPr lang="en-US" dirty="0"/>
+          </a:p>
+        </p:txBody>
+      </p:sp>
+      <p:graphicFrame>
+        <p:nvGraphicFramePr>
+          <p:cNvPr id="4" name="Object 4">
+            <a:extLst>
+              <a:ext uri="{FF2B5EF4-FFF2-40B4-BE49-F238E27FC236}">
+                <a16:creationId xmlns:a16="http://schemas.microsoft.com/office/drawing/2014/main" id="{9040AA5F-70A5-AF63-A053-4FB60FD8DCCB}"/>
+              </a:ext>
+            </a:extLst>
+          </p:cNvPr>
+          <p:cNvGraphicFramePr>
+            <a:graphicFrameLocks noChangeAspect="1"/>
+          </p:cNvGraphicFramePr>
+          <p:nvPr>
+            <p:extLst>
+              <p:ext uri="{D42A27DB-BD31-4B8C-83A1-F6EECF244321}">
+                <p14:modId xmlns:p14="http://schemas.microsoft.com/office/powerpoint/2010/main" val="664141153"/>
+              </p:ext>
+            </p:extLst>
+          </p:nvPr>
+        </p:nvGraphicFramePr>
+        <p:xfrm>
+          <a:off x="872826" y="4354822"/>
+          <a:ext cx="3721100" cy="995362"/>
+        </p:xfrm>
+        <a:graphic>
+          <a:graphicData uri="http://schemas.openxmlformats.org/presentationml/2006/ole">
+            <mc:AlternateContent xmlns:mc="http://schemas.openxmlformats.org/markup-compatibility/2006">
+              <mc:Choice xmlns:v="urn:schemas-microsoft-com:vml" Requires="v">
+                <p:oleObj name="Equation" r:id="rId2" imgW="1599840" imgH="420480" progId="Equation.3">
+                  <p:embed/>
+                </p:oleObj>
+              </mc:Choice>
+              <mc:Fallback>
+                <p:oleObj name="Equation" r:id="rId2" imgW="1599840" imgH="420480" progId="Equation.3">
+                  <p:embed/>
+                  <p:pic>
+                    <p:nvPicPr>
+                      <p:cNvPr id="9" name="Object 4"/>
+                      <p:cNvPicPr>
+                        <a:picLocks noChangeAspect="1" noChangeArrowheads="1"/>
+                      </p:cNvPicPr>
+                      <p:nvPr/>
+                    </p:nvPicPr>
+                    <p:blipFill>
+                      <a:blip r:embed="rId3">
+                        <a:extLst>
+                          <a:ext uri="{28A0092B-C50C-407E-A947-70E740481C1C}">
+                            <a14:useLocalDpi xmlns:a14="http://schemas.microsoft.com/office/drawing/2010/main" val="0"/>
+                          </a:ext>
+                        </a:extLst>
+                      </a:blip>
+                      <a:srcRect/>
+                      <a:stretch>
+                        <a:fillRect/>
+                      </a:stretch>
+                    </p:blipFill>
+                    <p:spPr bwMode="auto">
+                      <a:xfrm>
+                        <a:off x="872826" y="4354822"/>
+                        <a:ext cx="3721100" cy="995362"/>
+                      </a:xfrm>
+                      <a:prstGeom prst="rect">
+                        <a:avLst/>
+                      </a:prstGeom>
+                      <a:noFill/>
+                      <a:extLst>
+                        <a:ext uri="{909E8E84-426E-40DD-AFC4-6F175D3DCCD1}">
+                          <a14:hiddenFill xmlns:a14="http://schemas.microsoft.com/office/drawing/2010/main">
+                            <a:solidFill>
+                              <a:srgbClr val="FFFFFF"/>
+                            </a:solidFill>
+                          </a14:hiddenFill>
+                        </a:ext>
+                      </a:extLst>
+                    </p:spPr>
+                  </p:pic>
+                </p:oleObj>
+              </mc:Fallback>
+            </mc:AlternateContent>
+          </a:graphicData>
+        </a:graphic>
+      </p:graphicFrame>
+      <p:sp>
+        <p:nvSpPr>
+          <p:cNvPr id="5" name="Rectangle 4">
+            <a:extLst>
+              <a:ext uri="{FF2B5EF4-FFF2-40B4-BE49-F238E27FC236}">
+                <a16:creationId xmlns:a16="http://schemas.microsoft.com/office/drawing/2014/main" id="{9CD55E9F-3763-A55C-D8E1-63FE72B43BE8}"/>
+              </a:ext>
+            </a:extLst>
+          </p:cNvPr>
+          <p:cNvSpPr/>
+          <p:nvPr/>
+        </p:nvSpPr>
+        <p:spPr>
+          <a:xfrm>
+            <a:off x="1113458" y="5601537"/>
+            <a:ext cx="3691497" cy="669303"/>
+          </a:xfrm>
+          <a:prstGeom prst="rect">
+            <a:avLst/>
+          </a:prstGeom>
+        </p:spPr>
+        <p:style>
+          <a:lnRef idx="2">
+            <a:schemeClr val="accent3">
+              <a:shade val="15000"/>
+            </a:schemeClr>
+          </a:lnRef>
+          <a:fillRef idx="1">
+            <a:schemeClr val="accent3"/>
+          </a:fillRef>
+          <a:effectRef idx="0">
+            <a:schemeClr val="accent3"/>
+          </a:effectRef>
+          <a:fontRef idx="minor">
+            <a:schemeClr val="lt1"/>
+          </a:fontRef>
+        </p:style>
+        <p:txBody>
+          <a:bodyPr rtlCol="0" anchor="ctr"/>
+          <a:lstStyle/>
+          <a:p>
+            <a:pPr marL="457200" lvl="1" indent="0" algn="ctr">
+              <a:buNone/>
+            </a:pPr>
+            <a:r>
+              <a:rPr lang="en-US" dirty="0"/>
+              <a:t>MLE estimation </a:t>
+            </a:r>
+          </a:p>
+        </p:txBody>
+      </p:sp>
+      <p:sp>
+        <p:nvSpPr>
+          <p:cNvPr id="6" name="Rectangle 5">
+            <a:extLst>
+              <a:ext uri="{FF2B5EF4-FFF2-40B4-BE49-F238E27FC236}">
+                <a16:creationId xmlns:a16="http://schemas.microsoft.com/office/drawing/2014/main" id="{19A0B892-576A-FB0D-0367-24D913412BE3}"/>
+              </a:ext>
+            </a:extLst>
+          </p:cNvPr>
+          <p:cNvSpPr/>
+          <p:nvPr/>
+        </p:nvSpPr>
+        <p:spPr>
+          <a:xfrm>
+            <a:off x="7242948" y="5626403"/>
+            <a:ext cx="3691497" cy="669303"/>
+          </a:xfrm>
+          <a:prstGeom prst="rect">
+            <a:avLst/>
+          </a:prstGeom>
+        </p:spPr>
+        <p:style>
+          <a:lnRef idx="2">
+            <a:schemeClr val="accent3">
+              <a:shade val="15000"/>
+            </a:schemeClr>
+          </a:lnRef>
+          <a:fillRef idx="1">
+            <a:schemeClr val="accent3"/>
+          </a:fillRef>
+          <a:effectRef idx="0">
+            <a:schemeClr val="accent3"/>
+          </a:effectRef>
+          <a:fontRef idx="minor">
+            <a:schemeClr val="lt1"/>
+          </a:fontRef>
+        </p:style>
+        <p:txBody>
+          <a:bodyPr rtlCol="0" anchor="ctr"/>
+          <a:lstStyle/>
+          <a:p>
+            <a:pPr marL="457200" lvl="1" indent="0" algn="ctr">
+              <a:buNone/>
+            </a:pPr>
+            <a:r>
+              <a:rPr lang="en-US" dirty="0"/>
+              <a:t>Add-1 estimation</a:t>
+            </a:r>
+          </a:p>
+        </p:txBody>
+      </p:sp>
+      <p:graphicFrame>
+        <p:nvGraphicFramePr>
+          <p:cNvPr id="7" name="Object 4">
+            <a:extLst>
+              <a:ext uri="{FF2B5EF4-FFF2-40B4-BE49-F238E27FC236}">
+                <a16:creationId xmlns:a16="http://schemas.microsoft.com/office/drawing/2014/main" id="{1D34D922-AC09-6C0A-6B06-D6433194B56B}"/>
+              </a:ext>
+            </a:extLst>
+          </p:cNvPr>
+          <p:cNvGraphicFramePr>
+            <a:graphicFrameLocks noChangeAspect="1"/>
+          </p:cNvGraphicFramePr>
+          <p:nvPr>
+            <p:extLst>
+              <p:ext uri="{D42A27DB-BD31-4B8C-83A1-F6EECF244321}">
+                <p14:modId xmlns:p14="http://schemas.microsoft.com/office/powerpoint/2010/main" val="3714362028"/>
+              </p:ext>
+            </p:extLst>
+          </p:nvPr>
+        </p:nvGraphicFramePr>
+        <p:xfrm>
+          <a:off x="6892097" y="4184896"/>
+          <a:ext cx="4249738" cy="995362"/>
+        </p:xfrm>
+        <a:graphic>
+          <a:graphicData uri="http://schemas.openxmlformats.org/presentationml/2006/ole">
+            <mc:AlternateContent xmlns:mc="http://schemas.openxmlformats.org/markup-compatibility/2006">
+              <mc:Choice xmlns:v="urn:schemas-microsoft-com:vml" Requires="v">
+                <p:oleObj name="Equation" r:id="rId4" imgW="1828440" imgH="420480" progId="Equation.3">
+                  <p:embed/>
+                </p:oleObj>
+              </mc:Choice>
+              <mc:Fallback>
+                <p:oleObj name="Equation" r:id="rId4" imgW="1828440" imgH="420480" progId="Equation.3">
+                  <p:embed/>
+                  <p:pic>
+                    <p:nvPicPr>
+                      <p:cNvPr id="10" name="Object 4"/>
+                      <p:cNvPicPr>
+                        <a:picLocks noChangeAspect="1" noChangeArrowheads="1"/>
+                      </p:cNvPicPr>
+                      <p:nvPr/>
+                    </p:nvPicPr>
+                    <p:blipFill>
+                      <a:blip r:embed="rId5">
+                        <a:extLst>
+                          <a:ext uri="{28A0092B-C50C-407E-A947-70E740481C1C}">
+                            <a14:useLocalDpi xmlns:a14="http://schemas.microsoft.com/office/drawing/2010/main" val="0"/>
+                          </a:ext>
+                        </a:extLst>
+                      </a:blip>
+                      <a:srcRect/>
+                      <a:stretch>
+                        <a:fillRect/>
+                      </a:stretch>
+                    </p:blipFill>
+                    <p:spPr bwMode="auto">
+                      <a:xfrm>
+                        <a:off x="6892097" y="4184896"/>
+                        <a:ext cx="4249738" cy="995362"/>
+                      </a:xfrm>
+                      <a:prstGeom prst="rect">
+                        <a:avLst/>
+                      </a:prstGeom>
+                      <a:noFill/>
+                      <a:extLst>
+                        <a:ext uri="{909E8E84-426E-40DD-AFC4-6F175D3DCCD1}">
+                          <a14:hiddenFill xmlns:a14="http://schemas.microsoft.com/office/drawing/2010/main">
+                            <a:solidFill>
+                              <a:srgbClr val="FFFFFF"/>
+                            </a:solidFill>
+                          </a14:hiddenFill>
+                        </a:ext>
+                      </a:extLst>
+                    </p:spPr>
+                  </p:pic>
+                </p:oleObj>
+              </mc:Fallback>
+            </mc:AlternateContent>
+          </a:graphicData>
+        </a:graphic>
+      </p:graphicFrame>
+    </p:spTree>
+    <p:extLst>
+      <p:ext uri="{BB962C8B-B14F-4D97-AF65-F5344CB8AC3E}">
+        <p14:creationId xmlns:p14="http://schemas.microsoft.com/office/powerpoint/2010/main" val="2276529174"/>
+      </p:ext>
+    </p:extLst>
+  </p:cSld>
+  <p:clrMapOvr>
+    <a:masterClrMapping/>
+  </p:clrMapOvr>
+</p:sld>
+</file>
+
+<file path=ppt/slides/slide72.xml><?xml version="1.0" encoding="utf-8"?>
+<p:sld xmlns:a="http://schemas.openxmlformats.org/drawingml/2006/main" xmlns:r="http://schemas.openxmlformats.org/officeDocument/2006/relationships" xmlns:p="http://schemas.openxmlformats.org/presentationml/2006/main">
+  <p:cSld>
+    <p:spTree>
+      <p:nvGrpSpPr>
+        <p:cNvPr id="1" name="">
+          <a:extLst>
+            <a:ext uri="{FF2B5EF4-FFF2-40B4-BE49-F238E27FC236}">
+              <a16:creationId xmlns:a16="http://schemas.microsoft.com/office/drawing/2014/main" id="{D784B904-5693-DD7A-A7B1-D9DE6979C4EE}"/>
+            </a:ext>
+          </a:extLst>
+        </p:cNvPr>
+        <p:cNvGrpSpPr/>
+        <p:nvPr/>
+      </p:nvGrpSpPr>
+      <p:grpSpPr>
+        <a:xfrm>
+          <a:off x="0" y="0"/>
+          <a:ext cx="0" cy="0"/>
+          <a:chOff x="0" y="0"/>
+          <a:chExt cx="0" cy="0"/>
+        </a:xfrm>
+      </p:grpSpPr>
+      <p:sp>
+        <p:nvSpPr>
+          <p:cNvPr id="2" name="Title 1">
+            <a:extLst>
+              <a:ext uri="{FF2B5EF4-FFF2-40B4-BE49-F238E27FC236}">
+                <a16:creationId xmlns:a16="http://schemas.microsoft.com/office/drawing/2014/main" id="{7A21B3F5-BE68-259A-F44C-A77FBDD3FEB2}"/>
+              </a:ext>
+            </a:extLst>
+          </p:cNvPr>
+          <p:cNvSpPr>
+            <a:spLocks noGrp="1"/>
+          </p:cNvSpPr>
+          <p:nvPr>
+            <p:ph type="title"/>
+          </p:nvPr>
+        </p:nvSpPr>
+        <p:spPr/>
+        <p:txBody>
+          <a:bodyPr/>
+          <a:lstStyle/>
+          <a:p>
+            <a:r>
+              <a:rPr lang="en-US" dirty="0"/>
+              <a:t>Laplace smoothing: Example</a:t>
+            </a:r>
+          </a:p>
+        </p:txBody>
+      </p:sp>
+      <p:sp>
+        <p:nvSpPr>
+          <p:cNvPr id="3" name="Content Placeholder 2">
+            <a:extLst>
+              <a:ext uri="{FF2B5EF4-FFF2-40B4-BE49-F238E27FC236}">
+                <a16:creationId xmlns:a16="http://schemas.microsoft.com/office/drawing/2014/main" id="{3FDC2834-EF03-498F-06A5-8211F9CB5366}"/>
+              </a:ext>
+            </a:extLst>
+          </p:cNvPr>
+          <p:cNvSpPr>
+            <a:spLocks noGrp="1"/>
+          </p:cNvSpPr>
+          <p:nvPr>
+            <p:ph idx="1"/>
+          </p:nvPr>
+        </p:nvSpPr>
+        <p:spPr/>
+        <p:txBody>
+          <a:bodyPr/>
+          <a:lstStyle/>
+          <a:p>
+            <a:r>
+              <a:rPr lang="en-US" dirty="0"/>
+              <a:t>Consider a context</a:t>
+            </a:r>
+          </a:p>
+          <a:p>
+            <a:pPr lvl="1"/>
+            <a:r>
+              <a:rPr lang="en-US" dirty="0"/>
+              <a:t>|V| = 5000</a:t>
+            </a:r>
+          </a:p>
+          <a:p>
+            <a:pPr lvl="1"/>
+            <a:r>
+              <a:rPr lang="en-US" dirty="0"/>
+              <a:t>Bigram “w1 w2” occurs 10 times</a:t>
+            </a:r>
+          </a:p>
+          <a:p>
+            <a:pPr lvl="1"/>
+            <a:r>
+              <a:rPr lang="en-US" dirty="0"/>
+              <a:t>Bigram “w1 w2 w3” occurs 9 times</a:t>
+            </a:r>
+          </a:p>
+          <a:p>
+            <a:pPr marL="457200" lvl="1" indent="0">
+              <a:buNone/>
+            </a:pPr>
+            <a:endParaRPr lang="en-US" dirty="0"/>
+          </a:p>
+          <a:p>
+            <a:pPr marL="457200" lvl="1" indent="0">
+              <a:buNone/>
+            </a:pPr>
+            <a:endParaRPr lang="en-US" dirty="0"/>
+          </a:p>
+          <a:p>
+            <a:pPr marL="457200" lvl="1" indent="0">
+              <a:buNone/>
+            </a:pPr>
+            <a:endParaRPr lang="en-US" dirty="0"/>
+          </a:p>
+        </p:txBody>
+      </p:sp>
+      <p:graphicFrame>
+        <p:nvGraphicFramePr>
+          <p:cNvPr id="4" name="Object 4">
+            <a:extLst>
+              <a:ext uri="{FF2B5EF4-FFF2-40B4-BE49-F238E27FC236}">
+                <a16:creationId xmlns:a16="http://schemas.microsoft.com/office/drawing/2014/main" id="{8C9ACF91-0FF7-3797-2C21-A4D1AB5D2BBF}"/>
+              </a:ext>
+            </a:extLst>
+          </p:cNvPr>
+          <p:cNvGraphicFramePr>
+            <a:graphicFrameLocks noChangeAspect="1"/>
+          </p:cNvGraphicFramePr>
+          <p:nvPr>
+            <p:extLst>
+              <p:ext uri="{D42A27DB-BD31-4B8C-83A1-F6EECF244321}">
+                <p14:modId xmlns:p14="http://schemas.microsoft.com/office/powerpoint/2010/main" val="2501271840"/>
+              </p:ext>
+            </p:extLst>
+          </p:nvPr>
+        </p:nvGraphicFramePr>
+        <p:xfrm>
+          <a:off x="872826" y="4066066"/>
+          <a:ext cx="3721100" cy="995362"/>
+        </p:xfrm>
+        <a:graphic>
+          <a:graphicData uri="http://schemas.openxmlformats.org/presentationml/2006/ole">
+            <mc:AlternateContent xmlns:mc="http://schemas.openxmlformats.org/markup-compatibility/2006">
+              <mc:Choice xmlns:v="urn:schemas-microsoft-com:vml" Requires="v">
+                <p:oleObj name="Equation" r:id="rId2" imgW="1599840" imgH="420480" progId="Equation.3">
+                  <p:embed/>
+                </p:oleObj>
+              </mc:Choice>
+              <mc:Fallback>
+                <p:oleObj name="Equation" r:id="rId2" imgW="1599840" imgH="420480" progId="Equation.3">
+                  <p:embed/>
+                  <p:pic>
+                    <p:nvPicPr>
+                      <p:cNvPr id="4" name="Object 4">
+                        <a:extLst>
+                          <a:ext uri="{FF2B5EF4-FFF2-40B4-BE49-F238E27FC236}">
+                            <a16:creationId xmlns:a16="http://schemas.microsoft.com/office/drawing/2014/main" id="{9040AA5F-70A5-AF63-A053-4FB60FD8DCCB}"/>
+                          </a:ext>
+                        </a:extLst>
+                      </p:cNvPr>
+                      <p:cNvPicPr>
+                        <a:picLocks noChangeAspect="1" noChangeArrowheads="1"/>
+                      </p:cNvPicPr>
+                      <p:nvPr/>
+                    </p:nvPicPr>
+                    <p:blipFill>
+                      <a:blip r:embed="rId3">
+                        <a:extLst>
+                          <a:ext uri="{28A0092B-C50C-407E-A947-70E740481C1C}">
+                            <a14:useLocalDpi xmlns:a14="http://schemas.microsoft.com/office/drawing/2010/main" val="0"/>
+                          </a:ext>
+                        </a:extLst>
+                      </a:blip>
+                      <a:srcRect/>
+                      <a:stretch>
+                        <a:fillRect/>
+                      </a:stretch>
+                    </p:blipFill>
+                    <p:spPr bwMode="auto">
+                      <a:xfrm>
+                        <a:off x="872826" y="4066066"/>
+                        <a:ext cx="3721100" cy="995362"/>
+                      </a:xfrm>
+                      <a:prstGeom prst="rect">
+                        <a:avLst/>
+                      </a:prstGeom>
+                      <a:noFill/>
+                      <a:extLst>
+                        <a:ext uri="{909E8E84-426E-40DD-AFC4-6F175D3DCCD1}">
+                          <a14:hiddenFill xmlns:a14="http://schemas.microsoft.com/office/drawing/2010/main">
+                            <a:solidFill>
+                              <a:srgbClr val="FFFFFF"/>
+                            </a:solidFill>
+                          </a14:hiddenFill>
+                        </a:ext>
+                      </a:extLst>
+                    </p:spPr>
+                  </p:pic>
+                </p:oleObj>
+              </mc:Fallback>
+            </mc:AlternateContent>
+          </a:graphicData>
+        </a:graphic>
+      </p:graphicFrame>
+      <p:sp>
+        <p:nvSpPr>
+          <p:cNvPr id="5" name="Rectangle 4">
+            <a:extLst>
+              <a:ext uri="{FF2B5EF4-FFF2-40B4-BE49-F238E27FC236}">
+                <a16:creationId xmlns:a16="http://schemas.microsoft.com/office/drawing/2014/main" id="{10A83132-10E0-A3D8-81FB-1EA3B078C69B}"/>
+              </a:ext>
+            </a:extLst>
+          </p:cNvPr>
+          <p:cNvSpPr/>
+          <p:nvPr/>
+        </p:nvSpPr>
+        <p:spPr>
+          <a:xfrm>
+            <a:off x="969080" y="5216529"/>
+            <a:ext cx="3691497" cy="669303"/>
+          </a:xfrm>
+          <a:prstGeom prst="rect">
+            <a:avLst/>
+          </a:prstGeom>
+        </p:spPr>
+        <p:style>
+          <a:lnRef idx="2">
+            <a:schemeClr val="accent3">
+              <a:shade val="15000"/>
+            </a:schemeClr>
+          </a:lnRef>
+          <a:fillRef idx="1">
+            <a:schemeClr val="accent3"/>
+          </a:fillRef>
+          <a:effectRef idx="0">
+            <a:schemeClr val="accent3"/>
+          </a:effectRef>
+          <a:fontRef idx="minor">
+            <a:schemeClr val="lt1"/>
+          </a:fontRef>
+        </p:style>
+        <p:txBody>
+          <a:bodyPr rtlCol="0" anchor="ctr"/>
+          <a:lstStyle/>
+          <a:p>
+            <a:pPr marL="457200" lvl="1" indent="0" algn="ctr">
+              <a:buNone/>
+            </a:pPr>
+            <a:r>
+              <a:rPr lang="en-US" dirty="0"/>
+              <a:t>P</a:t>
+            </a:r>
+            <a:r>
+              <a:rPr lang="en-US" sz="1050" dirty="0"/>
+              <a:t>MLE </a:t>
+            </a:r>
+            <a:r>
+              <a:rPr lang="en-US" dirty="0"/>
+              <a:t>(w3 | w1, w2) = 9 /10</a:t>
+            </a:r>
+          </a:p>
+        </p:txBody>
+      </p:sp>
+      <p:sp>
+        <p:nvSpPr>
+          <p:cNvPr id="6" name="Rectangle 5">
+            <a:extLst>
+              <a:ext uri="{FF2B5EF4-FFF2-40B4-BE49-F238E27FC236}">
+                <a16:creationId xmlns:a16="http://schemas.microsoft.com/office/drawing/2014/main" id="{33A85DE4-8FB1-6470-718D-502E35FC17D0}"/>
+              </a:ext>
+            </a:extLst>
+          </p:cNvPr>
+          <p:cNvSpPr/>
+          <p:nvPr/>
+        </p:nvSpPr>
+        <p:spPr>
+          <a:xfrm>
+            <a:off x="6716791" y="5241395"/>
+            <a:ext cx="4826971" cy="669303"/>
+          </a:xfrm>
+          <a:prstGeom prst="rect">
+            <a:avLst/>
+          </a:prstGeom>
+        </p:spPr>
+        <p:style>
+          <a:lnRef idx="2">
+            <a:schemeClr val="accent3">
+              <a:shade val="15000"/>
+            </a:schemeClr>
+          </a:lnRef>
+          <a:fillRef idx="1">
+            <a:schemeClr val="accent3"/>
+          </a:fillRef>
+          <a:effectRef idx="0">
+            <a:schemeClr val="accent3"/>
+          </a:effectRef>
+          <a:fontRef idx="minor">
+            <a:schemeClr val="lt1"/>
+          </a:fontRef>
+        </p:style>
+        <p:txBody>
+          <a:bodyPr rtlCol="0" anchor="ctr"/>
+          <a:lstStyle/>
+          <a:p>
+            <a:pPr marL="457200" lvl="1" indent="0" algn="ctr">
+              <a:buNone/>
+            </a:pPr>
+            <a:r>
+              <a:rPr lang="en-US" dirty="0"/>
+              <a:t>P</a:t>
+            </a:r>
+            <a:r>
+              <a:rPr lang="en-US" sz="1050" dirty="0"/>
+              <a:t>Add-1 </a:t>
+            </a:r>
+            <a:r>
+              <a:rPr lang="en-US" dirty="0"/>
+              <a:t>(w3 | w1, w2 ) = (9+1)/(10+5000)</a:t>
+            </a:r>
+          </a:p>
+        </p:txBody>
+      </p:sp>
+      <p:graphicFrame>
+        <p:nvGraphicFramePr>
+          <p:cNvPr id="7" name="Object 4">
+            <a:extLst>
+              <a:ext uri="{FF2B5EF4-FFF2-40B4-BE49-F238E27FC236}">
+                <a16:creationId xmlns:a16="http://schemas.microsoft.com/office/drawing/2014/main" id="{DE994CCD-47F2-B6D1-CC40-428454D9D90D}"/>
+              </a:ext>
+            </a:extLst>
+          </p:cNvPr>
+          <p:cNvGraphicFramePr>
+            <a:graphicFrameLocks noChangeAspect="1"/>
+          </p:cNvGraphicFramePr>
+          <p:nvPr>
+            <p:extLst>
+              <p:ext uri="{D42A27DB-BD31-4B8C-83A1-F6EECF244321}">
+                <p14:modId xmlns:p14="http://schemas.microsoft.com/office/powerpoint/2010/main" val="3870313972"/>
+              </p:ext>
+            </p:extLst>
+          </p:nvPr>
+        </p:nvGraphicFramePr>
+        <p:xfrm>
+          <a:off x="6892097" y="3992392"/>
+          <a:ext cx="4249738" cy="995362"/>
+        </p:xfrm>
+        <a:graphic>
+          <a:graphicData uri="http://schemas.openxmlformats.org/presentationml/2006/ole">
+            <mc:AlternateContent xmlns:mc="http://schemas.openxmlformats.org/markup-compatibility/2006">
+              <mc:Choice xmlns:v="urn:schemas-microsoft-com:vml" Requires="v">
+                <p:oleObj name="Equation" r:id="rId4" imgW="1828440" imgH="420480" progId="Equation.3">
+                  <p:embed/>
+                </p:oleObj>
+              </mc:Choice>
+              <mc:Fallback>
+                <p:oleObj name="Equation" r:id="rId4" imgW="1828440" imgH="420480" progId="Equation.3">
+                  <p:embed/>
+                  <p:pic>
+                    <p:nvPicPr>
+                      <p:cNvPr id="7" name="Object 4">
+                        <a:extLst>
+                          <a:ext uri="{FF2B5EF4-FFF2-40B4-BE49-F238E27FC236}">
+                            <a16:creationId xmlns:a16="http://schemas.microsoft.com/office/drawing/2014/main" id="{1D34D922-AC09-6C0A-6B06-D6433194B56B}"/>
+                          </a:ext>
+                        </a:extLst>
+                      </p:cNvPr>
+                      <p:cNvPicPr>
+                        <a:picLocks noChangeAspect="1" noChangeArrowheads="1"/>
+                      </p:cNvPicPr>
+                      <p:nvPr/>
+                    </p:nvPicPr>
+                    <p:blipFill>
+                      <a:blip r:embed="rId5">
+                        <a:extLst>
+                          <a:ext uri="{28A0092B-C50C-407E-A947-70E740481C1C}">
+                            <a14:useLocalDpi xmlns:a14="http://schemas.microsoft.com/office/drawing/2010/main" val="0"/>
+                          </a:ext>
+                        </a:extLst>
+                      </a:blip>
+                      <a:srcRect/>
+                      <a:stretch>
+                        <a:fillRect/>
+                      </a:stretch>
+                    </p:blipFill>
+                    <p:spPr bwMode="auto">
+                      <a:xfrm>
+                        <a:off x="6892097" y="3992392"/>
+                        <a:ext cx="4249738" cy="995362"/>
+                      </a:xfrm>
+                      <a:prstGeom prst="rect">
+                        <a:avLst/>
+                      </a:prstGeom>
+                      <a:noFill/>
+                      <a:extLst>
+                        <a:ext uri="{909E8E84-426E-40DD-AFC4-6F175D3DCCD1}">
+                          <a14:hiddenFill xmlns:a14="http://schemas.microsoft.com/office/drawing/2010/main">
+                            <a:solidFill>
+                              <a:srgbClr val="FFFFFF"/>
+                            </a:solidFill>
+                          </a14:hiddenFill>
+                        </a:ext>
+                      </a:extLst>
+                    </p:spPr>
+                  </p:pic>
+                </p:oleObj>
+              </mc:Fallback>
+            </mc:AlternateContent>
+          </a:graphicData>
+        </a:graphic>
+      </p:graphicFrame>
+      <p:sp>
+        <p:nvSpPr>
+          <p:cNvPr id="8" name="Content Placeholder 3">
+            <a:extLst>
+              <a:ext uri="{FF2B5EF4-FFF2-40B4-BE49-F238E27FC236}">
+                <a16:creationId xmlns:a16="http://schemas.microsoft.com/office/drawing/2014/main" id="{76F66CF5-A31E-04C2-90B7-DB477C58090B}"/>
+              </a:ext>
+            </a:extLst>
+          </p:cNvPr>
+          <p:cNvSpPr txBox="1">
+            <a:spLocks/>
+          </p:cNvSpPr>
+          <p:nvPr/>
+        </p:nvSpPr>
+        <p:spPr>
+          <a:xfrm>
+            <a:off x="1076841" y="6233437"/>
+            <a:ext cx="10418237" cy="424732"/>
+          </a:xfrm>
+          <a:prstGeom prst="rect">
+            <a:avLst/>
+          </a:prstGeom>
+          <a:noFill/>
+        </p:spPr>
+        <p:txBody>
+          <a:bodyPr vert="horz" wrap="none" lIns="91440" tIns="45720" rIns="91440" bIns="45720" rtlCol="0">
+            <a:spAutoFit/>
+          </a:bodyPr>
+          <a:lstStyle>
+            <a:lvl1pPr marL="228600" indent="-228600" algn="l" defTabSz="914400" rtl="0" eaLnBrk="1" latinLnBrk="0" hangingPunct="1">
+              <a:lnSpc>
+                <a:spcPct val="90000"/>
+              </a:lnSpc>
+              <a:spcBef>
+                <a:spcPts val="1000"/>
+              </a:spcBef>
+              <a:buFont typeface="Arial" panose="020B0604020202020204" pitchFamily="34" charset="0"/>
+              <a:buChar char="•"/>
+              <a:defRPr sz="2400" kern="1200">
+                <a:solidFill>
+                  <a:schemeClr val="tx1"/>
+                </a:solidFill>
+                <a:latin typeface="+mn-lt"/>
+                <a:ea typeface="+mn-ea"/>
+                <a:cs typeface="+mn-cs"/>
+              </a:defRPr>
+            </a:lvl1pPr>
+            <a:lvl2pPr marL="685800" indent="-228600" algn="l" defTabSz="914400" rtl="0" eaLnBrk="1" latinLnBrk="0" hangingPunct="1">
+              <a:lnSpc>
+                <a:spcPct val="90000"/>
+              </a:lnSpc>
+              <a:spcBef>
+                <a:spcPts val="500"/>
+              </a:spcBef>
+              <a:buFont typeface="Arial" panose="020B0604020202020204" pitchFamily="34" charset="0"/>
+              <a:buChar char="•"/>
+              <a:defRPr sz="2000" kern="1200">
+                <a:solidFill>
+                  <a:schemeClr val="tx1"/>
+                </a:solidFill>
+                <a:latin typeface="+mn-lt"/>
+                <a:ea typeface="+mn-ea"/>
+                <a:cs typeface="+mn-cs"/>
+              </a:defRPr>
+            </a:lvl2pPr>
+            <a:lvl3pPr marL="1143000" indent="-228600" algn="l" defTabSz="914400" rtl="0" eaLnBrk="1" latinLnBrk="0" hangingPunct="1">
+              <a:lnSpc>
+                <a:spcPct val="90000"/>
+              </a:lnSpc>
+              <a:spcBef>
+                <a:spcPts val="500"/>
+              </a:spcBef>
+              <a:buFont typeface="Arial" panose="020B0604020202020204" pitchFamily="34" charset="0"/>
+              <a:buChar char="•"/>
+              <a:defRPr sz="1800" kern="1200">
+                <a:solidFill>
+                  <a:schemeClr val="tx1"/>
+                </a:solidFill>
+                <a:latin typeface="+mn-lt"/>
+                <a:ea typeface="+mn-ea"/>
+                <a:cs typeface="+mn-cs"/>
+              </a:defRPr>
+            </a:lvl3pPr>
+            <a:lvl4pPr marL="1600200" indent="-228600" algn="l" defTabSz="914400" rtl="0" eaLnBrk="1" latinLnBrk="0" hangingPunct="1">
+              <a:lnSpc>
+                <a:spcPct val="90000"/>
+              </a:lnSpc>
+              <a:spcBef>
+                <a:spcPts val="500"/>
+              </a:spcBef>
+              <a:buFont typeface="Arial" panose="020B0604020202020204" pitchFamily="34" charset="0"/>
+              <a:buChar char="•"/>
+              <a:defRPr sz="1600" kern="1200">
+                <a:solidFill>
+                  <a:schemeClr val="tx1"/>
+                </a:solidFill>
+                <a:latin typeface="+mn-lt"/>
+                <a:ea typeface="+mn-ea"/>
+                <a:cs typeface="+mn-cs"/>
+              </a:defRPr>
+            </a:lvl4pPr>
+            <a:lvl5pPr marL="2057400" indent="-228600" algn="l" defTabSz="914400" rtl="0" eaLnBrk="1" latinLnBrk="0" hangingPunct="1">
+              <a:lnSpc>
+                <a:spcPct val="90000"/>
+              </a:lnSpc>
+              <a:spcBef>
+                <a:spcPts val="500"/>
+              </a:spcBef>
+              <a:buFont typeface="Arial" panose="020B0604020202020204" pitchFamily="34" charset="0"/>
+              <a:buChar char="•"/>
+              <a:defRPr sz="1600" kern="1200">
+                <a:solidFill>
+                  <a:schemeClr val="tx1"/>
+                </a:solidFill>
+                <a:latin typeface="+mn-lt"/>
+                <a:ea typeface="+mn-ea"/>
+                <a:cs typeface="+mn-cs"/>
+              </a:defRPr>
+            </a:lvl5pPr>
+            <a:lvl6pPr marL="2514600" indent="-228600" algn="l" defTabSz="914400" rtl="0" eaLnBrk="1" latinLnBrk="0" hangingPunct="1">
+              <a:lnSpc>
+                <a:spcPct val="90000"/>
+              </a:lnSpc>
+              <a:spcBef>
+                <a:spcPts val="500"/>
+              </a:spcBef>
+              <a:buFont typeface="Arial" panose="020B0604020202020204" pitchFamily="34" charset="0"/>
+              <a:buChar char="•"/>
+              <a:defRPr sz="1400" kern="1200">
+                <a:solidFill>
+                  <a:schemeClr val="tx1"/>
+                </a:solidFill>
+                <a:latin typeface="+mn-lt"/>
+                <a:ea typeface="+mn-ea"/>
+                <a:cs typeface="+mn-cs"/>
+              </a:defRPr>
+            </a:lvl6pPr>
+            <a:lvl7pPr marL="2971800" indent="-228600" algn="l" defTabSz="914400" rtl="0" eaLnBrk="1" latinLnBrk="0" hangingPunct="1">
+              <a:lnSpc>
+                <a:spcPct val="90000"/>
+              </a:lnSpc>
+              <a:spcBef>
+                <a:spcPts val="500"/>
+              </a:spcBef>
+              <a:buFont typeface="Arial" panose="020B0604020202020204" pitchFamily="34" charset="0"/>
+              <a:buChar char="•"/>
+              <a:defRPr sz="1400" kern="1200">
+                <a:solidFill>
+                  <a:schemeClr val="tx1"/>
+                </a:solidFill>
+                <a:latin typeface="+mn-lt"/>
+                <a:ea typeface="+mn-ea"/>
+                <a:cs typeface="+mn-cs"/>
+              </a:defRPr>
+            </a:lvl7pPr>
+            <a:lvl8pPr marL="3429000" indent="-228600" algn="l" defTabSz="914400" rtl="0" eaLnBrk="1" latinLnBrk="0" hangingPunct="1">
+              <a:lnSpc>
+                <a:spcPct val="90000"/>
+              </a:lnSpc>
+              <a:spcBef>
+                <a:spcPts val="500"/>
+              </a:spcBef>
+              <a:buFont typeface="Arial" panose="020B0604020202020204" pitchFamily="34" charset="0"/>
+              <a:buChar char="•"/>
+              <a:defRPr sz="1400" kern="1200">
+                <a:solidFill>
+                  <a:schemeClr val="tx1"/>
+                </a:solidFill>
+                <a:latin typeface="+mn-lt"/>
+                <a:ea typeface="+mn-ea"/>
+                <a:cs typeface="+mn-cs"/>
+              </a:defRPr>
+            </a:lvl8pPr>
+            <a:lvl9pPr marL="3886200" indent="-228600" algn="l" defTabSz="914400" rtl="0" eaLnBrk="1" latinLnBrk="0" hangingPunct="1">
+              <a:lnSpc>
+                <a:spcPct val="90000"/>
+              </a:lnSpc>
+              <a:spcBef>
+                <a:spcPts val="500"/>
+              </a:spcBef>
+              <a:buFont typeface="Arial" panose="020B0604020202020204" pitchFamily="34" charset="0"/>
+              <a:buChar char="•"/>
+              <a:defRPr sz="1400" kern="1200">
+                <a:solidFill>
+                  <a:schemeClr val="tx1"/>
+                </a:solidFill>
+                <a:latin typeface="+mn-lt"/>
+                <a:ea typeface="+mn-ea"/>
+                <a:cs typeface="+mn-cs"/>
+              </a:defRPr>
+            </a:lvl9pPr>
+          </a:lstStyle>
+          <a:p>
+            <a:pPr marL="0" indent="0" algn="ctr">
+              <a:buFont typeface="Arial" panose="020B0604020202020204" pitchFamily="34" charset="0"/>
+              <a:buNone/>
+            </a:pPr>
+            <a:r>
+              <a:rPr lang="en-US" dirty="0">
+                <a:solidFill>
+                  <a:srgbClr val="FFFF00"/>
+                </a:solidFill>
+              </a:rPr>
+              <a:t>Laplace smoothing problem: Give too much probability to unseen n-grams</a:t>
+            </a:r>
+          </a:p>
+        </p:txBody>
+      </p:sp>
+    </p:spTree>
+    <p:extLst>
+      <p:ext uri="{BB962C8B-B14F-4D97-AF65-F5344CB8AC3E}">
+        <p14:creationId xmlns:p14="http://schemas.microsoft.com/office/powerpoint/2010/main" val="2440281144"/>
+      </p:ext>
+    </p:extLst>
+  </p:cSld>
+  <p:clrMapOvr>
+    <a:masterClrMapping/>
+  </p:clrMapOvr>
+</p:sld>
+</file>
+
+<file path=ppt/slides/slide73.xml><?xml version="1.0" encoding="utf-8"?>
+<p:sld xmlns:a="http://schemas.openxmlformats.org/drawingml/2006/main" xmlns:r="http://schemas.openxmlformats.org/officeDocument/2006/relationships" xmlns:p="http://schemas.openxmlformats.org/presentationml/2006/main">
+  <p:cSld>
+    <p:spTree>
+      <p:nvGrpSpPr>
+        <p:cNvPr id="1" name="">
+          <a:extLst>
+            <a:ext uri="{FF2B5EF4-FFF2-40B4-BE49-F238E27FC236}">
+              <a16:creationId xmlns:a16="http://schemas.microsoft.com/office/drawing/2014/main" id="{2BFCAB1F-35B7-1AE8-7D82-BB8B701EBC0C}"/>
+            </a:ext>
+          </a:extLst>
+        </p:cNvPr>
+        <p:cNvGrpSpPr/>
+        <p:nvPr/>
+      </p:nvGrpSpPr>
+      <p:grpSpPr>
+        <a:xfrm>
+          <a:off x="0" y="0"/>
+          <a:ext cx="0" cy="0"/>
+          <a:chOff x="0" y="0"/>
+          <a:chExt cx="0" cy="0"/>
+        </a:xfrm>
+      </p:grpSpPr>
+      <p:sp>
+        <p:nvSpPr>
+          <p:cNvPr id="2" name="Title 1">
+            <a:extLst>
+              <a:ext uri="{FF2B5EF4-FFF2-40B4-BE49-F238E27FC236}">
+                <a16:creationId xmlns:a16="http://schemas.microsoft.com/office/drawing/2014/main" id="{A698F868-3F12-8BE2-151E-B2580B07774E}"/>
+              </a:ext>
+            </a:extLst>
+          </p:cNvPr>
+          <p:cNvSpPr>
+            <a:spLocks noGrp="1"/>
+          </p:cNvSpPr>
+          <p:nvPr>
+            <p:ph type="ctrTitle"/>
+          </p:nvPr>
+        </p:nvSpPr>
+        <p:spPr/>
+        <p:txBody>
+          <a:bodyPr/>
+          <a:lstStyle/>
+          <a:p>
+            <a:r>
+              <a:rPr lang="en-US" sz="4400" dirty="0"/>
+              <a:t>Add-k smoothing</a:t>
+            </a:r>
+            <a:br>
+              <a:rPr lang="en-US" dirty="0"/>
+            </a:br>
+            <a:r>
+              <a:rPr lang="en-US" sz="2800" dirty="0">
+                <a:solidFill>
+                  <a:srgbClr val="FF0000"/>
+                </a:solidFill>
+              </a:rPr>
+              <a:t>Language Models</a:t>
+            </a:r>
+          </a:p>
+        </p:txBody>
+      </p:sp>
+      <p:sp>
+        <p:nvSpPr>
+          <p:cNvPr id="3" name="Subtitle 2">
+            <a:extLst>
+              <a:ext uri="{FF2B5EF4-FFF2-40B4-BE49-F238E27FC236}">
+                <a16:creationId xmlns:a16="http://schemas.microsoft.com/office/drawing/2014/main" id="{659BC3DA-B40C-85A5-69C1-01B69E6B0213}"/>
+              </a:ext>
+            </a:extLst>
+          </p:cNvPr>
+          <p:cNvSpPr>
+            <a:spLocks noGrp="1"/>
+          </p:cNvSpPr>
+          <p:nvPr>
+            <p:ph type="subTitle" idx="1"/>
+          </p:nvPr>
+        </p:nvSpPr>
+        <p:spPr>
+          <a:xfrm>
+            <a:off x="1062877" y="4422031"/>
+            <a:ext cx="8144134" cy="1117687"/>
+          </a:xfrm>
+        </p:spPr>
+        <p:txBody>
+          <a:bodyPr>
+            <a:normAutofit/>
+          </a:bodyPr>
+          <a:lstStyle/>
+          <a:p>
+            <a:r>
+              <a:rPr lang="en-US" sz="2600" dirty="0"/>
+              <a:t>Natural Language Processing </a:t>
+            </a:r>
+          </a:p>
+        </p:txBody>
+      </p:sp>
+      <p:sp>
+        <p:nvSpPr>
+          <p:cNvPr id="6" name="TextBox 5">
+            <a:extLst>
+              <a:ext uri="{FF2B5EF4-FFF2-40B4-BE49-F238E27FC236}">
+                <a16:creationId xmlns:a16="http://schemas.microsoft.com/office/drawing/2014/main" id="{6AD74E21-2EAB-7C4D-C2C6-42EB0B664A3D}"/>
+              </a:ext>
+            </a:extLst>
+          </p:cNvPr>
+          <p:cNvSpPr txBox="1"/>
+          <p:nvPr/>
+        </p:nvSpPr>
+        <p:spPr>
+          <a:xfrm>
+            <a:off x="7685202" y="6395243"/>
+            <a:ext cx="6094428" cy="369332"/>
+          </a:xfrm>
+          <a:prstGeom prst="rect">
+            <a:avLst/>
+          </a:prstGeom>
+          <a:noFill/>
+        </p:spPr>
+        <p:txBody>
+          <a:bodyPr wrap="square">
+            <a:spAutoFit/>
+          </a:bodyPr>
+          <a:lstStyle/>
+          <a:p>
+            <a:r>
+              <a:rPr lang="en-US" dirty="0"/>
+              <a:t>https://web.stanford.edu/~jurafsky/slp3/</a:t>
+            </a:r>
+          </a:p>
+        </p:txBody>
+      </p:sp>
+    </p:spTree>
+    <p:extLst>
+      <p:ext uri="{BB962C8B-B14F-4D97-AF65-F5344CB8AC3E}">
+        <p14:creationId xmlns:p14="http://schemas.microsoft.com/office/powerpoint/2010/main" val="3716505236"/>
+      </p:ext>
+    </p:extLst>
+  </p:cSld>
+  <p:clrMapOvr>
+    <a:masterClrMapping/>
+  </p:clrMapOvr>
+</p:sld>
+</file>
+
+<file path=ppt/slides/slide74.xml><?xml version="1.0" encoding="utf-8"?>
+<p:sld xmlns:a="http://schemas.openxmlformats.org/drawingml/2006/main" xmlns:r="http://schemas.openxmlformats.org/officeDocument/2006/relationships" xmlns:p="http://schemas.openxmlformats.org/presentationml/2006/main">
+  <p:cSld>
+    <p:spTree>
+      <p:nvGrpSpPr>
+        <p:cNvPr id="1" name="">
+          <a:extLst>
+            <a:ext uri="{FF2B5EF4-FFF2-40B4-BE49-F238E27FC236}">
+              <a16:creationId xmlns:a16="http://schemas.microsoft.com/office/drawing/2014/main" id="{49B6E788-F85B-69FD-DE68-D0C7705A55E3}"/>
+            </a:ext>
+          </a:extLst>
+        </p:cNvPr>
+        <p:cNvGrpSpPr/>
+        <p:nvPr/>
+      </p:nvGrpSpPr>
+      <p:grpSpPr>
+        <a:xfrm>
+          <a:off x="0" y="0"/>
+          <a:ext cx="0" cy="0"/>
+          <a:chOff x="0" y="0"/>
+          <a:chExt cx="0" cy="0"/>
+        </a:xfrm>
+      </p:grpSpPr>
+      <p:sp>
+        <p:nvSpPr>
+          <p:cNvPr id="2" name="Title 1">
+            <a:extLst>
+              <a:ext uri="{FF2B5EF4-FFF2-40B4-BE49-F238E27FC236}">
+                <a16:creationId xmlns:a16="http://schemas.microsoft.com/office/drawing/2014/main" id="{13037228-284E-2D4C-BD2C-D8C3340A9187}"/>
+              </a:ext>
+            </a:extLst>
+          </p:cNvPr>
+          <p:cNvSpPr>
+            <a:spLocks noGrp="1"/>
+          </p:cNvSpPr>
+          <p:nvPr>
+            <p:ph type="title"/>
+          </p:nvPr>
+        </p:nvSpPr>
+        <p:spPr/>
+        <p:txBody>
+          <a:bodyPr/>
+          <a:lstStyle/>
+          <a:p>
+            <a:r>
+              <a:rPr lang="en-US" dirty="0"/>
+              <a:t>Laplace smoothing</a:t>
+            </a:r>
+          </a:p>
+        </p:txBody>
+      </p:sp>
+      <p:sp>
+        <p:nvSpPr>
+          <p:cNvPr id="3" name="Content Placeholder 2">
+            <a:extLst>
+              <a:ext uri="{FF2B5EF4-FFF2-40B4-BE49-F238E27FC236}">
+                <a16:creationId xmlns:a16="http://schemas.microsoft.com/office/drawing/2014/main" id="{E780469F-CF34-C295-38D0-EB1DBB145596}"/>
+              </a:ext>
+            </a:extLst>
+          </p:cNvPr>
+          <p:cNvSpPr>
+            <a:spLocks noGrp="1"/>
+          </p:cNvSpPr>
+          <p:nvPr>
+            <p:ph idx="1"/>
+          </p:nvPr>
+        </p:nvSpPr>
+        <p:spPr/>
+        <p:txBody>
+          <a:bodyPr/>
+          <a:lstStyle/>
+          <a:p>
+            <a:r>
+              <a:rPr lang="en-US" dirty="0"/>
+              <a:t>Also called as Add-1 estimation</a:t>
+            </a:r>
+          </a:p>
+          <a:p>
+            <a:pPr lvl="1"/>
+            <a:r>
+              <a:rPr lang="en-US" dirty="0"/>
+              <a:t>Probability can not be zero</a:t>
+            </a:r>
+          </a:p>
+          <a:p>
+            <a:pPr lvl="1"/>
+            <a:r>
+              <a:rPr lang="en-US" dirty="0"/>
+              <a:t>Just add one to all the counts</a:t>
+            </a:r>
+          </a:p>
+          <a:p>
+            <a:pPr marL="457200" lvl="1" indent="0">
+              <a:buNone/>
+            </a:pPr>
+            <a:endParaRPr lang="en-US" dirty="0"/>
+          </a:p>
+          <a:p>
+            <a:pPr marL="457200" lvl="1" indent="0">
+              <a:buNone/>
+            </a:pPr>
+            <a:endParaRPr lang="en-US" dirty="0"/>
+          </a:p>
+          <a:p>
+            <a:pPr marL="457200" lvl="1" indent="0">
+              <a:buNone/>
+            </a:pPr>
+            <a:endParaRPr lang="en-US" dirty="0"/>
+          </a:p>
+        </p:txBody>
+      </p:sp>
+      <p:graphicFrame>
+        <p:nvGraphicFramePr>
+          <p:cNvPr id="4" name="Object 4">
+            <a:extLst>
+              <a:ext uri="{FF2B5EF4-FFF2-40B4-BE49-F238E27FC236}">
+                <a16:creationId xmlns:a16="http://schemas.microsoft.com/office/drawing/2014/main" id="{8E09A90C-89F3-5886-5B19-B2FD3DD81BDC}"/>
+              </a:ext>
+            </a:extLst>
+          </p:cNvPr>
+          <p:cNvGraphicFramePr>
+            <a:graphicFrameLocks noChangeAspect="1"/>
+          </p:cNvGraphicFramePr>
+          <p:nvPr/>
+        </p:nvGraphicFramePr>
+        <p:xfrm>
+          <a:off x="872826" y="4354822"/>
+          <a:ext cx="3721100" cy="995362"/>
+        </p:xfrm>
+        <a:graphic>
+          <a:graphicData uri="http://schemas.openxmlformats.org/presentationml/2006/ole">
+            <mc:AlternateContent xmlns:mc="http://schemas.openxmlformats.org/markup-compatibility/2006">
+              <mc:Choice xmlns:v="urn:schemas-microsoft-com:vml" Requires="v">
+                <p:oleObj name="Equation" r:id="rId2" imgW="1599840" imgH="420480" progId="Equation.3">
+                  <p:embed/>
+                </p:oleObj>
+              </mc:Choice>
+              <mc:Fallback>
+                <p:oleObj name="Equation" r:id="rId2" imgW="1599840" imgH="420480" progId="Equation.3">
+                  <p:embed/>
+                  <p:pic>
+                    <p:nvPicPr>
+                      <p:cNvPr id="4" name="Object 4">
+                        <a:extLst>
+                          <a:ext uri="{FF2B5EF4-FFF2-40B4-BE49-F238E27FC236}">
+                            <a16:creationId xmlns:a16="http://schemas.microsoft.com/office/drawing/2014/main" id="{9040AA5F-70A5-AF63-A053-4FB60FD8DCCB}"/>
+                          </a:ext>
+                        </a:extLst>
+                      </p:cNvPr>
+                      <p:cNvPicPr>
+                        <a:picLocks noChangeAspect="1" noChangeArrowheads="1"/>
+                      </p:cNvPicPr>
+                      <p:nvPr/>
+                    </p:nvPicPr>
+                    <p:blipFill>
+                      <a:blip r:embed="rId3">
+                        <a:extLst>
+                          <a:ext uri="{28A0092B-C50C-407E-A947-70E740481C1C}">
+                            <a14:useLocalDpi xmlns:a14="http://schemas.microsoft.com/office/drawing/2010/main" val="0"/>
+                          </a:ext>
+                        </a:extLst>
+                      </a:blip>
+                      <a:srcRect/>
+                      <a:stretch>
+                        <a:fillRect/>
+                      </a:stretch>
+                    </p:blipFill>
+                    <p:spPr bwMode="auto">
+                      <a:xfrm>
+                        <a:off x="872826" y="4354822"/>
+                        <a:ext cx="3721100" cy="995362"/>
+                      </a:xfrm>
+                      <a:prstGeom prst="rect">
+                        <a:avLst/>
+                      </a:prstGeom>
+                      <a:noFill/>
+                      <a:extLst>
+                        <a:ext uri="{909E8E84-426E-40DD-AFC4-6F175D3DCCD1}">
+                          <a14:hiddenFill xmlns:a14="http://schemas.microsoft.com/office/drawing/2010/main">
+                            <a:solidFill>
+                              <a:srgbClr val="FFFFFF"/>
+                            </a:solidFill>
+                          </a14:hiddenFill>
+                        </a:ext>
+                      </a:extLst>
+                    </p:spPr>
+                  </p:pic>
+                </p:oleObj>
+              </mc:Fallback>
+            </mc:AlternateContent>
+          </a:graphicData>
+        </a:graphic>
+      </p:graphicFrame>
+      <p:sp>
+        <p:nvSpPr>
+          <p:cNvPr id="5" name="Rectangle 4">
+            <a:extLst>
+              <a:ext uri="{FF2B5EF4-FFF2-40B4-BE49-F238E27FC236}">
+                <a16:creationId xmlns:a16="http://schemas.microsoft.com/office/drawing/2014/main" id="{440BEE93-58C0-4AF4-7B8E-F0CBA48FD6FA}"/>
+              </a:ext>
+            </a:extLst>
+          </p:cNvPr>
+          <p:cNvSpPr/>
+          <p:nvPr/>
+        </p:nvSpPr>
+        <p:spPr>
+          <a:xfrm>
+            <a:off x="1113458" y="5601537"/>
+            <a:ext cx="3691497" cy="669303"/>
+          </a:xfrm>
+          <a:prstGeom prst="rect">
+            <a:avLst/>
+          </a:prstGeom>
+        </p:spPr>
+        <p:style>
+          <a:lnRef idx="2">
+            <a:schemeClr val="accent3">
+              <a:shade val="15000"/>
+            </a:schemeClr>
+          </a:lnRef>
+          <a:fillRef idx="1">
+            <a:schemeClr val="accent3"/>
+          </a:fillRef>
+          <a:effectRef idx="0">
+            <a:schemeClr val="accent3"/>
+          </a:effectRef>
+          <a:fontRef idx="minor">
+            <a:schemeClr val="lt1"/>
+          </a:fontRef>
+        </p:style>
+        <p:txBody>
+          <a:bodyPr rtlCol="0" anchor="ctr"/>
+          <a:lstStyle/>
+          <a:p>
+            <a:pPr marL="457200" lvl="1" indent="0" algn="ctr">
+              <a:buNone/>
+            </a:pPr>
+            <a:r>
+              <a:rPr lang="en-US" dirty="0"/>
+              <a:t>MLE estimation </a:t>
+            </a:r>
+          </a:p>
+        </p:txBody>
+      </p:sp>
+      <p:sp>
+        <p:nvSpPr>
+          <p:cNvPr id="6" name="Rectangle 5">
+            <a:extLst>
+              <a:ext uri="{FF2B5EF4-FFF2-40B4-BE49-F238E27FC236}">
+                <a16:creationId xmlns:a16="http://schemas.microsoft.com/office/drawing/2014/main" id="{D2F1561A-A334-E7DC-B55A-BE32855CF749}"/>
+              </a:ext>
+            </a:extLst>
+          </p:cNvPr>
+          <p:cNvSpPr/>
+          <p:nvPr/>
+        </p:nvSpPr>
+        <p:spPr>
+          <a:xfrm>
+            <a:off x="7242948" y="5626403"/>
+            <a:ext cx="3691497" cy="669303"/>
+          </a:xfrm>
+          <a:prstGeom prst="rect">
+            <a:avLst/>
+          </a:prstGeom>
+        </p:spPr>
+        <p:style>
+          <a:lnRef idx="2">
+            <a:schemeClr val="accent3">
+              <a:shade val="15000"/>
+            </a:schemeClr>
+          </a:lnRef>
+          <a:fillRef idx="1">
+            <a:schemeClr val="accent3"/>
+          </a:fillRef>
+          <a:effectRef idx="0">
+            <a:schemeClr val="accent3"/>
+          </a:effectRef>
+          <a:fontRef idx="minor">
+            <a:schemeClr val="lt1"/>
+          </a:fontRef>
+        </p:style>
+        <p:txBody>
+          <a:bodyPr rtlCol="0" anchor="ctr"/>
+          <a:lstStyle/>
+          <a:p>
+            <a:pPr marL="457200" lvl="1" indent="0" algn="ctr">
+              <a:buNone/>
+            </a:pPr>
+            <a:r>
+              <a:rPr lang="en-US" dirty="0"/>
+              <a:t>Add-1 estimation</a:t>
+            </a:r>
+          </a:p>
+        </p:txBody>
+      </p:sp>
+      <p:graphicFrame>
+        <p:nvGraphicFramePr>
+          <p:cNvPr id="7" name="Object 4">
+            <a:extLst>
+              <a:ext uri="{FF2B5EF4-FFF2-40B4-BE49-F238E27FC236}">
+                <a16:creationId xmlns:a16="http://schemas.microsoft.com/office/drawing/2014/main" id="{81D1C765-130F-D18E-5640-EC343B49B36D}"/>
+              </a:ext>
+            </a:extLst>
+          </p:cNvPr>
+          <p:cNvGraphicFramePr>
+            <a:graphicFrameLocks noChangeAspect="1"/>
+          </p:cNvGraphicFramePr>
+          <p:nvPr/>
+        </p:nvGraphicFramePr>
+        <p:xfrm>
+          <a:off x="6892097" y="4184896"/>
+          <a:ext cx="4249738" cy="995362"/>
+        </p:xfrm>
+        <a:graphic>
+          <a:graphicData uri="http://schemas.openxmlformats.org/presentationml/2006/ole">
+            <mc:AlternateContent xmlns:mc="http://schemas.openxmlformats.org/markup-compatibility/2006">
+              <mc:Choice xmlns:v="urn:schemas-microsoft-com:vml" Requires="v">
+                <p:oleObj name="Equation" r:id="rId4" imgW="1828440" imgH="420480" progId="Equation.3">
+                  <p:embed/>
+                </p:oleObj>
+              </mc:Choice>
+              <mc:Fallback>
+                <p:oleObj name="Equation" r:id="rId4" imgW="1828440" imgH="420480" progId="Equation.3">
+                  <p:embed/>
+                  <p:pic>
+                    <p:nvPicPr>
+                      <p:cNvPr id="7" name="Object 4">
+                        <a:extLst>
+                          <a:ext uri="{FF2B5EF4-FFF2-40B4-BE49-F238E27FC236}">
+                            <a16:creationId xmlns:a16="http://schemas.microsoft.com/office/drawing/2014/main" id="{1D34D922-AC09-6C0A-6B06-D6433194B56B}"/>
+                          </a:ext>
+                        </a:extLst>
+                      </p:cNvPr>
+                      <p:cNvPicPr>
+                        <a:picLocks noChangeAspect="1" noChangeArrowheads="1"/>
+                      </p:cNvPicPr>
+                      <p:nvPr/>
+                    </p:nvPicPr>
+                    <p:blipFill>
+                      <a:blip r:embed="rId5">
+                        <a:extLst>
+                          <a:ext uri="{28A0092B-C50C-407E-A947-70E740481C1C}">
+                            <a14:useLocalDpi xmlns:a14="http://schemas.microsoft.com/office/drawing/2010/main" val="0"/>
+                          </a:ext>
+                        </a:extLst>
+                      </a:blip>
+                      <a:srcRect/>
+                      <a:stretch>
+                        <a:fillRect/>
+                      </a:stretch>
+                    </p:blipFill>
+                    <p:spPr bwMode="auto">
+                      <a:xfrm>
+                        <a:off x="6892097" y="4184896"/>
+                        <a:ext cx="4249738" cy="995362"/>
+                      </a:xfrm>
+                      <a:prstGeom prst="rect">
+                        <a:avLst/>
+                      </a:prstGeom>
+                      <a:noFill/>
+                      <a:extLst>
+                        <a:ext uri="{909E8E84-426E-40DD-AFC4-6F175D3DCCD1}">
+                          <a14:hiddenFill xmlns:a14="http://schemas.microsoft.com/office/drawing/2010/main">
+                            <a:solidFill>
+                              <a:srgbClr val="FFFFFF"/>
+                            </a:solidFill>
+                          </a14:hiddenFill>
+                        </a:ext>
+                      </a:extLst>
+                    </p:spPr>
+                  </p:pic>
+                </p:oleObj>
+              </mc:Fallback>
+            </mc:AlternateContent>
+          </a:graphicData>
+        </a:graphic>
+      </p:graphicFrame>
+    </p:spTree>
+    <p:extLst>
+      <p:ext uri="{BB962C8B-B14F-4D97-AF65-F5344CB8AC3E}">
+        <p14:creationId xmlns:p14="http://schemas.microsoft.com/office/powerpoint/2010/main" val="3766516625"/>
+      </p:ext>
+    </p:extLst>
+  </p:cSld>
+  <p:clrMapOvr>
+    <a:masterClrMapping/>
+  </p:clrMapOvr>
+  <p:timing>
+    <p:tnLst>
+      <p:par>
+        <p:cTn id="1" dur="indefinite" restart="never" nodeType="tmRoot">
+          <p:childTnLst>
+            <p:seq concurrent="1" nextAc="seek">
+              <p:cTn id="2" dur="indefinite" nodeType="mainSeq">
+                <p:childTnLst>
+                  <p:par>
+                    <p:cTn id="3" fill="hold">
+                      <p:stCondLst>
+                        <p:cond delay="indefinite"/>
+                      </p:stCondLst>
+                      <p:childTnLst>
+                        <p:par>
+                          <p:cTn id="4" fill="hold">
+                            <p:stCondLst>
+                              <p:cond delay="0"/>
+                            </p:stCondLst>
+                            <p:childTnLst>
+                              <p:par>
+                                <p:cTn id="5" presetID="1" presetClass="entr" presetSubtype="0" fill="hold" nodeType="clickEffect">
+                                  <p:stCondLst>
+                                    <p:cond delay="0"/>
+                                  </p:stCondLst>
+                                  <p:childTnLst>
+                                    <p:set>
+                                      <p:cBhvr>
+                                        <p:cTn id="6" dur="1" fill="hold">
+                                          <p:stCondLst>
+                                            <p:cond delay="0"/>
+                                          </p:stCondLst>
+                                        </p:cTn>
+                                        <p:tgtEl>
+                                          <p:spTgt spid="4"/>
+                                        </p:tgtEl>
+                                        <p:attrNameLst>
+                                          <p:attrName>style.visibility</p:attrName>
+                                        </p:attrNameLst>
+                                      </p:cBhvr>
+                                      <p:to>
+                                        <p:strVal val="visible"/>
+                                      </p:to>
+                                    </p:set>
+                                  </p:childTnLst>
+                                </p:cTn>
+                              </p:par>
+                            </p:childTnLst>
+                          </p:cTn>
+                        </p:par>
+                      </p:childTnLst>
+                    </p:cTn>
+                  </p:par>
+                  <p:par>
+                    <p:cTn id="7" fill="hold">
+                      <p:stCondLst>
+                        <p:cond delay="indefinite"/>
+                      </p:stCondLst>
+                      <p:childTnLst>
+                        <p:par>
+                          <p:cTn id="8" fill="hold">
+                            <p:stCondLst>
+                              <p:cond delay="0"/>
+                            </p:stCondLst>
+                            <p:childTnLst>
+                              <p:par>
+                                <p:cTn id="9" presetID="1" presetClass="entr" presetSubtype="0" fill="hold" nodeType="clickEffect">
+                                  <p:stCondLst>
+                                    <p:cond delay="0"/>
+                                  </p:stCondLst>
+                                  <p:childTnLst>
+                                    <p:set>
+                                      <p:cBhvr>
+                                        <p:cTn id="10" dur="1" fill="hold">
+                                          <p:stCondLst>
+                                            <p:cond delay="0"/>
+                                          </p:stCondLst>
+                                        </p:cTn>
+                                        <p:tgtEl>
+                                          <p:spTgt spid="7"/>
+                                        </p:tgtEl>
+                                        <p:attrNameLst>
+                                          <p:attrName>style.visibility</p:attrName>
+                                        </p:attrNameLst>
+                                      </p:cBhvr>
+                                      <p:to>
+                                        <p:strVal val="visible"/>
+                                      </p:to>
+                                    </p:set>
+                                  </p:childTnLst>
+                                </p:cTn>
+                              </p:par>
+                            </p:childTnLst>
+                          </p:cTn>
+                        </p:par>
+                      </p:childTnLst>
+                    </p:cTn>
+                  </p:par>
+                </p:childTnLst>
+              </p:cTn>
+              <p:prevCondLst>
+                <p:cond evt="onPrev" delay="0">
+                  <p:tgtEl>
+                    <p:sldTgt/>
+                  </p:tgtEl>
+                </p:cond>
+              </p:prevCondLst>
+              <p:nextCondLst>
+                <p:cond evt="onNext" delay="0">
+                  <p:tgtEl>
+                    <p:sldTgt/>
+                  </p:tgtEl>
+                </p:cond>
+              </p:nextCondLst>
+            </p:seq>
+          </p:childTnLst>
+        </p:cTn>
+      </p:par>
+    </p:tnLst>
+  </p:timing>
 </p:sld>
 </file>
 
@@ -35382,4 +38679,24 @@
     </a:ext>
   </a:extLst>
 </a:theme>
+</file>
+
+<file path=ppt/webextensions/taskpanes.xml><?xml version="1.0" encoding="utf-8"?>
+<wetp:taskpanes xmlns:wetp="http://schemas.microsoft.com/office/webextensions/taskpanes/2010/11">
+  <wetp:taskpane dockstate="right" visibility="0" width="438" row="0">
+    <wetp:webextensionref xmlns:r="http://schemas.openxmlformats.org/officeDocument/2006/relationships" r:id="rId1"/>
+  </wetp:taskpane>
+</wetp:taskpanes>
+</file>
+
+<file path=ppt/webextensions/webextension1.xml><?xml version="1.0" encoding="utf-8"?>
+<we:webextension xmlns:we="http://schemas.microsoft.com/office/webextensions/webextension/2010/11" id="{9103AB65-794B-42CF-A47D-8673A8952008}">
+  <we:reference id="wa200005566" version="3.0.0.2" store="en-US" storeType="OMEX"/>
+  <we:alternateReferences>
+    <we:reference id="WA200005566" version="3.0.0.2" store="WA200005566" storeType="OMEX"/>
+  </we:alternateReferences>
+  <we:properties/>
+  <we:bindings/>
+  <we:snapshot xmlns:r="http://schemas.openxmlformats.org/officeDocument/2006/relationships"/>
+</we:webextension>
 </file>
</xml_diff>